<commit_message>
kleinen Fehler in der Praesentation behoben
</commit_message>
<xml_diff>
--- a/Praesentation/HBA_KNX_Frueh.pptx
+++ b/Praesentation/HBA_KNX_Frueh.pptx
@@ -204,7 +204,7 @@
             <a:fld id="{5B9998D1-2497-4072-B0F6-0EC0A66D4BF0}" type="datetimeFigureOut">
               <a:rPr lang="de-AT" smtClean="0"/>
               <a:pPr/>
-              <a:t>11.01.2014</a:t>
+              <a:t>12.01.2014</a:t>
             </a:fld>
             <a:endParaRPr lang="de-AT"/>
           </a:p>
@@ -962,7 +962,7 @@
             <a:fld id="{1BA50D42-C9CD-4801-B293-61D1F53EC57E}" type="datetimeFigureOut">
               <a:rPr lang="de-DE" smtClean="0"/>
               <a:pPr/>
-              <a:t>11.01.2014</a:t>
+              <a:t>12.01.2014</a:t>
             </a:fld>
             <a:endParaRPr lang="de-DE"/>
           </a:p>
@@ -1129,7 +1129,7 @@
             <a:fld id="{1BA50D42-C9CD-4801-B293-61D1F53EC57E}" type="datetimeFigureOut">
               <a:rPr lang="de-DE" smtClean="0"/>
               <a:pPr/>
-              <a:t>11.01.2014</a:t>
+              <a:t>12.01.2014</a:t>
             </a:fld>
             <a:endParaRPr lang="de-DE"/>
           </a:p>
@@ -1306,7 +1306,7 @@
             <a:fld id="{1BA50D42-C9CD-4801-B293-61D1F53EC57E}" type="datetimeFigureOut">
               <a:rPr lang="de-DE" smtClean="0"/>
               <a:pPr/>
-              <a:t>11.01.2014</a:t>
+              <a:t>12.01.2014</a:t>
             </a:fld>
             <a:endParaRPr lang="de-DE"/>
           </a:p>
@@ -1545,7 +1545,7 @@
             <a:fld id="{0BE876C2-B70C-4952-821D-AA76BB0E8132}" type="datetimeFigureOut">
               <a:rPr lang="de-AT" smtClean="0"/>
               <a:pPr/>
-              <a:t>11.01.2014</a:t>
+              <a:t>12.01.2014</a:t>
             </a:fld>
             <a:endParaRPr lang="de-AT"/>
           </a:p>
@@ -1712,7 +1712,7 @@
             <a:fld id="{0BE876C2-B70C-4952-821D-AA76BB0E8132}" type="datetimeFigureOut">
               <a:rPr lang="de-AT" smtClean="0"/>
               <a:pPr/>
-              <a:t>11.01.2014</a:t>
+              <a:t>12.01.2014</a:t>
             </a:fld>
             <a:endParaRPr lang="de-AT"/>
           </a:p>
@@ -1955,7 +1955,7 @@
             <a:fld id="{0BE876C2-B70C-4952-821D-AA76BB0E8132}" type="datetimeFigureOut">
               <a:rPr lang="de-AT" smtClean="0"/>
               <a:pPr/>
-              <a:t>11.01.2014</a:t>
+              <a:t>12.01.2014</a:t>
             </a:fld>
             <a:endParaRPr lang="de-AT"/>
           </a:p>
@@ -2240,7 +2240,7 @@
             <a:fld id="{0BE876C2-B70C-4952-821D-AA76BB0E8132}" type="datetimeFigureOut">
               <a:rPr lang="de-AT" smtClean="0"/>
               <a:pPr/>
-              <a:t>11.01.2014</a:t>
+              <a:t>12.01.2014</a:t>
             </a:fld>
             <a:endParaRPr lang="de-AT"/>
           </a:p>
@@ -2659,7 +2659,7 @@
             <a:fld id="{0BE876C2-B70C-4952-821D-AA76BB0E8132}" type="datetimeFigureOut">
               <a:rPr lang="de-AT" smtClean="0"/>
               <a:pPr/>
-              <a:t>11.01.2014</a:t>
+              <a:t>12.01.2014</a:t>
             </a:fld>
             <a:endParaRPr lang="de-AT"/>
           </a:p>
@@ -2774,7 +2774,7 @@
             <a:fld id="{0BE876C2-B70C-4952-821D-AA76BB0E8132}" type="datetimeFigureOut">
               <a:rPr lang="de-AT" smtClean="0"/>
               <a:pPr/>
-              <a:t>11.01.2014</a:t>
+              <a:t>12.01.2014</a:t>
             </a:fld>
             <a:endParaRPr lang="de-AT"/>
           </a:p>
@@ -2866,7 +2866,7 @@
             <a:fld id="{0BE876C2-B70C-4952-821D-AA76BB0E8132}" type="datetimeFigureOut">
               <a:rPr lang="de-AT" smtClean="0"/>
               <a:pPr/>
-              <a:t>11.01.2014</a:t>
+              <a:t>12.01.2014</a:t>
             </a:fld>
             <a:endParaRPr lang="de-AT"/>
           </a:p>
@@ -3140,7 +3140,7 @@
             <a:fld id="{0BE876C2-B70C-4952-821D-AA76BB0E8132}" type="datetimeFigureOut">
               <a:rPr lang="de-AT" smtClean="0"/>
               <a:pPr/>
-              <a:t>11.01.2014</a:t>
+              <a:t>12.01.2014</a:t>
             </a:fld>
             <a:endParaRPr lang="de-AT"/>
           </a:p>
@@ -3307,7 +3307,7 @@
             <a:fld id="{1BA50D42-C9CD-4801-B293-61D1F53EC57E}" type="datetimeFigureOut">
               <a:rPr lang="de-DE" smtClean="0"/>
               <a:pPr/>
-              <a:t>11.01.2014</a:t>
+              <a:t>12.01.2014</a:t>
             </a:fld>
             <a:endParaRPr lang="de-DE" dirty="0"/>
           </a:p>
@@ -3557,7 +3557,7 @@
             <a:fld id="{0BE876C2-B70C-4952-821D-AA76BB0E8132}" type="datetimeFigureOut">
               <a:rPr lang="de-AT" smtClean="0"/>
               <a:pPr/>
-              <a:t>11.01.2014</a:t>
+              <a:t>12.01.2014</a:t>
             </a:fld>
             <a:endParaRPr lang="de-AT"/>
           </a:p>
@@ -3724,7 +3724,7 @@
             <a:fld id="{0BE876C2-B70C-4952-821D-AA76BB0E8132}" type="datetimeFigureOut">
               <a:rPr lang="de-AT" smtClean="0"/>
               <a:pPr/>
-              <a:t>11.01.2014</a:t>
+              <a:t>12.01.2014</a:t>
             </a:fld>
             <a:endParaRPr lang="de-AT"/>
           </a:p>
@@ -3901,7 +3901,7 @@
             <a:fld id="{0BE876C2-B70C-4952-821D-AA76BB0E8132}" type="datetimeFigureOut">
               <a:rPr lang="de-AT" smtClean="0"/>
               <a:pPr/>
-              <a:t>11.01.2014</a:t>
+              <a:t>12.01.2014</a:t>
             </a:fld>
             <a:endParaRPr lang="de-AT"/>
           </a:p>
@@ -4145,7 +4145,7 @@
             <a:fld id="{1BA50D42-C9CD-4801-B293-61D1F53EC57E}" type="datetimeFigureOut">
               <a:rPr lang="de-DE" smtClean="0"/>
               <a:pPr/>
-              <a:t>11.01.2014</a:t>
+              <a:t>12.01.2014</a:t>
             </a:fld>
             <a:endParaRPr lang="de-DE"/>
           </a:p>
@@ -4411,7 +4411,7 @@
             <a:fld id="{1BA50D42-C9CD-4801-B293-61D1F53EC57E}" type="datetimeFigureOut">
               <a:rPr lang="de-DE" smtClean="0"/>
               <a:pPr/>
-              <a:t>11.01.2014</a:t>
+              <a:t>12.01.2014</a:t>
             </a:fld>
             <a:endParaRPr lang="de-DE"/>
           </a:p>
@@ -4791,7 +4791,7 @@
             <a:fld id="{1BA50D42-C9CD-4801-B293-61D1F53EC57E}" type="datetimeFigureOut">
               <a:rPr lang="de-DE" smtClean="0"/>
               <a:pPr/>
-              <a:t>11.01.2014</a:t>
+              <a:t>12.01.2014</a:t>
             </a:fld>
             <a:endParaRPr lang="de-DE"/>
           </a:p>
@@ -4943,7 +4943,7 @@
             <a:fld id="{1BA50D42-C9CD-4801-B293-61D1F53EC57E}" type="datetimeFigureOut">
               <a:rPr lang="de-DE" smtClean="0"/>
               <a:pPr/>
-              <a:t>11.01.2014</a:t>
+              <a:t>12.01.2014</a:t>
             </a:fld>
             <a:endParaRPr lang="de-DE"/>
           </a:p>
@@ -5035,7 +5035,7 @@
             <a:fld id="{1BA50D42-C9CD-4801-B293-61D1F53EC57E}" type="datetimeFigureOut">
               <a:rPr lang="de-DE" smtClean="0"/>
               <a:pPr/>
-              <a:t>11.01.2014</a:t>
+              <a:t>12.01.2014</a:t>
             </a:fld>
             <a:endParaRPr lang="de-DE"/>
           </a:p>
@@ -5298,7 +5298,7 @@
             <a:fld id="{1BA50D42-C9CD-4801-B293-61D1F53EC57E}" type="datetimeFigureOut">
               <a:rPr lang="de-DE" smtClean="0"/>
               <a:pPr/>
-              <a:t>11.01.2014</a:t>
+              <a:t>12.01.2014</a:t>
             </a:fld>
             <a:endParaRPr lang="de-DE"/>
           </a:p>
@@ -5588,7 +5588,7 @@
             <a:fld id="{1BA50D42-C9CD-4801-B293-61D1F53EC57E}" type="datetimeFigureOut">
               <a:rPr lang="de-DE" smtClean="0"/>
               <a:pPr/>
-              <a:t>11.01.2014</a:t>
+              <a:t>12.01.2014</a:t>
             </a:fld>
             <a:endParaRPr lang="de-DE"/>
           </a:p>
@@ -6361,7 +6361,7 @@
             <a:fld id="{1BA50D42-C9CD-4801-B293-61D1F53EC57E}" type="datetimeFigureOut">
               <a:rPr lang="de-DE" smtClean="0"/>
               <a:pPr/>
-              <a:t>11.01.2014</a:t>
+              <a:t>12.01.2014</a:t>
             </a:fld>
             <a:endParaRPr lang="de-DE"/>
           </a:p>
@@ -7116,7 +7116,7 @@
             <a:fld id="{0BE876C2-B70C-4952-821D-AA76BB0E8132}" type="datetimeFigureOut">
               <a:rPr lang="de-AT" smtClean="0"/>
               <a:pPr/>
-              <a:t>11.01.2014</a:t>
+              <a:t>12.01.2014</a:t>
             </a:fld>
             <a:endParaRPr lang="de-AT"/>
           </a:p>
@@ -11540,9 +11540,40 @@
           </p:style>
         </p:cxnSp>
       </p:grpSp>
+      <p:cxnSp>
+        <p:nvCxnSpPr>
+          <p:cNvPr id="171" name="Gerade Verbindung 170"/>
+          <p:cNvCxnSpPr/>
+          <p:nvPr/>
+        </p:nvCxnSpPr>
+        <p:spPr>
+          <a:xfrm flipV="1">
+            <a:off x="5580112" y="2348880"/>
+            <a:ext cx="1008112" cy="576064"/>
+          </a:xfrm>
+          <a:prstGeom prst="line">
+            <a:avLst/>
+          </a:prstGeom>
+          <a:ln w="38100"/>
+        </p:spPr>
+        <p:style>
+          <a:lnRef idx="1">
+            <a:schemeClr val="accent1"/>
+          </a:lnRef>
+          <a:fillRef idx="0">
+            <a:schemeClr val="accent1"/>
+          </a:fillRef>
+          <a:effectRef idx="0">
+            <a:schemeClr val="accent1"/>
+          </a:effectRef>
+          <a:fontRef idx="minor">
+            <a:schemeClr val="tx1"/>
+          </a:fontRef>
+        </p:style>
+      </p:cxnSp>
       <p:grpSp>
         <p:nvGrpSpPr>
-          <p:cNvPr id="83" name="Gruppieren 82"/>
+          <p:cNvPr id="173" name="Gruppieren 172"/>
           <p:cNvGrpSpPr/>
           <p:nvPr/>
         </p:nvGrpSpPr>
@@ -11550,7 +11581,7 @@
           <a:xfrm>
             <a:off x="3995936" y="2924944"/>
             <a:ext cx="3600400" cy="3744416"/>
-            <a:chOff x="5148064" y="2708920"/>
+            <a:chOff x="3995936" y="2924944"/>
             <a:chExt cx="3600400" cy="3744416"/>
           </a:xfrm>
         </p:grpSpPr>
@@ -11562,7 +11593,7 @@
           </p:nvSpPr>
           <p:spPr>
             <a:xfrm>
-              <a:off x="5148064" y="2780928"/>
+              <a:off x="3995936" y="2996952"/>
               <a:ext cx="3600400" cy="3672408"/>
             </a:xfrm>
             <a:prstGeom prst="roundRect">
@@ -11606,7 +11637,7 @@
           </p:nvCxnSpPr>
           <p:spPr>
             <a:xfrm>
-              <a:off x="5364088" y="3356992"/>
+              <a:off x="4211960" y="3573016"/>
               <a:ext cx="3168352" cy="0"/>
             </a:xfrm>
             <a:prstGeom prst="line">
@@ -11637,7 +11668,7 @@
           </p:nvSpPr>
           <p:spPr>
             <a:xfrm>
-              <a:off x="5220072" y="2996952"/>
+              <a:off x="4067944" y="3212976"/>
               <a:ext cx="1368152" cy="369332"/>
             </a:xfrm>
             <a:prstGeom prst="rect">
@@ -11667,7 +11698,7 @@
           </p:nvSpPr>
           <p:spPr>
             <a:xfrm>
-              <a:off x="5580112" y="3573016"/>
+              <a:off x="4427984" y="3789040"/>
               <a:ext cx="576064" cy="360040"/>
             </a:xfrm>
             <a:prstGeom prst="rect">
@@ -11711,7 +11742,7 @@
           </p:nvSpPr>
           <p:spPr>
             <a:xfrm>
-              <a:off x="7596336" y="3573016"/>
+              <a:off x="6444208" y="3789040"/>
               <a:ext cx="576064" cy="360040"/>
             </a:xfrm>
             <a:prstGeom prst="rect">
@@ -11755,7 +11786,7 @@
           </p:nvSpPr>
           <p:spPr>
             <a:xfrm>
-              <a:off x="5580112" y="5157192"/>
+              <a:off x="4427984" y="5373216"/>
               <a:ext cx="576064" cy="360040"/>
             </a:xfrm>
             <a:prstGeom prst="rect">
@@ -11799,7 +11830,7 @@
           </p:nvSpPr>
           <p:spPr>
             <a:xfrm>
-              <a:off x="6012160" y="4005064"/>
+              <a:off x="4860032" y="4221088"/>
               <a:ext cx="576064" cy="288032"/>
             </a:xfrm>
             <a:prstGeom prst="rect">
@@ -11854,7 +11885,7 @@
           </p:nvSpPr>
           <p:spPr>
             <a:xfrm>
-              <a:off x="6156176" y="4365104"/>
+              <a:off x="5004048" y="4581128"/>
               <a:ext cx="288032" cy="288032"/>
             </a:xfrm>
             <a:prstGeom prst="ellipse">
@@ -11894,7 +11925,7 @@
           </p:nvSpPr>
           <p:spPr>
             <a:xfrm>
-              <a:off x="6012160" y="5589240"/>
+              <a:off x="4860032" y="5805264"/>
               <a:ext cx="576064" cy="288032"/>
             </a:xfrm>
             <a:prstGeom prst="rect">
@@ -11952,7 +11983,7 @@
           </p:nvCxnSpPr>
           <p:spPr>
             <a:xfrm>
-              <a:off x="5868144" y="3933056"/>
+              <a:off x="4716016" y="4149080"/>
               <a:ext cx="0" cy="1224136"/>
             </a:xfrm>
             <a:prstGeom prst="line">
@@ -11985,7 +12016,7 @@
           </p:nvCxnSpPr>
           <p:spPr>
             <a:xfrm>
-              <a:off x="5868144" y="5517232"/>
+              <a:off x="4716016" y="5733256"/>
               <a:ext cx="0" cy="792088"/>
             </a:xfrm>
             <a:prstGeom prst="line">
@@ -12018,7 +12049,7 @@
           </p:nvCxnSpPr>
           <p:spPr>
             <a:xfrm flipH="1">
-              <a:off x="5868144" y="5733256"/>
+              <a:off x="4716016" y="5949280"/>
               <a:ext cx="144016" cy="0"/>
             </a:xfrm>
             <a:prstGeom prst="line">
@@ -12049,7 +12080,7 @@
           </p:nvCxnSpPr>
           <p:spPr>
             <a:xfrm flipH="1">
-              <a:off x="5868144" y="4149080"/>
+              <a:off x="4716016" y="4365104"/>
               <a:ext cx="144016" cy="0"/>
             </a:xfrm>
             <a:prstGeom prst="line">
@@ -12080,7 +12111,7 @@
           </p:nvSpPr>
           <p:spPr>
             <a:xfrm>
-              <a:off x="6156176" y="4797152"/>
+              <a:off x="5004048" y="5013176"/>
               <a:ext cx="288032" cy="288032"/>
             </a:xfrm>
             <a:prstGeom prst="ellipse">
@@ -12120,7 +12151,7 @@
           </p:nvSpPr>
           <p:spPr>
             <a:xfrm>
-              <a:off x="5292080" y="4509120"/>
+              <a:off x="4139952" y="4725144"/>
               <a:ext cx="288032" cy="288032"/>
             </a:xfrm>
             <a:prstGeom prst="ellipse">
@@ -12162,7 +12193,7 @@
           </p:nvCxnSpPr>
           <p:spPr>
             <a:xfrm flipH="1">
-              <a:off x="5580112" y="4653136"/>
+              <a:off x="4427984" y="4869160"/>
               <a:ext cx="288032" cy="0"/>
             </a:xfrm>
             <a:prstGeom prst="line">
@@ -12195,7 +12226,7 @@
           </p:nvCxnSpPr>
           <p:spPr>
             <a:xfrm flipH="1">
-              <a:off x="5868144" y="4941168"/>
+              <a:off x="4716016" y="5157192"/>
               <a:ext cx="288032" cy="0"/>
             </a:xfrm>
             <a:prstGeom prst="line">
@@ -12228,7 +12259,7 @@
           </p:nvCxnSpPr>
           <p:spPr>
             <a:xfrm flipH="1">
-              <a:off x="5868144" y="4509120"/>
+              <a:off x="4716016" y="4725144"/>
               <a:ext cx="288032" cy="0"/>
             </a:xfrm>
             <a:prstGeom prst="line">
@@ -12259,7 +12290,7 @@
           </p:nvSpPr>
           <p:spPr>
             <a:xfrm>
-              <a:off x="6156176" y="6021288"/>
+              <a:off x="5004048" y="6237312"/>
               <a:ext cx="288032" cy="288032"/>
             </a:xfrm>
             <a:prstGeom prst="ellipse">
@@ -12299,7 +12330,7 @@
           </p:nvSpPr>
           <p:spPr>
             <a:xfrm>
-              <a:off x="5292080" y="5733256"/>
+              <a:off x="4139952" y="5949280"/>
               <a:ext cx="288032" cy="288032"/>
             </a:xfrm>
             <a:prstGeom prst="ellipse">
@@ -12341,7 +12372,7 @@
           </p:nvCxnSpPr>
           <p:spPr>
             <a:xfrm flipH="1">
-              <a:off x="5580112" y="5877272"/>
+              <a:off x="4427984" y="6093296"/>
               <a:ext cx="288032" cy="0"/>
             </a:xfrm>
             <a:prstGeom prst="line">
@@ -12374,7 +12405,7 @@
           </p:nvCxnSpPr>
           <p:spPr>
             <a:xfrm flipH="1">
-              <a:off x="5868144" y="6165304"/>
+              <a:off x="4716016" y="6381328"/>
               <a:ext cx="288032" cy="0"/>
             </a:xfrm>
             <a:prstGeom prst="line">
@@ -12405,7 +12436,7 @@
           </p:nvCxnSpPr>
           <p:spPr>
             <a:xfrm>
-              <a:off x="5868144" y="3356992"/>
+              <a:off x="4716016" y="3573016"/>
               <a:ext cx="0" cy="216024"/>
             </a:xfrm>
             <a:prstGeom prst="line">
@@ -12438,7 +12469,7 @@
           </p:nvCxnSpPr>
           <p:spPr>
             <a:xfrm>
-              <a:off x="7884368" y="3933056"/>
+              <a:off x="6732240" y="4149080"/>
               <a:ext cx="0" cy="2232248"/>
             </a:xfrm>
             <a:prstGeom prst="line">
@@ -12469,7 +12500,7 @@
           </p:nvSpPr>
           <p:spPr>
             <a:xfrm>
-              <a:off x="8028384" y="4005064"/>
+              <a:off x="6876256" y="4221088"/>
               <a:ext cx="576064" cy="288032"/>
             </a:xfrm>
             <a:prstGeom prst="rect">
@@ -12524,7 +12555,7 @@
           </p:nvCxnSpPr>
           <p:spPr>
             <a:xfrm flipH="1">
-              <a:off x="7884368" y="4149080"/>
+              <a:off x="6732240" y="4365104"/>
               <a:ext cx="144016" cy="0"/>
             </a:xfrm>
             <a:prstGeom prst="line">
@@ -12555,7 +12586,7 @@
           </p:nvSpPr>
           <p:spPr>
             <a:xfrm>
-              <a:off x="8172400" y="4365104"/>
+              <a:off x="7020272" y="4581128"/>
               <a:ext cx="288032" cy="288032"/>
             </a:xfrm>
             <a:prstGeom prst="ellipse">
@@ -12595,7 +12626,7 @@
           </p:nvSpPr>
           <p:spPr>
             <a:xfrm>
-              <a:off x="8172400" y="4797152"/>
+              <a:off x="7020272" y="5013176"/>
               <a:ext cx="288032" cy="288032"/>
             </a:xfrm>
             <a:prstGeom prst="ellipse">
@@ -12635,7 +12666,7 @@
           </p:nvSpPr>
           <p:spPr>
             <a:xfrm>
-              <a:off x="7308304" y="4509120"/>
+              <a:off x="6156176" y="4725144"/>
               <a:ext cx="288032" cy="288032"/>
             </a:xfrm>
             <a:prstGeom prst="ellipse">
@@ -12677,7 +12708,7 @@
           </p:nvCxnSpPr>
           <p:spPr>
             <a:xfrm flipH="1">
-              <a:off x="7596336" y="4653136"/>
+              <a:off x="6444208" y="4869160"/>
               <a:ext cx="288032" cy="0"/>
             </a:xfrm>
             <a:prstGeom prst="line">
@@ -12710,7 +12741,7 @@
           </p:nvCxnSpPr>
           <p:spPr>
             <a:xfrm flipH="1">
-              <a:off x="7884368" y="4941168"/>
+              <a:off x="6732240" y="5157192"/>
               <a:ext cx="288032" cy="0"/>
             </a:xfrm>
             <a:prstGeom prst="line">
@@ -12743,7 +12774,7 @@
           </p:nvCxnSpPr>
           <p:spPr>
             <a:xfrm flipH="1">
-              <a:off x="7884368" y="4509120"/>
+              <a:off x="6732240" y="4725144"/>
               <a:ext cx="288032" cy="0"/>
             </a:xfrm>
             <a:prstGeom prst="line">
@@ -12774,7 +12805,7 @@
           </p:nvSpPr>
           <p:spPr>
             <a:xfrm>
-              <a:off x="8172400" y="5229200"/>
+              <a:off x="7020272" y="5445224"/>
               <a:ext cx="288032" cy="288032"/>
             </a:xfrm>
             <a:prstGeom prst="ellipse">
@@ -12814,7 +12845,7 @@
           </p:nvSpPr>
           <p:spPr>
             <a:xfrm>
-              <a:off x="8172400" y="5661248"/>
+              <a:off x="7020272" y="5877272"/>
               <a:ext cx="288032" cy="288032"/>
             </a:xfrm>
             <a:prstGeom prst="ellipse">
@@ -12854,7 +12885,7 @@
           </p:nvSpPr>
           <p:spPr>
             <a:xfrm>
-              <a:off x="7308304" y="5373216"/>
+              <a:off x="6156176" y="5589240"/>
               <a:ext cx="288032" cy="288032"/>
             </a:xfrm>
             <a:prstGeom prst="ellipse">
@@ -12896,7 +12927,7 @@
           </p:nvCxnSpPr>
           <p:spPr>
             <a:xfrm flipH="1">
-              <a:off x="7596336" y="5517232"/>
+              <a:off x="6444208" y="5733256"/>
               <a:ext cx="288032" cy="0"/>
             </a:xfrm>
             <a:prstGeom prst="line">
@@ -12929,7 +12960,7 @@
           </p:nvCxnSpPr>
           <p:spPr>
             <a:xfrm flipH="1">
-              <a:off x="7884368" y="5805264"/>
+              <a:off x="6732240" y="6021288"/>
               <a:ext cx="288032" cy="0"/>
             </a:xfrm>
             <a:prstGeom prst="line">
@@ -12962,7 +12993,7 @@
           </p:nvCxnSpPr>
           <p:spPr>
             <a:xfrm flipH="1">
-              <a:off x="7884368" y="5373216"/>
+              <a:off x="6732240" y="5589240"/>
               <a:ext cx="288032" cy="0"/>
             </a:xfrm>
             <a:prstGeom prst="line">
@@ -12993,7 +13024,7 @@
           </p:nvSpPr>
           <p:spPr>
             <a:xfrm>
-              <a:off x="7308304" y="5013176"/>
+              <a:off x="6156176" y="5229200"/>
               <a:ext cx="288032" cy="288032"/>
             </a:xfrm>
             <a:prstGeom prst="ellipse">
@@ -13035,7 +13066,7 @@
           </p:nvCxnSpPr>
           <p:spPr>
             <a:xfrm flipH="1">
-              <a:off x="7596336" y="5157192"/>
+              <a:off x="6444208" y="5373216"/>
               <a:ext cx="288032" cy="0"/>
             </a:xfrm>
             <a:prstGeom prst="line">
@@ -13066,7 +13097,7 @@
           </p:nvSpPr>
           <p:spPr>
             <a:xfrm>
-              <a:off x="6444208" y="2852936"/>
+              <a:off x="5292080" y="3068960"/>
               <a:ext cx="576064" cy="360040"/>
             </a:xfrm>
             <a:prstGeom prst="rect">
@@ -13112,7 +13143,7 @@
           </p:nvCxnSpPr>
           <p:spPr>
             <a:xfrm>
-              <a:off x="6732240" y="3212976"/>
+              <a:off x="5580112" y="3429000"/>
               <a:ext cx="0" cy="144016"/>
             </a:xfrm>
             <a:prstGeom prst="line">
@@ -13143,7 +13174,7 @@
           </p:nvCxnSpPr>
           <p:spPr>
             <a:xfrm>
-              <a:off x="6732240" y="2708920"/>
+              <a:off x="5580112" y="2924944"/>
               <a:ext cx="0" cy="144016"/>
             </a:xfrm>
             <a:prstGeom prst="line">
@@ -13166,38 +13197,38 @@
             </a:fontRef>
           </p:style>
         </p:cxnSp>
+        <p:cxnSp>
+          <p:nvCxnSpPr>
+            <p:cNvPr id="172" name="Gerade Verbindung 171"/>
+            <p:cNvCxnSpPr/>
+            <p:nvPr/>
+          </p:nvCxnSpPr>
+          <p:spPr>
+            <a:xfrm>
+              <a:off x="6732240" y="3573016"/>
+              <a:ext cx="0" cy="216024"/>
+            </a:xfrm>
+            <a:prstGeom prst="line">
+              <a:avLst/>
+            </a:prstGeom>
+            <a:ln w="25400"/>
+          </p:spPr>
+          <p:style>
+            <a:lnRef idx="1">
+              <a:schemeClr val="accent1"/>
+            </a:lnRef>
+            <a:fillRef idx="0">
+              <a:schemeClr val="accent1"/>
+            </a:fillRef>
+            <a:effectRef idx="0">
+              <a:schemeClr val="accent1"/>
+            </a:effectRef>
+            <a:fontRef idx="minor">
+              <a:schemeClr val="tx1"/>
+            </a:fontRef>
+          </p:style>
+        </p:cxnSp>
       </p:grpSp>
-      <p:cxnSp>
-        <p:nvCxnSpPr>
-          <p:cNvPr id="171" name="Gerade Verbindung 170"/>
-          <p:cNvCxnSpPr/>
-          <p:nvPr/>
-        </p:nvCxnSpPr>
-        <p:spPr>
-          <a:xfrm flipV="1">
-            <a:off x="5580112" y="2348880"/>
-            <a:ext cx="1008112" cy="576064"/>
-          </a:xfrm>
-          <a:prstGeom prst="line">
-            <a:avLst/>
-          </a:prstGeom>
-          <a:ln w="38100"/>
-        </p:spPr>
-        <p:style>
-          <a:lnRef idx="1">
-            <a:schemeClr val="accent1"/>
-          </a:lnRef>
-          <a:fillRef idx="0">
-            <a:schemeClr val="accent1"/>
-          </a:fillRef>
-          <a:effectRef idx="0">
-            <a:schemeClr val="accent1"/>
-          </a:effectRef>
-          <a:fontRef idx="minor">
-            <a:schemeClr val="tx1"/>
-          </a:fontRef>
-        </p:style>
-      </p:cxnSp>
     </p:spTree>
   </p:cSld>
   <p:clrMapOvr>

</xml_diff>

<commit_message>
letzte Version von KNX Teil und Präsentation hinzugefügt
</commit_message>
<xml_diff>
--- a/Praesentation/HBA_KNX_Frueh.pptx
+++ b/Praesentation/HBA_KNX_Frueh.pptx
@@ -6,23 +6,29 @@
     <p:sldMasterId id="2147483804" r:id="rId2"/>
   </p:sldMasterIdLst>
   <p:notesMasterIdLst>
-    <p:notesMasterId r:id="rId14"/>
+    <p:notesMasterId r:id="rId20"/>
   </p:notesMasterIdLst>
   <p:sldIdLst>
-    <p:sldId id="258" r:id="rId3"/>
-    <p:sldId id="259" r:id="rId4"/>
-    <p:sldId id="260" r:id="rId5"/>
-    <p:sldId id="267" r:id="rId6"/>
-    <p:sldId id="268" r:id="rId7"/>
-    <p:sldId id="261" r:id="rId8"/>
-    <p:sldId id="262" r:id="rId9"/>
-    <p:sldId id="266" r:id="rId10"/>
-    <p:sldId id="263" r:id="rId11"/>
-    <p:sldId id="264" r:id="rId12"/>
-    <p:sldId id="265" r:id="rId13"/>
+    <p:sldId id="259" r:id="rId3"/>
+    <p:sldId id="260" r:id="rId4"/>
+    <p:sldId id="267" r:id="rId5"/>
+    <p:sldId id="268" r:id="rId6"/>
+    <p:sldId id="261" r:id="rId7"/>
+    <p:sldId id="262" r:id="rId8"/>
+    <p:sldId id="266" r:id="rId9"/>
+    <p:sldId id="271" r:id="rId10"/>
+    <p:sldId id="270" r:id="rId11"/>
+    <p:sldId id="277" r:id="rId12"/>
+    <p:sldId id="275" r:id="rId13"/>
+    <p:sldId id="273" r:id="rId14"/>
+    <p:sldId id="274" r:id="rId15"/>
+    <p:sldId id="276" r:id="rId16"/>
+    <p:sldId id="269" r:id="rId17"/>
+    <p:sldId id="265" r:id="rId18"/>
+    <p:sldId id="278" r:id="rId19"/>
   </p:sldIdLst>
   <p:sldSz cx="9144000" cy="6858000" type="screen4x3"/>
-  <p:notesSz cx="6858000" cy="9144000"/>
+  <p:notesSz cx="7099300" cy="10234613"/>
   <p:defaultTextStyle>
     <a:defPPr>
       <a:defRPr lang="de-DE"/>
@@ -156,17 +162,17 @@
         <p:spPr>
           <a:xfrm>
             <a:off x="0" y="0"/>
-            <a:ext cx="2971800" cy="457200"/>
+            <a:ext cx="3076363" cy="511731"/>
           </a:xfrm>
           <a:prstGeom prst="rect">
             <a:avLst/>
           </a:prstGeom>
         </p:spPr>
         <p:txBody>
-          <a:bodyPr vert="horz" lIns="91440" tIns="45720" rIns="91440" bIns="45720" rtlCol="0"/>
+          <a:bodyPr vert="horz" lIns="99048" tIns="49524" rIns="99048" bIns="49524" rtlCol="0"/>
           <a:lstStyle>
             <a:lvl1pPr algn="l">
-              <a:defRPr sz="1200"/>
+              <a:defRPr sz="1300"/>
             </a:lvl1pPr>
           </a:lstStyle>
           <a:p>
@@ -186,25 +192,25 @@
         </p:nvSpPr>
         <p:spPr>
           <a:xfrm>
-            <a:off x="3884613" y="0"/>
-            <a:ext cx="2971800" cy="457200"/>
+            <a:off x="4021294" y="0"/>
+            <a:ext cx="3076363" cy="511731"/>
           </a:xfrm>
           <a:prstGeom prst="rect">
             <a:avLst/>
           </a:prstGeom>
         </p:spPr>
         <p:txBody>
-          <a:bodyPr vert="horz" lIns="91440" tIns="45720" rIns="91440" bIns="45720" rtlCol="0"/>
+          <a:bodyPr vert="horz" lIns="99048" tIns="49524" rIns="99048" bIns="49524" rtlCol="0"/>
           <a:lstStyle>
             <a:lvl1pPr algn="r">
-              <a:defRPr sz="1200"/>
+              <a:defRPr sz="1300"/>
             </a:lvl1pPr>
           </a:lstStyle>
           <a:p>
             <a:fld id="{5B9998D1-2497-4072-B0F6-0EC0A66D4BF0}" type="datetimeFigureOut">
               <a:rPr lang="de-AT" smtClean="0"/>
               <a:pPr/>
-              <a:t>12.01.2014</a:t>
+              <a:t>13.01.2014</a:t>
             </a:fld>
             <a:endParaRPr lang="de-AT"/>
           </a:p>
@@ -222,8 +228,8 @@
         </p:nvSpPr>
         <p:spPr>
           <a:xfrm>
-            <a:off x="1143000" y="685800"/>
-            <a:ext cx="4572000" cy="3429000"/>
+            <a:off x="992188" y="768350"/>
+            <a:ext cx="5114925" cy="3836988"/>
           </a:xfrm>
           <a:prstGeom prst="rect">
             <a:avLst/>
@@ -236,7 +242,7 @@
           </a:ln>
         </p:spPr>
         <p:txBody>
-          <a:bodyPr vert="horz" lIns="91440" tIns="45720" rIns="91440" bIns="45720" rtlCol="0" anchor="ctr"/>
+          <a:bodyPr vert="horz" lIns="99048" tIns="49524" rIns="99048" bIns="49524" rtlCol="0" anchor="ctr"/>
           <a:lstStyle/>
           <a:p>
             <a:endParaRPr lang="de-AT"/>
@@ -255,15 +261,15 @@
         </p:nvSpPr>
         <p:spPr>
           <a:xfrm>
-            <a:off x="685800" y="4343400"/>
-            <a:ext cx="5486400" cy="4114800"/>
+            <a:off x="709930" y="4861441"/>
+            <a:ext cx="5679440" cy="4605576"/>
           </a:xfrm>
           <a:prstGeom prst="rect">
             <a:avLst/>
           </a:prstGeom>
         </p:spPr>
         <p:txBody>
-          <a:bodyPr vert="horz" lIns="91440" tIns="45720" rIns="91440" bIns="45720" rtlCol="0">
+          <a:bodyPr vert="horz" lIns="99048" tIns="49524" rIns="99048" bIns="49524" rtlCol="0">
             <a:normAutofit/>
           </a:bodyPr>
           <a:lstStyle/>
@@ -317,18 +323,18 @@
         </p:nvSpPr>
         <p:spPr>
           <a:xfrm>
-            <a:off x="0" y="8685213"/>
-            <a:ext cx="2971800" cy="457200"/>
+            <a:off x="0" y="9721106"/>
+            <a:ext cx="3076363" cy="511731"/>
           </a:xfrm>
           <a:prstGeom prst="rect">
             <a:avLst/>
           </a:prstGeom>
         </p:spPr>
         <p:txBody>
-          <a:bodyPr vert="horz" lIns="91440" tIns="45720" rIns="91440" bIns="45720" rtlCol="0" anchor="b"/>
+          <a:bodyPr vert="horz" lIns="99048" tIns="49524" rIns="99048" bIns="49524" rtlCol="0" anchor="b"/>
           <a:lstStyle>
             <a:lvl1pPr algn="l">
-              <a:defRPr sz="1200"/>
+              <a:defRPr sz="1300"/>
             </a:lvl1pPr>
           </a:lstStyle>
           <a:p>
@@ -348,18 +354,18 @@
         </p:nvSpPr>
         <p:spPr>
           <a:xfrm>
-            <a:off x="3884613" y="8685213"/>
-            <a:ext cx="2971800" cy="457200"/>
+            <a:off x="4021294" y="9721106"/>
+            <a:ext cx="3076363" cy="511731"/>
           </a:xfrm>
           <a:prstGeom prst="rect">
             <a:avLst/>
           </a:prstGeom>
         </p:spPr>
         <p:txBody>
-          <a:bodyPr vert="horz" lIns="91440" tIns="45720" rIns="91440" bIns="45720" rtlCol="0" anchor="b"/>
+          <a:bodyPr vert="horz" lIns="99048" tIns="49524" rIns="99048" bIns="49524" rtlCol="0" anchor="b"/>
           <a:lstStyle>
             <a:lvl1pPr algn="r">
-              <a:defRPr sz="1200"/>
+              <a:defRPr sz="1300"/>
             </a:lvl1pPr>
           </a:lstStyle>
           <a:p>
@@ -597,7 +603,7 @@
             <a:fld id="{428E6206-E386-4983-A423-D0349FCBCD6F}" type="slidenum">
               <a:rPr lang="de-AT" smtClean="0"/>
               <a:pPr/>
-              <a:t>3</a:t>
+              <a:t>2</a:t>
             </a:fld>
             <a:endParaRPr lang="de-AT"/>
           </a:p>
@@ -692,7 +698,7 @@
             <a:fld id="{428E6206-E386-4983-A423-D0349FCBCD6F}" type="slidenum">
               <a:rPr lang="de-AT" smtClean="0"/>
               <a:pPr/>
-              <a:t>4</a:t>
+              <a:t>3</a:t>
             </a:fld>
             <a:endParaRPr lang="de-AT"/>
           </a:p>
@@ -774,7 +780,283 @@
             <a:fld id="{428E6206-E386-4983-A423-D0349FCBCD6F}" type="slidenum">
               <a:rPr lang="de-AT" smtClean="0"/>
               <a:pPr/>
-              <a:t>6</a:t>
+              <a:t>5</a:t>
+            </a:fld>
+            <a:endParaRPr lang="de-AT"/>
+          </a:p>
+        </p:txBody>
+      </p:sp>
+    </p:spTree>
+  </p:cSld>
+  <p:clrMapOvr>
+    <a:masterClrMapping/>
+  </p:clrMapOvr>
+</p:notes>
+</file>
+
+<file path=ppt/notesSlides/notesSlide4.xml><?xml version="1.0" encoding="utf-8"?>
+<p:notes xmlns:a="http://schemas.openxmlformats.org/drawingml/2006/main" xmlns:r="http://schemas.openxmlformats.org/officeDocument/2006/relationships" xmlns:p="http://schemas.openxmlformats.org/presentationml/2006/main">
+  <p:cSld>
+    <p:spTree>
+      <p:nvGrpSpPr>
+        <p:cNvPr id="1" name=""/>
+        <p:cNvGrpSpPr/>
+        <p:nvPr/>
+      </p:nvGrpSpPr>
+      <p:grpSpPr>
+        <a:xfrm>
+          <a:off x="0" y="0"/>
+          <a:ext cx="0" cy="0"/>
+          <a:chOff x="0" y="0"/>
+          <a:chExt cx="0" cy="0"/>
+        </a:xfrm>
+      </p:grpSpPr>
+      <p:sp>
+        <p:nvSpPr>
+          <p:cNvPr id="2" name="Folienbildplatzhalter 1"/>
+          <p:cNvSpPr>
+            <a:spLocks noGrp="1" noRot="1" noChangeAspect="1"/>
+          </p:cNvSpPr>
+          <p:nvPr>
+            <p:ph type="sldImg"/>
+          </p:nvPr>
+        </p:nvSpPr>
+        <p:spPr/>
+      </p:sp>
+      <p:sp>
+        <p:nvSpPr>
+          <p:cNvPr id="3" name="Notizenplatzhalter 2"/>
+          <p:cNvSpPr>
+            <a:spLocks noGrp="1"/>
+          </p:cNvSpPr>
+          <p:nvPr>
+            <p:ph type="body" idx="1"/>
+          </p:nvPr>
+        </p:nvSpPr>
+        <p:spPr/>
+        <p:txBody>
+          <a:bodyPr>
+            <a:normAutofit/>
+          </a:bodyPr>
+          <a:lstStyle/>
+          <a:p>
+            <a:r>
+              <a:rPr lang="de-AT" dirty="0" smtClean="0"/>
+              <a:t>Link </a:t>
+            </a:r>
+            <a:r>
+              <a:rPr lang="de-AT" dirty="0" err="1" smtClean="0"/>
+              <a:t>Abstraction</a:t>
+            </a:r>
+            <a:endParaRPr lang="de-AT" dirty="0"/>
+          </a:p>
+        </p:txBody>
+      </p:sp>
+      <p:sp>
+        <p:nvSpPr>
+          <p:cNvPr id="4" name="Foliennummernplatzhalter 3"/>
+          <p:cNvSpPr>
+            <a:spLocks noGrp="1"/>
+          </p:cNvSpPr>
+          <p:nvPr>
+            <p:ph type="sldNum" sz="quarter" idx="10"/>
+          </p:nvPr>
+        </p:nvSpPr>
+        <p:spPr/>
+        <p:txBody>
+          <a:bodyPr/>
+          <a:lstStyle/>
+          <a:p>
+            <a:fld id="{428E6206-E386-4983-A423-D0349FCBCD6F}" type="slidenum">
+              <a:rPr lang="de-AT" smtClean="0"/>
+              <a:pPr/>
+              <a:t>8</a:t>
+            </a:fld>
+            <a:endParaRPr lang="de-AT"/>
+          </a:p>
+        </p:txBody>
+      </p:sp>
+    </p:spTree>
+  </p:cSld>
+  <p:clrMapOvr>
+    <a:masterClrMapping/>
+  </p:clrMapOvr>
+</p:notes>
+</file>
+
+<file path=ppt/notesSlides/notesSlide5.xml><?xml version="1.0" encoding="utf-8"?>
+<p:notes xmlns:a="http://schemas.openxmlformats.org/drawingml/2006/main" xmlns:r="http://schemas.openxmlformats.org/officeDocument/2006/relationships" xmlns:p="http://schemas.openxmlformats.org/presentationml/2006/main">
+  <p:cSld>
+    <p:spTree>
+      <p:nvGrpSpPr>
+        <p:cNvPr id="1" name=""/>
+        <p:cNvGrpSpPr/>
+        <p:nvPr/>
+      </p:nvGrpSpPr>
+      <p:grpSpPr>
+        <a:xfrm>
+          <a:off x="0" y="0"/>
+          <a:ext cx="0" cy="0"/>
+          <a:chOff x="0" y="0"/>
+          <a:chExt cx="0" cy="0"/>
+        </a:xfrm>
+      </p:grpSpPr>
+      <p:sp>
+        <p:nvSpPr>
+          <p:cNvPr id="2" name="Folienbildplatzhalter 1"/>
+          <p:cNvSpPr>
+            <a:spLocks noGrp="1" noRot="1" noChangeAspect="1"/>
+          </p:cNvSpPr>
+          <p:nvPr>
+            <p:ph type="sldImg"/>
+          </p:nvPr>
+        </p:nvSpPr>
+        <p:spPr/>
+      </p:sp>
+      <p:sp>
+        <p:nvSpPr>
+          <p:cNvPr id="3" name="Notizenplatzhalter 2"/>
+          <p:cNvSpPr>
+            <a:spLocks noGrp="1"/>
+          </p:cNvSpPr>
+          <p:nvPr>
+            <p:ph type="body" idx="1"/>
+          </p:nvPr>
+        </p:nvSpPr>
+        <p:spPr/>
+        <p:txBody>
+          <a:bodyPr>
+            <a:normAutofit/>
+          </a:bodyPr>
+          <a:lstStyle/>
+          <a:p>
+            <a:r>
+              <a:rPr lang="de-AT" dirty="0" smtClean="0"/>
+              <a:t>TPDU</a:t>
+            </a:r>
+            <a:r>
+              <a:rPr lang="de-AT" baseline="0" dirty="0" smtClean="0"/>
+              <a:t> -&gt; Transport Layer Protocol Data Unit</a:t>
+            </a:r>
+            <a:endParaRPr lang="de-AT" dirty="0"/>
+          </a:p>
+        </p:txBody>
+      </p:sp>
+      <p:sp>
+        <p:nvSpPr>
+          <p:cNvPr id="4" name="Foliennummernplatzhalter 3"/>
+          <p:cNvSpPr>
+            <a:spLocks noGrp="1"/>
+          </p:cNvSpPr>
+          <p:nvPr>
+            <p:ph type="sldNum" sz="quarter" idx="10"/>
+          </p:nvPr>
+        </p:nvSpPr>
+        <p:spPr/>
+        <p:txBody>
+          <a:bodyPr/>
+          <a:lstStyle/>
+          <a:p>
+            <a:fld id="{428E6206-E386-4983-A423-D0349FCBCD6F}" type="slidenum">
+              <a:rPr lang="de-AT" smtClean="0"/>
+              <a:pPr/>
+              <a:t>11</a:t>
+            </a:fld>
+            <a:endParaRPr lang="de-AT"/>
+          </a:p>
+        </p:txBody>
+      </p:sp>
+    </p:spTree>
+  </p:cSld>
+  <p:clrMapOvr>
+    <a:masterClrMapping/>
+  </p:clrMapOvr>
+</p:notes>
+</file>
+
+<file path=ppt/notesSlides/notesSlide6.xml><?xml version="1.0" encoding="utf-8"?>
+<p:notes xmlns:a="http://schemas.openxmlformats.org/drawingml/2006/main" xmlns:r="http://schemas.openxmlformats.org/officeDocument/2006/relationships" xmlns:p="http://schemas.openxmlformats.org/presentationml/2006/main">
+  <p:cSld>
+    <p:spTree>
+      <p:nvGrpSpPr>
+        <p:cNvPr id="1" name=""/>
+        <p:cNvGrpSpPr/>
+        <p:nvPr/>
+      </p:nvGrpSpPr>
+      <p:grpSpPr>
+        <a:xfrm>
+          <a:off x="0" y="0"/>
+          <a:ext cx="0" cy="0"/>
+          <a:chOff x="0" y="0"/>
+          <a:chExt cx="0" cy="0"/>
+        </a:xfrm>
+      </p:grpSpPr>
+      <p:sp>
+        <p:nvSpPr>
+          <p:cNvPr id="2" name="Folienbildplatzhalter 1"/>
+          <p:cNvSpPr>
+            <a:spLocks noGrp="1" noRot="1" noChangeAspect="1"/>
+          </p:cNvSpPr>
+          <p:nvPr>
+            <p:ph type="sldImg"/>
+          </p:nvPr>
+        </p:nvSpPr>
+        <p:spPr/>
+      </p:sp>
+      <p:sp>
+        <p:nvSpPr>
+          <p:cNvPr id="3" name="Notizenplatzhalter 2"/>
+          <p:cNvSpPr>
+            <a:spLocks noGrp="1"/>
+          </p:cNvSpPr>
+          <p:nvPr>
+            <p:ph type="body" idx="1"/>
+          </p:nvPr>
+        </p:nvSpPr>
+        <p:spPr/>
+        <p:txBody>
+          <a:bodyPr>
+            <a:normAutofit/>
+          </a:bodyPr>
+          <a:lstStyle/>
+          <a:p>
+            <a:r>
+              <a:rPr lang="de-AT" dirty="0" smtClean="0"/>
+              <a:t>Gruppenadresse</a:t>
+            </a:r>
+            <a:r>
+              <a:rPr lang="de-AT" baseline="0" dirty="0" smtClean="0"/>
+              <a:t> </a:t>
+            </a:r>
+            <a:r>
+              <a:rPr lang="de-AT" baseline="0" dirty="0" smtClean="0">
+                <a:sym typeface="Wingdings" pitchFamily="2" charset="2"/>
+              </a:rPr>
+              <a:t>&lt;-&gt; Datenpunkt</a:t>
+            </a:r>
+            <a:endParaRPr lang="de-AT" dirty="0"/>
+          </a:p>
+        </p:txBody>
+      </p:sp>
+      <p:sp>
+        <p:nvSpPr>
+          <p:cNvPr id="4" name="Foliennummernplatzhalter 3"/>
+          <p:cNvSpPr>
+            <a:spLocks noGrp="1"/>
+          </p:cNvSpPr>
+          <p:nvPr>
+            <p:ph type="sldNum" sz="quarter" idx="10"/>
+          </p:nvPr>
+        </p:nvSpPr>
+        <p:spPr/>
+        <p:txBody>
+          <a:bodyPr/>
+          <a:lstStyle/>
+          <a:p>
+            <a:fld id="{428E6206-E386-4983-A423-D0349FCBCD6F}" type="slidenum">
+              <a:rPr lang="de-AT" smtClean="0"/>
+              <a:pPr/>
+              <a:t>16</a:t>
             </a:fld>
             <a:endParaRPr lang="de-AT"/>
           </a:p>
@@ -959,10 +1241,10 @@
           <a:bodyPr/>
           <a:lstStyle/>
           <a:p>
-            <a:fld id="{1BA50D42-C9CD-4801-B293-61D1F53EC57E}" type="datetimeFigureOut">
+            <a:fld id="{5164749F-4673-4B0F-B336-4B6ACF067E77}" type="datetime1">
               <a:rPr lang="de-DE" smtClean="0"/>
               <a:pPr/>
-              <a:t>12.01.2014</a:t>
+              <a:t>13.01.2014</a:t>
             </a:fld>
             <a:endParaRPr lang="de-DE"/>
           </a:p>
@@ -1126,10 +1408,10 @@
           <a:bodyPr/>
           <a:lstStyle/>
           <a:p>
-            <a:fld id="{1BA50D42-C9CD-4801-B293-61D1F53EC57E}" type="datetimeFigureOut">
+            <a:fld id="{6FE48E7E-264C-496F-931F-D2F9D56635E9}" type="datetime1">
               <a:rPr lang="de-DE" smtClean="0"/>
               <a:pPr/>
-              <a:t>12.01.2014</a:t>
+              <a:t>13.01.2014</a:t>
             </a:fld>
             <a:endParaRPr lang="de-DE"/>
           </a:p>
@@ -1303,10 +1585,10 @@
           <a:bodyPr/>
           <a:lstStyle/>
           <a:p>
-            <a:fld id="{1BA50D42-C9CD-4801-B293-61D1F53EC57E}" type="datetimeFigureOut">
+            <a:fld id="{94D13DBF-2750-4B8C-9099-8E47CCD10F55}" type="datetime1">
               <a:rPr lang="de-DE" smtClean="0"/>
               <a:pPr/>
-              <a:t>12.01.2014</a:t>
+              <a:t>13.01.2014</a:t>
             </a:fld>
             <a:endParaRPr lang="de-DE"/>
           </a:p>
@@ -1542,10 +1824,10 @@
           <a:bodyPr/>
           <a:lstStyle/>
           <a:p>
-            <a:fld id="{0BE876C2-B70C-4952-821D-AA76BB0E8132}" type="datetimeFigureOut">
-              <a:rPr lang="de-AT" smtClean="0"/>
+            <a:fld id="{85BD1F87-7E18-400B-85CB-C577F15D63A4}" type="datetime1">
+              <a:rPr lang="de-DE" smtClean="0"/>
               <a:pPr/>
-              <a:t>12.01.2014</a:t>
+              <a:t>13.01.2014</a:t>
             </a:fld>
             <a:endParaRPr lang="de-AT"/>
           </a:p>
@@ -1709,10 +1991,10 @@
           <a:bodyPr/>
           <a:lstStyle/>
           <a:p>
-            <a:fld id="{0BE876C2-B70C-4952-821D-AA76BB0E8132}" type="datetimeFigureOut">
-              <a:rPr lang="de-AT" smtClean="0"/>
+            <a:fld id="{C18E81CF-8F15-4327-AF9A-2AF872186465}" type="datetime1">
+              <a:rPr lang="de-DE" smtClean="0"/>
               <a:pPr/>
-              <a:t>12.01.2014</a:t>
+              <a:t>13.01.2014</a:t>
             </a:fld>
             <a:endParaRPr lang="de-AT"/>
           </a:p>
@@ -1952,10 +2234,10 @@
           <a:bodyPr/>
           <a:lstStyle/>
           <a:p>
-            <a:fld id="{0BE876C2-B70C-4952-821D-AA76BB0E8132}" type="datetimeFigureOut">
-              <a:rPr lang="de-AT" smtClean="0"/>
+            <a:fld id="{E82425B1-7B73-4497-8FC5-4D5845049867}" type="datetime1">
+              <a:rPr lang="de-DE" smtClean="0"/>
               <a:pPr/>
-              <a:t>12.01.2014</a:t>
+              <a:t>13.01.2014</a:t>
             </a:fld>
             <a:endParaRPr lang="de-AT"/>
           </a:p>
@@ -2237,10 +2519,10 @@
           <a:bodyPr/>
           <a:lstStyle/>
           <a:p>
-            <a:fld id="{0BE876C2-B70C-4952-821D-AA76BB0E8132}" type="datetimeFigureOut">
-              <a:rPr lang="de-AT" smtClean="0"/>
+            <a:fld id="{91CE8E77-666A-472C-A640-C50D25AE3351}" type="datetime1">
+              <a:rPr lang="de-DE" smtClean="0"/>
               <a:pPr/>
-              <a:t>12.01.2014</a:t>
+              <a:t>13.01.2014</a:t>
             </a:fld>
             <a:endParaRPr lang="de-AT"/>
           </a:p>
@@ -2656,10 +2938,10 @@
           <a:bodyPr/>
           <a:lstStyle/>
           <a:p>
-            <a:fld id="{0BE876C2-B70C-4952-821D-AA76BB0E8132}" type="datetimeFigureOut">
-              <a:rPr lang="de-AT" smtClean="0"/>
+            <a:fld id="{9793D69B-F7DF-400D-A6AB-17CB0C38D72A}" type="datetime1">
+              <a:rPr lang="de-DE" smtClean="0"/>
               <a:pPr/>
-              <a:t>12.01.2014</a:t>
+              <a:t>13.01.2014</a:t>
             </a:fld>
             <a:endParaRPr lang="de-AT"/>
           </a:p>
@@ -2771,10 +3053,10 @@
           <a:bodyPr/>
           <a:lstStyle/>
           <a:p>
-            <a:fld id="{0BE876C2-B70C-4952-821D-AA76BB0E8132}" type="datetimeFigureOut">
-              <a:rPr lang="de-AT" smtClean="0"/>
+            <a:fld id="{7E2D7F4A-EBF5-456A-923C-25EFAFD51834}" type="datetime1">
+              <a:rPr lang="de-DE" smtClean="0"/>
               <a:pPr/>
-              <a:t>12.01.2014</a:t>
+              <a:t>13.01.2014</a:t>
             </a:fld>
             <a:endParaRPr lang="de-AT"/>
           </a:p>
@@ -2863,10 +3145,10 @@
           <a:bodyPr/>
           <a:lstStyle/>
           <a:p>
-            <a:fld id="{0BE876C2-B70C-4952-821D-AA76BB0E8132}" type="datetimeFigureOut">
-              <a:rPr lang="de-AT" smtClean="0"/>
+            <a:fld id="{92068D8C-193F-489D-9198-352F0367C0F2}" type="datetime1">
+              <a:rPr lang="de-DE" smtClean="0"/>
               <a:pPr/>
-              <a:t>12.01.2014</a:t>
+              <a:t>13.01.2014</a:t>
             </a:fld>
             <a:endParaRPr lang="de-AT"/>
           </a:p>
@@ -3137,10 +3419,10 @@
           <a:bodyPr/>
           <a:lstStyle/>
           <a:p>
-            <a:fld id="{0BE876C2-B70C-4952-821D-AA76BB0E8132}" type="datetimeFigureOut">
-              <a:rPr lang="de-AT" smtClean="0"/>
+            <a:fld id="{CAC9FD2C-6E83-4488-B24A-79BABE5E0D10}" type="datetime1">
+              <a:rPr lang="de-DE" smtClean="0"/>
               <a:pPr/>
-              <a:t>12.01.2014</a:t>
+              <a:t>13.01.2014</a:t>
             </a:fld>
             <a:endParaRPr lang="de-AT"/>
           </a:p>
@@ -3304,10 +3586,10 @@
           <a:bodyPr/>
           <a:lstStyle/>
           <a:p>
-            <a:fld id="{1BA50D42-C9CD-4801-B293-61D1F53EC57E}" type="datetimeFigureOut">
+            <a:fld id="{CDA57FBD-73B2-46FA-B28F-E16853D792B3}" type="datetime1">
               <a:rPr lang="de-DE" smtClean="0"/>
               <a:pPr/>
-              <a:t>12.01.2014</a:t>
+              <a:t>13.01.2014</a:t>
             </a:fld>
             <a:endParaRPr lang="de-DE" dirty="0"/>
           </a:p>
@@ -3352,7 +3634,7 @@
               <a:pPr/>
               <a:t>‹Nr.›</a:t>
             </a:fld>
-            <a:endParaRPr lang="de-DE"/>
+            <a:endParaRPr lang="de-DE" dirty="0"/>
           </a:p>
         </p:txBody>
       </p:sp>
@@ -3554,10 +3836,10 @@
           <a:bodyPr/>
           <a:lstStyle/>
           <a:p>
-            <a:fld id="{0BE876C2-B70C-4952-821D-AA76BB0E8132}" type="datetimeFigureOut">
-              <a:rPr lang="de-AT" smtClean="0"/>
+            <a:fld id="{1A540711-757A-459F-B79E-CB99922E7337}" type="datetime1">
+              <a:rPr lang="de-DE" smtClean="0"/>
               <a:pPr/>
-              <a:t>12.01.2014</a:t>
+              <a:t>13.01.2014</a:t>
             </a:fld>
             <a:endParaRPr lang="de-AT"/>
           </a:p>
@@ -3721,10 +4003,10 @@
           <a:bodyPr/>
           <a:lstStyle/>
           <a:p>
-            <a:fld id="{0BE876C2-B70C-4952-821D-AA76BB0E8132}" type="datetimeFigureOut">
-              <a:rPr lang="de-AT" smtClean="0"/>
+            <a:fld id="{DE9C3593-0C87-435C-B78A-DE1AE00DC188}" type="datetime1">
+              <a:rPr lang="de-DE" smtClean="0"/>
               <a:pPr/>
-              <a:t>12.01.2014</a:t>
+              <a:t>13.01.2014</a:t>
             </a:fld>
             <a:endParaRPr lang="de-AT"/>
           </a:p>
@@ -3898,10 +4180,10 @@
           <a:bodyPr/>
           <a:lstStyle/>
           <a:p>
-            <a:fld id="{0BE876C2-B70C-4952-821D-AA76BB0E8132}" type="datetimeFigureOut">
-              <a:rPr lang="de-AT" smtClean="0"/>
+            <a:fld id="{11E1D4B6-3F70-43E5-9333-C9D748D3D8AA}" type="datetime1">
+              <a:rPr lang="de-DE" smtClean="0"/>
               <a:pPr/>
-              <a:t>12.01.2014</a:t>
+              <a:t>13.01.2014</a:t>
             </a:fld>
             <a:endParaRPr lang="de-AT"/>
           </a:p>
@@ -4142,10 +4424,10 @@
           <a:bodyPr/>
           <a:lstStyle/>
           <a:p>
-            <a:fld id="{1BA50D42-C9CD-4801-B293-61D1F53EC57E}" type="datetimeFigureOut">
+            <a:fld id="{83B52E2B-27C3-413B-A197-20625DECC213}" type="datetime1">
               <a:rPr lang="de-DE" smtClean="0"/>
               <a:pPr/>
-              <a:t>12.01.2014</a:t>
+              <a:t>13.01.2014</a:t>
             </a:fld>
             <a:endParaRPr lang="de-DE"/>
           </a:p>
@@ -4408,10 +4690,10 @@
           <a:bodyPr/>
           <a:lstStyle/>
           <a:p>
-            <a:fld id="{1BA50D42-C9CD-4801-B293-61D1F53EC57E}" type="datetimeFigureOut">
+            <a:fld id="{19FDA5B9-2143-46CB-BA53-FA530C868742}" type="datetime1">
               <a:rPr lang="de-DE" smtClean="0"/>
               <a:pPr/>
-              <a:t>12.01.2014</a:t>
+              <a:t>13.01.2014</a:t>
             </a:fld>
             <a:endParaRPr lang="de-DE"/>
           </a:p>
@@ -4788,10 +5070,10 @@
           <a:bodyPr/>
           <a:lstStyle/>
           <a:p>
-            <a:fld id="{1BA50D42-C9CD-4801-B293-61D1F53EC57E}" type="datetimeFigureOut">
+            <a:fld id="{EC182C0B-A462-41DF-8559-0C3A7222CE3C}" type="datetime1">
               <a:rPr lang="de-DE" smtClean="0"/>
               <a:pPr/>
-              <a:t>12.01.2014</a:t>
+              <a:t>13.01.2014</a:t>
             </a:fld>
             <a:endParaRPr lang="de-DE"/>
           </a:p>
@@ -4940,10 +5222,10 @@
           <a:bodyPr/>
           <a:lstStyle/>
           <a:p>
-            <a:fld id="{1BA50D42-C9CD-4801-B293-61D1F53EC57E}" type="datetimeFigureOut">
+            <a:fld id="{2EC6E793-358B-48CE-8947-79A224917069}" type="datetime1">
               <a:rPr lang="de-DE" smtClean="0"/>
               <a:pPr/>
-              <a:t>12.01.2014</a:t>
+              <a:t>13.01.2014</a:t>
             </a:fld>
             <a:endParaRPr lang="de-DE"/>
           </a:p>
@@ -5032,10 +5314,10 @@
           <a:bodyPr/>
           <a:lstStyle/>
           <a:p>
-            <a:fld id="{1BA50D42-C9CD-4801-B293-61D1F53EC57E}" type="datetimeFigureOut">
+            <a:fld id="{DEF3F49A-B6D1-4321-8B69-62393E34D8A4}" type="datetime1">
               <a:rPr lang="de-DE" smtClean="0"/>
               <a:pPr/>
-              <a:t>12.01.2014</a:t>
+              <a:t>13.01.2014</a:t>
             </a:fld>
             <a:endParaRPr lang="de-DE"/>
           </a:p>
@@ -5295,10 +5577,10 @@
           <a:bodyPr/>
           <a:lstStyle/>
           <a:p>
-            <a:fld id="{1BA50D42-C9CD-4801-B293-61D1F53EC57E}" type="datetimeFigureOut">
+            <a:fld id="{D9C35132-D74B-4936-A24A-070B7CB69D30}" type="datetime1">
               <a:rPr lang="de-DE" smtClean="0"/>
               <a:pPr/>
-              <a:t>12.01.2014</a:t>
+              <a:t>13.01.2014</a:t>
             </a:fld>
             <a:endParaRPr lang="de-DE"/>
           </a:p>
@@ -5585,10 +5867,10 @@
           <a:bodyPr/>
           <a:lstStyle/>
           <a:p>
-            <a:fld id="{1BA50D42-C9CD-4801-B293-61D1F53EC57E}" type="datetimeFigureOut">
+            <a:fld id="{EDC8843A-80EB-4F6A-8AC1-1CA97E4F8700}" type="datetime1">
               <a:rPr lang="de-DE" smtClean="0"/>
               <a:pPr/>
-              <a:t>12.01.2014</a:t>
+              <a:t>13.01.2014</a:t>
             </a:fld>
             <a:endParaRPr lang="de-DE"/>
           </a:p>
@@ -6358,10 +6640,10 @@
             </a:lvl1pPr>
           </a:lstStyle>
           <a:p>
-            <a:fld id="{1BA50D42-C9CD-4801-B293-61D1F53EC57E}" type="datetimeFigureOut">
+            <a:fld id="{C196A8FC-DEFB-4428-A585-D713E4EC24B0}" type="datetime1">
               <a:rPr lang="de-DE" smtClean="0"/>
               <a:pPr/>
-              <a:t>12.01.2014</a:t>
+              <a:t>13.01.2014</a:t>
             </a:fld>
             <a:endParaRPr lang="de-DE"/>
           </a:p>
@@ -6676,6 +6958,7 @@
     <p:sldLayoutId id="2147483802" r:id="rId10"/>
     <p:sldLayoutId id="2147483803" r:id="rId11"/>
   </p:sldLayoutIdLst>
+  <p:hf hdr="0" ftr="0" dt="0"/>
   <p:txStyles>
     <p:titleStyle>
       <a:lvl1pPr algn="l" rtl="0" eaLnBrk="1" latinLnBrk="0" hangingPunct="1">
@@ -7113,10 +7396,10 @@
             </a:lvl1pPr>
           </a:lstStyle>
           <a:p>
-            <a:fld id="{0BE876C2-B70C-4952-821D-AA76BB0E8132}" type="datetimeFigureOut">
-              <a:rPr lang="de-AT" smtClean="0"/>
+            <a:fld id="{119F30A7-DA25-40DA-825F-F5A6EF432252}" type="datetime1">
+              <a:rPr lang="de-DE" smtClean="0"/>
               <a:pPr/>
-              <a:t>12.01.2014</a:t>
+              <a:t>13.01.2014</a:t>
             </a:fld>
             <a:endParaRPr lang="de-AT"/>
           </a:p>
@@ -7217,6 +7500,7 @@
     <p:sldLayoutId id="2147483814" r:id="rId10"/>
     <p:sldLayoutId id="2147483815" r:id="rId11"/>
   </p:sldLayoutIdLst>
+  <p:hf hdr="0" ftr="0" dt="0"/>
   <p:txStyles>
     <p:titleStyle>
       <a:lvl1pPr algn="ctr" defTabSz="914400" rtl="0" eaLnBrk="1" latinLnBrk="0" hangingPunct="1">
@@ -7494,7 +7778,7 @@
             <a:spLocks noGrp="1"/>
           </p:cNvSpPr>
           <p:nvPr>
-            <p:ph type="title"/>
+            <p:ph type="ctrTitle"/>
           </p:nvPr>
         </p:nvSpPr>
         <p:spPr/>
@@ -7504,7 +7788,11 @@
           <a:p>
             <a:r>
               <a:rPr lang="de-AT" dirty="0" smtClean="0"/>
-              <a:t>Infos für die Präsentation</a:t>
+              <a:t>KNX Engineering mit </a:t>
+            </a:r>
+            <a:r>
+              <a:rPr lang="de-AT" dirty="0" err="1" smtClean="0"/>
+              <a:t>Calimero</a:t>
             </a:r>
             <a:endParaRPr lang="de-AT" dirty="0"/>
           </a:p>
@@ -7512,77 +7800,31 @@
       </p:sp>
       <p:sp>
         <p:nvSpPr>
-          <p:cNvPr id="3" name="Inhaltsplatzhalter 2"/>
+          <p:cNvPr id="3" name="Untertitel 2"/>
           <p:cNvSpPr>
             <a:spLocks noGrp="1"/>
           </p:cNvSpPr>
           <p:nvPr>
-            <p:ph idx="1"/>
+            <p:ph type="subTitle" idx="1"/>
           </p:nvPr>
         </p:nvSpPr>
         <p:spPr/>
         <p:txBody>
           <a:bodyPr>
-            <a:normAutofit fontScale="92500" lnSpcReduction="20000"/>
+            <a:normAutofit/>
           </a:bodyPr>
           <a:lstStyle/>
           <a:p>
             <a:r>
               <a:rPr lang="de-AT" dirty="0" smtClean="0"/>
-              <a:t>15 min</a:t>
+              <a:t>Thomas Frühwirth</a:t>
             </a:r>
           </a:p>
           <a:p>
             <a:r>
               <a:rPr lang="de-AT" dirty="0" smtClean="0"/>
-              <a:t>kurzer Überblick über die eingesetzte Technologie</a:t>
-            </a:r>
-          </a:p>
-          <a:p>
-            <a:r>
-              <a:rPr lang="de-AT" dirty="0" smtClean="0"/>
-              <a:t>Aufgabenstellung</a:t>
-            </a:r>
-          </a:p>
-          <a:p>
-            <a:r>
-              <a:rPr lang="de-AT" dirty="0" smtClean="0"/>
-              <a:t>Engineering Teil</a:t>
-            </a:r>
-          </a:p>
-          <a:p>
-            <a:r>
-              <a:rPr lang="de-AT" dirty="0" smtClean="0"/>
-              <a:t>Management Applikation (Wie erfolgt das </a:t>
-            </a:r>
-            <a:r>
-              <a:rPr lang="de-AT" dirty="0" err="1" smtClean="0"/>
-              <a:t>Interfacing</a:t>
-            </a:r>
-            <a:r>
-              <a:rPr lang="de-AT" dirty="0" smtClean="0"/>
-              <a:t> mit dem Bus? Wie erfolgt Adressierung? Welche Kommunikationsservices werden eingesetzt z.B. für Discovery, Datenzugriff, etc.?)</a:t>
-            </a:r>
-          </a:p>
-          <a:p>
-            <a:r>
-              <a:rPr lang="de-AT" dirty="0" err="1" smtClean="0"/>
-              <a:t>Leasons</a:t>
-            </a:r>
-            <a:r>
-              <a:rPr lang="de-AT" dirty="0" smtClean="0"/>
-              <a:t> </a:t>
-            </a:r>
-            <a:r>
-              <a:rPr lang="de-AT" dirty="0" err="1" smtClean="0"/>
-              <a:t>Learned</a:t>
-            </a:r>
-            <a:r>
-              <a:rPr lang="de-AT" dirty="0" smtClean="0"/>
-              <a:t>: Wo gab es Schwierigkeiten? Wesentliche Vor- und Nachteile der Technologie? Welche Funktionalitäten können einfach realisiert werden und wo gibt es Einschränkungen?</a:t>
-            </a:r>
-          </a:p>
-          <a:p>
+              <a:t>Markus Schütz</a:t>
+            </a:r>
             <a:endParaRPr lang="de-AT" dirty="0"/>
           </a:p>
         </p:txBody>
@@ -7635,8 +7877,20 @@
           <a:lstStyle/>
           <a:p>
             <a:r>
+              <a:rPr lang="de-AT" dirty="0" err="1" smtClean="0"/>
+              <a:t>Calimero</a:t>
+            </a:r>
+            <a:r>
               <a:rPr lang="de-AT" dirty="0" smtClean="0"/>
-              <a:t>Management Applikation</a:t>
+              <a:t>: </a:t>
+            </a:r>
+            <a:r>
+              <a:rPr lang="de-AT" dirty="0" err="1" smtClean="0"/>
+              <a:t>KNXnet</a:t>
+            </a:r>
+            <a:r>
+              <a:rPr lang="de-AT" dirty="0" smtClean="0"/>
+              <a:t>/IP</a:t>
             </a:r>
             <a:endParaRPr lang="de-AT" dirty="0"/>
           </a:p>
@@ -7658,37 +7912,64 @@
           <a:lstStyle/>
           <a:p>
             <a:r>
+              <a:rPr lang="de-AT" dirty="0" smtClean="0"/>
+              <a:t>Discovery </a:t>
+            </a:r>
+            <a:r>
               <a:rPr lang="de-AT" dirty="0" err="1" smtClean="0"/>
-              <a:t>Calimero</a:t>
+              <a:t>and</a:t>
             </a:r>
             <a:r>
               <a:rPr lang="de-AT" dirty="0" smtClean="0"/>
-              <a:t>-Java Teil</a:t>
+              <a:t> Description</a:t>
             </a:r>
           </a:p>
           <a:p>
             <a:r>
               <a:rPr lang="de-AT" dirty="0" smtClean="0"/>
-              <a:t>Java Applet</a:t>
+              <a:t>Tunneling</a:t>
             </a:r>
           </a:p>
           <a:p>
             <a:r>
               <a:rPr lang="de-AT" dirty="0" smtClean="0"/>
-              <a:t>Remote </a:t>
-            </a:r>
-            <a:r>
-              <a:rPr lang="de-AT" dirty="0" err="1" smtClean="0"/>
-              <a:t>Control</a:t>
-            </a:r>
-            <a:endParaRPr lang="de-AT" dirty="0" smtClean="0"/>
+              <a:t>Routing</a:t>
+            </a:r>
           </a:p>
           <a:p>
             <a:r>
               <a:rPr lang="de-AT" dirty="0" smtClean="0"/>
-              <a:t>Beschreibung, Grafik über den Aufbau</a:t>
+              <a:t>Device Management</a:t>
             </a:r>
             <a:endParaRPr lang="de-AT" dirty="0"/>
+          </a:p>
+        </p:txBody>
+      </p:sp>
+      <p:sp>
+        <p:nvSpPr>
+          <p:cNvPr id="6" name="Foliennummernplatzhalter 5"/>
+          <p:cNvSpPr>
+            <a:spLocks noGrp="1"/>
+          </p:cNvSpPr>
+          <p:nvPr>
+            <p:ph type="sldNum" sz="quarter" idx="12"/>
+          </p:nvPr>
+        </p:nvSpPr>
+        <p:spPr/>
+        <p:txBody>
+          <a:bodyPr/>
+          <a:lstStyle/>
+          <a:p>
+            <a:fld id="{6C6AE60A-B69C-4790-82F7-3882EDF23186}" type="slidenum">
+              <a:rPr lang="de-DE" smtClean="0"/>
+              <a:pPr/>
+              <a:t>10</a:t>
+            </a:fld>
+            <a:r>
+              <a:rPr lang="de-DE" dirty="0" smtClean="0"/>
+              <a:t>/17</a:t>
+            </a:r>
+            <a:endParaRPr lang="de-DE" dirty="0"/>
           </a:p>
         </p:txBody>
       </p:sp>
@@ -7741,15 +8022,11 @@
           <a:p>
             <a:r>
               <a:rPr lang="de-AT" dirty="0" err="1" smtClean="0"/>
-              <a:t>Lessons</a:t>
+              <a:t>Calimero</a:t>
             </a:r>
             <a:r>
               <a:rPr lang="de-AT" dirty="0" smtClean="0"/>
-              <a:t> </a:t>
-            </a:r>
-            <a:r>
-              <a:rPr lang="de-AT" dirty="0" err="1" smtClean="0"/>
-              <a:t>Learned</a:t>
+              <a:t>: Ablauf</a:t>
             </a:r>
             <a:endParaRPr lang="de-AT" dirty="0"/>
           </a:p>
@@ -7773,6 +8050,945 @@
           <a:lstStyle/>
           <a:p>
             <a:r>
+              <a:rPr lang="de-AT" sz="2500" dirty="0" err="1" smtClean="0"/>
+              <a:t>Processkommunikation</a:t>
+            </a:r>
+            <a:r>
+              <a:rPr lang="de-AT" sz="2500" dirty="0" smtClean="0"/>
+              <a:t> für Austausch von </a:t>
+            </a:r>
+            <a:r>
+              <a:rPr lang="de-AT" sz="2500" dirty="0" err="1" smtClean="0"/>
+              <a:t>prozess</a:t>
+            </a:r>
+            <a:r>
+              <a:rPr lang="de-AT" sz="2500" dirty="0" smtClean="0"/>
+              <a:t>-verwandten Daten (Sensorwerte, </a:t>
+            </a:r>
+            <a:r>
+              <a:rPr lang="de-AT" sz="2500" dirty="0" err="1" smtClean="0"/>
+              <a:t>Aktuatorkommandos</a:t>
+            </a:r>
+            <a:r>
+              <a:rPr lang="de-AT" sz="2500" dirty="0" smtClean="0"/>
+              <a:t>)</a:t>
+            </a:r>
+          </a:p>
+          <a:p>
+            <a:r>
+              <a:rPr lang="de-AT" sz="2500" dirty="0" smtClean="0"/>
+              <a:t>Verwendet ausschließlich Gruppen-Kommunikation</a:t>
+            </a:r>
+            <a:endParaRPr lang="de-AT" sz="2300" dirty="0" smtClean="0"/>
+          </a:p>
+          <a:p>
+            <a:r>
+              <a:rPr lang="de-AT" sz="2300" dirty="0" smtClean="0"/>
+              <a:t>Schritte:</a:t>
+            </a:r>
+          </a:p>
+          <a:p>
+            <a:pPr lvl="1"/>
+            <a:r>
+              <a:rPr lang="de-AT" sz="2300" dirty="0" smtClean="0"/>
+              <a:t>Datenwert/Kommando </a:t>
+            </a:r>
+            <a:r>
+              <a:rPr lang="de-AT" sz="2300" dirty="0" smtClean="0">
+                <a:sym typeface="Wingdings" pitchFamily="2" charset="2"/>
+              </a:rPr>
+              <a:t> KNX Repräsentation (DPT </a:t>
+            </a:r>
+            <a:r>
+              <a:rPr lang="de-AT" sz="2300" dirty="0" err="1" smtClean="0">
+                <a:sym typeface="Wingdings" pitchFamily="2" charset="2"/>
+              </a:rPr>
+              <a:t>Translator</a:t>
+            </a:r>
+            <a:r>
+              <a:rPr lang="de-AT" sz="2300" dirty="0" smtClean="0">
+                <a:sym typeface="Wingdings" pitchFamily="2" charset="2"/>
+              </a:rPr>
+              <a:t>)</a:t>
+            </a:r>
+          </a:p>
+          <a:p>
+            <a:pPr lvl="1"/>
+            <a:r>
+              <a:rPr lang="de-AT" sz="2300" dirty="0" smtClean="0">
+                <a:sym typeface="Wingdings" pitchFamily="2" charset="2"/>
+              </a:rPr>
+              <a:t>Anwendungs- und Kontrollinformation hinzufügen (TPDU) </a:t>
+            </a:r>
+          </a:p>
+          <a:p>
+            <a:pPr lvl="1"/>
+            <a:r>
+              <a:rPr lang="de-AT" sz="2300" dirty="0" smtClean="0">
+                <a:sym typeface="Wingdings" pitchFamily="2" charset="2"/>
+              </a:rPr>
+              <a:t>Übergeben an den </a:t>
+            </a:r>
+            <a:r>
+              <a:rPr lang="de-AT" sz="2300" dirty="0" err="1" smtClean="0">
+                <a:sym typeface="Wingdings" pitchFamily="2" charset="2"/>
+              </a:rPr>
+              <a:t>KNXNetworkLink</a:t>
+            </a:r>
+            <a:r>
+              <a:rPr lang="de-AT" sz="2300" dirty="0" smtClean="0">
+                <a:sym typeface="Wingdings" pitchFamily="2" charset="2"/>
+              </a:rPr>
+              <a:t>  Zusammenfügen und senden</a:t>
+            </a:r>
+          </a:p>
+          <a:p>
+            <a:pPr lvl="1"/>
+            <a:endParaRPr lang="de-AT" sz="2300" dirty="0" smtClean="0">
+              <a:sym typeface="Wingdings" pitchFamily="2" charset="2"/>
+            </a:endParaRPr>
+          </a:p>
+        </p:txBody>
+      </p:sp>
+      <p:sp>
+        <p:nvSpPr>
+          <p:cNvPr id="6" name="Foliennummernplatzhalter 5"/>
+          <p:cNvSpPr>
+            <a:spLocks noGrp="1"/>
+          </p:cNvSpPr>
+          <p:nvPr>
+            <p:ph type="sldNum" sz="quarter" idx="12"/>
+          </p:nvPr>
+        </p:nvSpPr>
+        <p:spPr/>
+        <p:txBody>
+          <a:bodyPr/>
+          <a:lstStyle/>
+          <a:p>
+            <a:fld id="{6C6AE60A-B69C-4790-82F7-3882EDF23186}" type="slidenum">
+              <a:rPr lang="de-DE" smtClean="0"/>
+              <a:pPr/>
+              <a:t>11</a:t>
+            </a:fld>
+            <a:r>
+              <a:rPr lang="de-DE" dirty="0" smtClean="0"/>
+              <a:t>/17</a:t>
+            </a:r>
+            <a:endParaRPr lang="de-DE" dirty="0"/>
+          </a:p>
+        </p:txBody>
+      </p:sp>
+    </p:spTree>
+  </p:cSld>
+  <p:clrMapOvr>
+    <a:masterClrMapping/>
+  </p:clrMapOvr>
+  <p:timing>
+    <p:tnLst>
+      <p:par>
+        <p:cTn id="1" dur="indefinite" restart="never" nodeType="tmRoot"/>
+      </p:par>
+    </p:tnLst>
+  </p:timing>
+</p:sld>
+</file>
+
+<file path=ppt/slides/slide12.xml><?xml version="1.0" encoding="utf-8"?>
+<p:sld xmlns:a="http://schemas.openxmlformats.org/drawingml/2006/main" xmlns:r="http://schemas.openxmlformats.org/officeDocument/2006/relationships" xmlns:p="http://schemas.openxmlformats.org/presentationml/2006/main">
+  <p:cSld>
+    <p:spTree>
+      <p:nvGrpSpPr>
+        <p:cNvPr id="1" name=""/>
+        <p:cNvGrpSpPr/>
+        <p:nvPr/>
+      </p:nvGrpSpPr>
+      <p:grpSpPr>
+        <a:xfrm>
+          <a:off x="0" y="0"/>
+          <a:ext cx="0" cy="0"/>
+          <a:chOff x="0" y="0"/>
+          <a:chExt cx="0" cy="0"/>
+        </a:xfrm>
+      </p:grpSpPr>
+      <p:sp>
+        <p:nvSpPr>
+          <p:cNvPr id="2" name="Titel 1"/>
+          <p:cNvSpPr>
+            <a:spLocks noGrp="1"/>
+          </p:cNvSpPr>
+          <p:nvPr>
+            <p:ph type="title"/>
+          </p:nvPr>
+        </p:nvSpPr>
+        <p:spPr/>
+        <p:txBody>
+          <a:bodyPr/>
+          <a:lstStyle/>
+          <a:p>
+            <a:r>
+              <a:rPr lang="de-AT" dirty="0" err="1" smtClean="0"/>
+              <a:t>Calimero</a:t>
+            </a:r>
+            <a:r>
+              <a:rPr lang="de-AT" dirty="0" smtClean="0"/>
+              <a:t>: Link erzeugen</a:t>
+            </a:r>
+            <a:endParaRPr lang="de-AT" dirty="0"/>
+          </a:p>
+        </p:txBody>
+      </p:sp>
+      <p:pic>
+        <p:nvPicPr>
+          <p:cNvPr id="2051" name="Picture 3"/>
+          <p:cNvPicPr>
+            <a:picLocks noChangeAspect="1" noChangeArrowheads="1"/>
+          </p:cNvPicPr>
+          <p:nvPr/>
+        </p:nvPicPr>
+        <p:blipFill>
+          <a:blip r:embed="rId2" cstate="print"/>
+          <a:srcRect/>
+          <a:stretch>
+            <a:fillRect/>
+          </a:stretch>
+        </p:blipFill>
+        <p:spPr bwMode="auto">
+          <a:xfrm>
+            <a:off x="-25228" y="2420888"/>
+            <a:ext cx="9169228" cy="3240360"/>
+          </a:xfrm>
+          <a:prstGeom prst="rect">
+            <a:avLst/>
+          </a:prstGeom>
+          <a:noFill/>
+          <a:ln w="9525">
+            <a:noFill/>
+            <a:miter lim="800000"/>
+            <a:headEnd/>
+            <a:tailEnd/>
+          </a:ln>
+        </p:spPr>
+      </p:pic>
+      <p:sp>
+        <p:nvSpPr>
+          <p:cNvPr id="8" name="Foliennummernplatzhalter 7"/>
+          <p:cNvSpPr>
+            <a:spLocks noGrp="1"/>
+          </p:cNvSpPr>
+          <p:nvPr>
+            <p:ph type="sldNum" sz="quarter" idx="12"/>
+          </p:nvPr>
+        </p:nvSpPr>
+        <p:spPr/>
+        <p:txBody>
+          <a:bodyPr/>
+          <a:lstStyle/>
+          <a:p>
+            <a:fld id="{6C6AE60A-B69C-4790-82F7-3882EDF23186}" type="slidenum">
+              <a:rPr lang="de-DE" smtClean="0"/>
+              <a:pPr/>
+              <a:t>12</a:t>
+            </a:fld>
+            <a:r>
+              <a:rPr lang="de-DE" dirty="0" smtClean="0"/>
+              <a:t>/17</a:t>
+            </a:r>
+            <a:endParaRPr lang="de-DE" dirty="0"/>
+          </a:p>
+        </p:txBody>
+      </p:sp>
+    </p:spTree>
+  </p:cSld>
+  <p:clrMapOvr>
+    <a:masterClrMapping/>
+  </p:clrMapOvr>
+  <p:timing>
+    <p:tnLst>
+      <p:par>
+        <p:cTn id="1" dur="indefinite" restart="never" nodeType="tmRoot"/>
+      </p:par>
+    </p:tnLst>
+  </p:timing>
+</p:sld>
+</file>
+
+<file path=ppt/slides/slide13.xml><?xml version="1.0" encoding="utf-8"?>
+<p:sld xmlns:a="http://schemas.openxmlformats.org/drawingml/2006/main" xmlns:r="http://schemas.openxmlformats.org/officeDocument/2006/relationships" xmlns:p="http://schemas.openxmlformats.org/presentationml/2006/main">
+  <p:cSld>
+    <p:spTree>
+      <p:nvGrpSpPr>
+        <p:cNvPr id="1" name=""/>
+        <p:cNvGrpSpPr/>
+        <p:nvPr/>
+      </p:nvGrpSpPr>
+      <p:grpSpPr>
+        <a:xfrm>
+          <a:off x="0" y="0"/>
+          <a:ext cx="0" cy="0"/>
+          <a:chOff x="0" y="0"/>
+          <a:chExt cx="0" cy="0"/>
+        </a:xfrm>
+      </p:grpSpPr>
+      <p:sp>
+        <p:nvSpPr>
+          <p:cNvPr id="2" name="Titel 1"/>
+          <p:cNvSpPr>
+            <a:spLocks noGrp="1"/>
+          </p:cNvSpPr>
+          <p:nvPr>
+            <p:ph type="title"/>
+          </p:nvPr>
+        </p:nvSpPr>
+        <p:spPr/>
+        <p:txBody>
+          <a:bodyPr/>
+          <a:lstStyle/>
+          <a:p>
+            <a:r>
+              <a:rPr lang="de-AT" dirty="0" err="1" smtClean="0"/>
+              <a:t>Calimero</a:t>
+            </a:r>
+            <a:r>
+              <a:rPr lang="de-AT" dirty="0" smtClean="0"/>
+              <a:t>: Kommunikation</a:t>
+            </a:r>
+            <a:endParaRPr lang="de-AT" dirty="0"/>
+          </a:p>
+        </p:txBody>
+      </p:sp>
+      <p:pic>
+        <p:nvPicPr>
+          <p:cNvPr id="3074" name="Picture 2"/>
+          <p:cNvPicPr>
+            <a:picLocks noChangeAspect="1" noChangeArrowheads="1"/>
+          </p:cNvPicPr>
+          <p:nvPr/>
+        </p:nvPicPr>
+        <p:blipFill>
+          <a:blip r:embed="rId2" cstate="print"/>
+          <a:srcRect/>
+          <a:stretch>
+            <a:fillRect/>
+          </a:stretch>
+        </p:blipFill>
+        <p:spPr bwMode="auto">
+          <a:xfrm>
+            <a:off x="611560" y="1988840"/>
+            <a:ext cx="7666394" cy="2401341"/>
+          </a:xfrm>
+          <a:prstGeom prst="rect">
+            <a:avLst/>
+          </a:prstGeom>
+          <a:noFill/>
+          <a:ln w="9525">
+            <a:noFill/>
+            <a:miter lim="800000"/>
+            <a:headEnd/>
+            <a:tailEnd/>
+          </a:ln>
+        </p:spPr>
+      </p:pic>
+      <p:pic>
+        <p:nvPicPr>
+          <p:cNvPr id="3076" name="Picture 4"/>
+          <p:cNvPicPr>
+            <a:picLocks noChangeAspect="1" noChangeArrowheads="1"/>
+          </p:cNvPicPr>
+          <p:nvPr/>
+        </p:nvPicPr>
+        <p:blipFill>
+          <a:blip r:embed="rId3" cstate="print"/>
+          <a:srcRect/>
+          <a:stretch>
+            <a:fillRect/>
+          </a:stretch>
+        </p:blipFill>
+        <p:spPr bwMode="auto">
+          <a:xfrm>
+            <a:off x="3419872" y="4509120"/>
+            <a:ext cx="5472608" cy="2081799"/>
+          </a:xfrm>
+          <a:prstGeom prst="rect">
+            <a:avLst/>
+          </a:prstGeom>
+          <a:noFill/>
+          <a:ln w="9525">
+            <a:noFill/>
+            <a:miter lim="800000"/>
+            <a:headEnd/>
+            <a:tailEnd/>
+          </a:ln>
+        </p:spPr>
+      </p:pic>
+      <p:cxnSp>
+        <p:nvCxnSpPr>
+          <p:cNvPr id="7" name="Gerade Verbindung mit Pfeil 6"/>
+          <p:cNvCxnSpPr/>
+          <p:nvPr/>
+        </p:nvCxnSpPr>
+        <p:spPr>
+          <a:xfrm flipV="1">
+            <a:off x="6444208" y="3573016"/>
+            <a:ext cx="0" cy="936104"/>
+          </a:xfrm>
+          <a:prstGeom prst="straightConnector1">
+            <a:avLst/>
+          </a:prstGeom>
+          <a:ln w="34925">
+            <a:tailEnd type="arrow"/>
+          </a:ln>
+        </p:spPr>
+        <p:style>
+          <a:lnRef idx="1">
+            <a:schemeClr val="accent1"/>
+          </a:lnRef>
+          <a:fillRef idx="0">
+            <a:schemeClr val="accent1"/>
+          </a:fillRef>
+          <a:effectRef idx="0">
+            <a:schemeClr val="accent1"/>
+          </a:effectRef>
+          <a:fontRef idx="minor">
+            <a:schemeClr val="tx1"/>
+          </a:fontRef>
+        </p:style>
+      </p:cxnSp>
+      <p:sp>
+        <p:nvSpPr>
+          <p:cNvPr id="12" name="Foliennummernplatzhalter 11"/>
+          <p:cNvSpPr>
+            <a:spLocks noGrp="1"/>
+          </p:cNvSpPr>
+          <p:nvPr>
+            <p:ph type="sldNum" sz="quarter" idx="12"/>
+          </p:nvPr>
+        </p:nvSpPr>
+        <p:spPr/>
+        <p:txBody>
+          <a:bodyPr/>
+          <a:lstStyle/>
+          <a:p>
+            <a:fld id="{6C6AE60A-B69C-4790-82F7-3882EDF23186}" type="slidenum">
+              <a:rPr lang="de-DE" smtClean="0"/>
+              <a:pPr/>
+              <a:t>13</a:t>
+            </a:fld>
+            <a:r>
+              <a:rPr lang="de-DE" dirty="0" smtClean="0"/>
+              <a:t>/17</a:t>
+            </a:r>
+            <a:endParaRPr lang="de-DE" dirty="0"/>
+          </a:p>
+        </p:txBody>
+      </p:sp>
+    </p:spTree>
+  </p:cSld>
+  <p:clrMapOvr>
+    <a:masterClrMapping/>
+  </p:clrMapOvr>
+  <p:timing>
+    <p:tnLst>
+      <p:par>
+        <p:cTn id="1" dur="indefinite" restart="never" nodeType="tmRoot"/>
+      </p:par>
+    </p:tnLst>
+  </p:timing>
+</p:sld>
+</file>
+
+<file path=ppt/slides/slide14.xml><?xml version="1.0" encoding="utf-8"?>
+<p:sld xmlns:a="http://schemas.openxmlformats.org/drawingml/2006/main" xmlns:r="http://schemas.openxmlformats.org/officeDocument/2006/relationships" xmlns:p="http://schemas.openxmlformats.org/presentationml/2006/main">
+  <p:cSld>
+    <p:spTree>
+      <p:nvGrpSpPr>
+        <p:cNvPr id="1" name=""/>
+        <p:cNvGrpSpPr/>
+        <p:nvPr/>
+      </p:nvGrpSpPr>
+      <p:grpSpPr>
+        <a:xfrm>
+          <a:off x="0" y="0"/>
+          <a:ext cx="0" cy="0"/>
+          <a:chOff x="0" y="0"/>
+          <a:chExt cx="0" cy="0"/>
+        </a:xfrm>
+      </p:grpSpPr>
+      <p:sp>
+        <p:nvSpPr>
+          <p:cNvPr id="2" name="Titel 1"/>
+          <p:cNvSpPr>
+            <a:spLocks noGrp="1"/>
+          </p:cNvSpPr>
+          <p:nvPr>
+            <p:ph type="title"/>
+          </p:nvPr>
+        </p:nvSpPr>
+        <p:spPr/>
+        <p:txBody>
+          <a:bodyPr/>
+          <a:lstStyle/>
+          <a:p>
+            <a:r>
+              <a:rPr lang="de-AT" dirty="0" smtClean="0"/>
+              <a:t>Applikation: Web über TCP/IP</a:t>
+            </a:r>
+            <a:endParaRPr lang="de-AT" dirty="0"/>
+          </a:p>
+        </p:txBody>
+      </p:sp>
+      <p:pic>
+        <p:nvPicPr>
+          <p:cNvPr id="4098" name="Picture 2" descr="http://icons.iconarchive.com/icons/icons-land/vista-hardware-devices/256/Home-Server-icon.png"/>
+          <p:cNvPicPr>
+            <a:picLocks noChangeAspect="1" noChangeArrowheads="1"/>
+          </p:cNvPicPr>
+          <p:nvPr/>
+        </p:nvPicPr>
+        <p:blipFill>
+          <a:blip r:embed="rId2" cstate="print"/>
+          <a:srcRect/>
+          <a:stretch>
+            <a:fillRect/>
+          </a:stretch>
+        </p:blipFill>
+        <p:spPr bwMode="auto">
+          <a:xfrm>
+            <a:off x="1115616" y="2132856"/>
+            <a:ext cx="2232248" cy="2232248"/>
+          </a:xfrm>
+          <a:prstGeom prst="rect">
+            <a:avLst/>
+          </a:prstGeom>
+          <a:noFill/>
+        </p:spPr>
+      </p:pic>
+      <p:pic>
+        <p:nvPicPr>
+          <p:cNvPr id="4100" name="Picture 4" descr="http://demo.onestepcheckout.com/media/catalog/product/cache/1/image/5e06319eda06f020e43594a9c230972d/a/c/acer_2.jpg"/>
+          <p:cNvPicPr>
+            <a:picLocks noChangeAspect="1" noChangeArrowheads="1"/>
+          </p:cNvPicPr>
+          <p:nvPr/>
+        </p:nvPicPr>
+        <p:blipFill>
+          <a:blip r:embed="rId3" cstate="print"/>
+          <a:srcRect/>
+          <a:stretch>
+            <a:fillRect/>
+          </a:stretch>
+        </p:blipFill>
+        <p:spPr bwMode="auto">
+          <a:xfrm>
+            <a:off x="5868144" y="2132856"/>
+            <a:ext cx="2304255" cy="2304256"/>
+          </a:xfrm>
+          <a:prstGeom prst="rect">
+            <a:avLst/>
+          </a:prstGeom>
+          <a:noFill/>
+        </p:spPr>
+      </p:pic>
+      <p:sp>
+        <p:nvSpPr>
+          <p:cNvPr id="7" name="Pfeil nach links und rechts 6"/>
+          <p:cNvSpPr/>
+          <p:nvPr/>
+        </p:nvSpPr>
+        <p:spPr>
+          <a:xfrm>
+            <a:off x="3707904" y="2996952"/>
+            <a:ext cx="1944216" cy="288032"/>
+          </a:xfrm>
+          <a:prstGeom prst="leftRightArrow">
+            <a:avLst/>
+          </a:prstGeom>
+        </p:spPr>
+        <p:style>
+          <a:lnRef idx="2">
+            <a:schemeClr val="accent1">
+              <a:shade val="50000"/>
+            </a:schemeClr>
+          </a:lnRef>
+          <a:fillRef idx="1">
+            <a:schemeClr val="accent1"/>
+          </a:fillRef>
+          <a:effectRef idx="0">
+            <a:schemeClr val="accent1"/>
+          </a:effectRef>
+          <a:fontRef idx="minor">
+            <a:schemeClr val="lt1"/>
+          </a:fontRef>
+        </p:style>
+        <p:txBody>
+          <a:bodyPr rtlCol="0" anchor="ctr"/>
+          <a:lstStyle/>
+          <a:p>
+            <a:pPr algn="ctr"/>
+            <a:endParaRPr lang="de-AT"/>
+          </a:p>
+        </p:txBody>
+      </p:sp>
+      <p:sp>
+        <p:nvSpPr>
+          <p:cNvPr id="8" name="Textfeld 7"/>
+          <p:cNvSpPr txBox="1"/>
+          <p:nvPr/>
+        </p:nvSpPr>
+        <p:spPr>
+          <a:xfrm>
+            <a:off x="4067944" y="2420888"/>
+            <a:ext cx="1152128" cy="646331"/>
+          </a:xfrm>
+          <a:prstGeom prst="rect">
+            <a:avLst/>
+          </a:prstGeom>
+          <a:noFill/>
+        </p:spPr>
+        <p:txBody>
+          <a:bodyPr wrap="square" rtlCol="0">
+            <a:spAutoFit/>
+          </a:bodyPr>
+          <a:lstStyle/>
+          <a:p>
+            <a:r>
+              <a:rPr lang="de-AT" dirty="0" smtClean="0"/>
+              <a:t>TCP/IP-</a:t>
+            </a:r>
+          </a:p>
+          <a:p>
+            <a:r>
+              <a:rPr lang="de-AT" dirty="0" smtClean="0"/>
+              <a:t>Socket</a:t>
+            </a:r>
+          </a:p>
+        </p:txBody>
+      </p:sp>
+      <p:pic>
+        <p:nvPicPr>
+          <p:cNvPr id="4101" name="Picture 5" descr="U:\HBA\Praesentation\Bilder\raummodell.jpg"/>
+          <p:cNvPicPr>
+            <a:picLocks noChangeAspect="1" noChangeArrowheads="1"/>
+          </p:cNvPicPr>
+          <p:nvPr/>
+        </p:nvPicPr>
+        <p:blipFill>
+          <a:blip r:embed="rId4" cstate="print"/>
+          <a:srcRect/>
+          <a:stretch>
+            <a:fillRect/>
+          </a:stretch>
+        </p:blipFill>
+        <p:spPr bwMode="auto">
+          <a:xfrm>
+            <a:off x="323528" y="5013176"/>
+            <a:ext cx="3931513" cy="1575514"/>
+          </a:xfrm>
+          <a:prstGeom prst="rect">
+            <a:avLst/>
+          </a:prstGeom>
+          <a:noFill/>
+        </p:spPr>
+      </p:pic>
+      <p:sp>
+        <p:nvSpPr>
+          <p:cNvPr id="10" name="Pfeil nach links und rechts 9"/>
+          <p:cNvSpPr/>
+          <p:nvPr/>
+        </p:nvSpPr>
+        <p:spPr>
+          <a:xfrm rot="5934421">
+            <a:off x="1131065" y="4524471"/>
+            <a:ext cx="1152128" cy="288032"/>
+          </a:xfrm>
+          <a:prstGeom prst="leftRightArrow">
+            <a:avLst/>
+          </a:prstGeom>
+        </p:spPr>
+        <p:style>
+          <a:lnRef idx="2">
+            <a:schemeClr val="accent1">
+              <a:shade val="50000"/>
+            </a:schemeClr>
+          </a:lnRef>
+          <a:fillRef idx="1">
+            <a:schemeClr val="accent1"/>
+          </a:fillRef>
+          <a:effectRef idx="0">
+            <a:schemeClr val="accent1"/>
+          </a:effectRef>
+          <a:fontRef idx="minor">
+            <a:schemeClr val="lt1"/>
+          </a:fontRef>
+        </p:style>
+        <p:txBody>
+          <a:bodyPr rtlCol="0" anchor="ctr"/>
+          <a:lstStyle/>
+          <a:p>
+            <a:pPr algn="ctr"/>
+            <a:endParaRPr lang="de-AT"/>
+          </a:p>
+        </p:txBody>
+      </p:sp>
+      <p:sp>
+        <p:nvSpPr>
+          <p:cNvPr id="11" name="Textfeld 10"/>
+          <p:cNvSpPr txBox="1"/>
+          <p:nvPr/>
+        </p:nvSpPr>
+        <p:spPr>
+          <a:xfrm>
+            <a:off x="2051720" y="4365104"/>
+            <a:ext cx="3024336" cy="646331"/>
+          </a:xfrm>
+          <a:prstGeom prst="rect">
+            <a:avLst/>
+          </a:prstGeom>
+          <a:noFill/>
+        </p:spPr>
+        <p:txBody>
+          <a:bodyPr wrap="square" rtlCol="0">
+            <a:spAutoFit/>
+          </a:bodyPr>
+          <a:lstStyle/>
+          <a:p>
+            <a:r>
+              <a:rPr lang="de-AT" dirty="0" smtClean="0"/>
+              <a:t>KNX Tunneling/</a:t>
+            </a:r>
+            <a:r>
+              <a:rPr lang="de-AT" dirty="0" err="1" smtClean="0"/>
+              <a:t>Calimero</a:t>
+            </a:r>
+            <a:r>
+              <a:rPr lang="de-AT" dirty="0" smtClean="0"/>
+              <a:t> </a:t>
+            </a:r>
+            <a:r>
+              <a:rPr lang="de-AT" dirty="0" err="1" smtClean="0"/>
+              <a:t>Process</a:t>
+            </a:r>
+            <a:r>
+              <a:rPr lang="de-AT" dirty="0" smtClean="0"/>
+              <a:t>-Communicator</a:t>
+            </a:r>
+          </a:p>
+        </p:txBody>
+      </p:sp>
+      <p:sp>
+        <p:nvSpPr>
+          <p:cNvPr id="14" name="Foliennummernplatzhalter 13"/>
+          <p:cNvSpPr>
+            <a:spLocks noGrp="1"/>
+          </p:cNvSpPr>
+          <p:nvPr>
+            <p:ph type="sldNum" sz="quarter" idx="12"/>
+          </p:nvPr>
+        </p:nvSpPr>
+        <p:spPr/>
+        <p:txBody>
+          <a:bodyPr/>
+          <a:lstStyle/>
+          <a:p>
+            <a:fld id="{6C6AE60A-B69C-4790-82F7-3882EDF23186}" type="slidenum">
+              <a:rPr lang="de-DE" smtClean="0"/>
+              <a:pPr/>
+              <a:t>14</a:t>
+            </a:fld>
+            <a:r>
+              <a:rPr lang="de-DE" dirty="0" smtClean="0"/>
+              <a:t>/17</a:t>
+            </a:r>
+            <a:endParaRPr lang="de-DE" dirty="0"/>
+          </a:p>
+        </p:txBody>
+      </p:sp>
+    </p:spTree>
+  </p:cSld>
+  <p:clrMapOvr>
+    <a:masterClrMapping/>
+  </p:clrMapOvr>
+  <p:timing>
+    <p:tnLst>
+      <p:par>
+        <p:cTn id="1" dur="indefinite" restart="never" nodeType="tmRoot"/>
+      </p:par>
+    </p:tnLst>
+  </p:timing>
+</p:sld>
+</file>
+
+<file path=ppt/slides/slide15.xml><?xml version="1.0" encoding="utf-8"?>
+<p:sld xmlns:a="http://schemas.openxmlformats.org/drawingml/2006/main" xmlns:r="http://schemas.openxmlformats.org/officeDocument/2006/relationships" xmlns:p="http://schemas.openxmlformats.org/presentationml/2006/main">
+  <p:cSld>
+    <p:spTree>
+      <p:nvGrpSpPr>
+        <p:cNvPr id="1" name=""/>
+        <p:cNvGrpSpPr/>
+        <p:nvPr/>
+      </p:nvGrpSpPr>
+      <p:grpSpPr>
+        <a:xfrm>
+          <a:off x="0" y="0"/>
+          <a:ext cx="0" cy="0"/>
+          <a:chOff x="0" y="0"/>
+          <a:chExt cx="0" cy="0"/>
+        </a:xfrm>
+      </p:grpSpPr>
+      <p:sp>
+        <p:nvSpPr>
+          <p:cNvPr id="2" name="Titel 1"/>
+          <p:cNvSpPr>
+            <a:spLocks noGrp="1"/>
+          </p:cNvSpPr>
+          <p:nvPr>
+            <p:ph type="title"/>
+          </p:nvPr>
+        </p:nvSpPr>
+        <p:spPr/>
+        <p:txBody>
+          <a:bodyPr/>
+          <a:lstStyle/>
+          <a:p>
+            <a:r>
+              <a:rPr lang="de-AT" dirty="0" smtClean="0"/>
+              <a:t>Das Applet</a:t>
+            </a:r>
+            <a:endParaRPr lang="de-AT" dirty="0"/>
+          </a:p>
+        </p:txBody>
+      </p:sp>
+      <p:pic>
+        <p:nvPicPr>
+          <p:cNvPr id="4" name="Inhaltsplatzhalter 3" descr="Screenshot from 2014-01-13 11_08_40.png"/>
+          <p:cNvPicPr>
+            <a:picLocks noGrp="1" noChangeAspect="1"/>
+          </p:cNvPicPr>
+          <p:nvPr>
+            <p:ph idx="1"/>
+          </p:nvPr>
+        </p:nvPicPr>
+        <p:blipFill>
+          <a:blip r:embed="rId2" cstate="print"/>
+          <a:stretch>
+            <a:fillRect/>
+          </a:stretch>
+        </p:blipFill>
+        <p:spPr>
+          <a:xfrm>
+            <a:off x="526135" y="1935163"/>
+            <a:ext cx="8091729" cy="4389437"/>
+          </a:xfrm>
+        </p:spPr>
+      </p:pic>
+      <p:sp>
+        <p:nvSpPr>
+          <p:cNvPr id="7" name="Foliennummernplatzhalter 6"/>
+          <p:cNvSpPr>
+            <a:spLocks noGrp="1"/>
+          </p:cNvSpPr>
+          <p:nvPr>
+            <p:ph type="sldNum" sz="quarter" idx="12"/>
+          </p:nvPr>
+        </p:nvSpPr>
+        <p:spPr/>
+        <p:txBody>
+          <a:bodyPr/>
+          <a:lstStyle/>
+          <a:p>
+            <a:fld id="{6C6AE60A-B69C-4790-82F7-3882EDF23186}" type="slidenum">
+              <a:rPr lang="de-DE" smtClean="0"/>
+              <a:pPr/>
+              <a:t>15</a:t>
+            </a:fld>
+            <a:r>
+              <a:rPr lang="de-DE" dirty="0" smtClean="0"/>
+              <a:t>/17</a:t>
+            </a:r>
+            <a:endParaRPr lang="de-DE" dirty="0"/>
+          </a:p>
+        </p:txBody>
+      </p:sp>
+    </p:spTree>
+  </p:cSld>
+  <p:clrMapOvr>
+    <a:masterClrMapping/>
+  </p:clrMapOvr>
+  <p:timing>
+    <p:tnLst>
+      <p:par>
+        <p:cTn id="1" dur="indefinite" restart="never" nodeType="tmRoot"/>
+      </p:par>
+    </p:tnLst>
+  </p:timing>
+</p:sld>
+</file>
+
+<file path=ppt/slides/slide16.xml><?xml version="1.0" encoding="utf-8"?>
+<p:sld xmlns:a="http://schemas.openxmlformats.org/drawingml/2006/main" xmlns:r="http://schemas.openxmlformats.org/officeDocument/2006/relationships" xmlns:p="http://schemas.openxmlformats.org/presentationml/2006/main">
+  <p:cSld>
+    <p:spTree>
+      <p:nvGrpSpPr>
+        <p:cNvPr id="1" name=""/>
+        <p:cNvGrpSpPr/>
+        <p:nvPr/>
+      </p:nvGrpSpPr>
+      <p:grpSpPr>
+        <a:xfrm>
+          <a:off x="0" y="0"/>
+          <a:ext cx="0" cy="0"/>
+          <a:chOff x="0" y="0"/>
+          <a:chExt cx="0" cy="0"/>
+        </a:xfrm>
+      </p:grpSpPr>
+      <p:sp>
+        <p:nvSpPr>
+          <p:cNvPr id="2" name="Titel 1"/>
+          <p:cNvSpPr>
+            <a:spLocks noGrp="1"/>
+          </p:cNvSpPr>
+          <p:nvPr>
+            <p:ph type="title"/>
+          </p:nvPr>
+        </p:nvSpPr>
+        <p:spPr/>
+        <p:txBody>
+          <a:bodyPr/>
+          <a:lstStyle/>
+          <a:p>
+            <a:r>
+              <a:rPr lang="de-AT" dirty="0" err="1" smtClean="0"/>
+              <a:t>Lessons</a:t>
+            </a:r>
+            <a:r>
+              <a:rPr lang="de-AT" dirty="0" smtClean="0"/>
+              <a:t> </a:t>
+            </a:r>
+            <a:r>
+              <a:rPr lang="de-AT" dirty="0" err="1" smtClean="0"/>
+              <a:t>Learned</a:t>
+            </a:r>
+            <a:endParaRPr lang="de-AT" dirty="0"/>
+          </a:p>
+        </p:txBody>
+      </p:sp>
+      <p:sp>
+        <p:nvSpPr>
+          <p:cNvPr id="3" name="Inhaltsplatzhalter 2"/>
+          <p:cNvSpPr>
+            <a:spLocks noGrp="1"/>
+          </p:cNvSpPr>
+          <p:nvPr>
+            <p:ph idx="1"/>
+          </p:nvPr>
+        </p:nvSpPr>
+        <p:spPr/>
+        <p:txBody>
+          <a:bodyPr>
+            <a:normAutofit/>
+          </a:bodyPr>
+          <a:lstStyle/>
+          <a:p>
+            <a:r>
               <a:rPr lang="de-AT" dirty="0" smtClean="0"/>
               <a:t>Unterschied zwischen physikalischer- und Gruppenadresse</a:t>
             </a:r>
@@ -7780,29 +8996,7 @@
           <a:p>
             <a:r>
               <a:rPr lang="de-AT" dirty="0" smtClean="0"/>
-              <a:t>Den Taster zu lesen macht wenig Sinn, erzeugt keine Nachricht wenn nicht in einer Gruppe mit Licht, müsste </a:t>
-            </a:r>
-            <a:r>
-              <a:rPr lang="de-AT" dirty="0" err="1" smtClean="0"/>
-              <a:t>gepollt</a:t>
-            </a:r>
-            <a:r>
-              <a:rPr lang="de-AT" dirty="0" smtClean="0"/>
-              <a:t> werden</a:t>
-            </a:r>
-          </a:p>
-          <a:p>
-            <a:r>
-              <a:rPr lang="de-AT" dirty="0" smtClean="0"/>
-              <a:t>Das Resultat (Licht eingeschaltet) kann </a:t>
-            </a:r>
-            <a:r>
-              <a:rPr lang="de-AT" dirty="0" err="1" smtClean="0"/>
-              <a:t>gepollt</a:t>
-            </a:r>
-            <a:r>
-              <a:rPr lang="de-AT" dirty="0" smtClean="0"/>
-              <a:t> werden</a:t>
+              <a:t>Dezentrale Steuerung (Abfragen der Komponenten)</a:t>
             </a:r>
           </a:p>
           <a:p>
@@ -7811,6 +9005,123 @@
               <a:t>Adress-Programmierung ist zeitaufwendig (Program-Button am Gerät muss gedrückt werden) </a:t>
             </a:r>
             <a:endParaRPr lang="de-AT" dirty="0"/>
+          </a:p>
+        </p:txBody>
+      </p:sp>
+      <p:sp>
+        <p:nvSpPr>
+          <p:cNvPr id="6" name="Foliennummernplatzhalter 5"/>
+          <p:cNvSpPr>
+            <a:spLocks noGrp="1"/>
+          </p:cNvSpPr>
+          <p:nvPr>
+            <p:ph type="sldNum" sz="quarter" idx="12"/>
+          </p:nvPr>
+        </p:nvSpPr>
+        <p:spPr/>
+        <p:txBody>
+          <a:bodyPr/>
+          <a:lstStyle/>
+          <a:p>
+            <a:fld id="{6C6AE60A-B69C-4790-82F7-3882EDF23186}" type="slidenum">
+              <a:rPr lang="de-DE" smtClean="0"/>
+              <a:pPr/>
+              <a:t>16</a:t>
+            </a:fld>
+            <a:r>
+              <a:rPr lang="de-DE" dirty="0" smtClean="0"/>
+              <a:t>/17</a:t>
+            </a:r>
+            <a:endParaRPr lang="de-DE" dirty="0"/>
+          </a:p>
+        </p:txBody>
+      </p:sp>
+    </p:spTree>
+  </p:cSld>
+  <p:clrMapOvr>
+    <a:masterClrMapping/>
+  </p:clrMapOvr>
+  <p:timing>
+    <p:tnLst>
+      <p:par>
+        <p:cTn id="1" dur="indefinite" restart="never" nodeType="tmRoot"/>
+      </p:par>
+    </p:tnLst>
+  </p:timing>
+</p:sld>
+</file>
+
+<file path=ppt/slides/slide17.xml><?xml version="1.0" encoding="utf-8"?>
+<p:sld xmlns:a="http://schemas.openxmlformats.org/drawingml/2006/main" xmlns:r="http://schemas.openxmlformats.org/officeDocument/2006/relationships" xmlns:p="http://schemas.openxmlformats.org/presentationml/2006/main">
+  <p:cSld>
+    <p:spTree>
+      <p:nvGrpSpPr>
+        <p:cNvPr id="1" name=""/>
+        <p:cNvGrpSpPr/>
+        <p:nvPr/>
+      </p:nvGrpSpPr>
+      <p:grpSpPr>
+        <a:xfrm>
+          <a:off x="0" y="0"/>
+          <a:ext cx="0" cy="0"/>
+          <a:chOff x="0" y="0"/>
+          <a:chExt cx="0" cy="0"/>
+        </a:xfrm>
+      </p:grpSpPr>
+      <p:sp>
+        <p:nvSpPr>
+          <p:cNvPr id="2" name="Titel 1"/>
+          <p:cNvSpPr>
+            <a:spLocks noGrp="1"/>
+          </p:cNvSpPr>
+          <p:nvPr>
+            <p:ph type="title"/>
+          </p:nvPr>
+        </p:nvSpPr>
+        <p:spPr>
+          <a:xfrm>
+            <a:off x="467544" y="2780928"/>
+            <a:ext cx="8229600" cy="1143000"/>
+          </a:xfrm>
+        </p:spPr>
+        <p:txBody>
+          <a:bodyPr/>
+          <a:lstStyle/>
+          <a:p>
+            <a:pPr algn="ctr"/>
+            <a:r>
+              <a:rPr lang="de-AT" dirty="0" smtClean="0"/>
+              <a:t>Diskussion</a:t>
+            </a:r>
+            <a:endParaRPr lang="de-AT" dirty="0"/>
+          </a:p>
+        </p:txBody>
+      </p:sp>
+      <p:sp>
+        <p:nvSpPr>
+          <p:cNvPr id="4" name="Foliennummernplatzhalter 3"/>
+          <p:cNvSpPr>
+            <a:spLocks noGrp="1"/>
+          </p:cNvSpPr>
+          <p:nvPr>
+            <p:ph type="sldNum" sz="quarter" idx="12"/>
+          </p:nvPr>
+        </p:nvSpPr>
+        <p:spPr/>
+        <p:txBody>
+          <a:bodyPr/>
+          <a:lstStyle/>
+          <a:p>
+            <a:fld id="{6C6AE60A-B69C-4790-82F7-3882EDF23186}" type="slidenum">
+              <a:rPr lang="de-DE" smtClean="0"/>
+              <a:pPr/>
+              <a:t>17</a:t>
+            </a:fld>
+            <a:r>
+              <a:rPr lang="de-DE" dirty="0" smtClean="0"/>
+              <a:t>/17</a:t>
+            </a:r>
+            <a:endParaRPr lang="de-DE" dirty="0"/>
           </a:p>
         </p:txBody>
       </p:sp>
@@ -7830,96 +9141,6 @@
 </file>
 
 <file path=ppt/slides/slide2.xml><?xml version="1.0" encoding="utf-8"?>
-<p:sld xmlns:a="http://schemas.openxmlformats.org/drawingml/2006/main" xmlns:r="http://schemas.openxmlformats.org/officeDocument/2006/relationships" xmlns:p="http://schemas.openxmlformats.org/presentationml/2006/main">
-  <p:cSld>
-    <p:spTree>
-      <p:nvGrpSpPr>
-        <p:cNvPr id="1" name=""/>
-        <p:cNvGrpSpPr/>
-        <p:nvPr/>
-      </p:nvGrpSpPr>
-      <p:grpSpPr>
-        <a:xfrm>
-          <a:off x="0" y="0"/>
-          <a:ext cx="0" cy="0"/>
-          <a:chOff x="0" y="0"/>
-          <a:chExt cx="0" cy="0"/>
-        </a:xfrm>
-      </p:grpSpPr>
-      <p:sp>
-        <p:nvSpPr>
-          <p:cNvPr id="2" name="Titel 1"/>
-          <p:cNvSpPr>
-            <a:spLocks noGrp="1"/>
-          </p:cNvSpPr>
-          <p:nvPr>
-            <p:ph type="ctrTitle"/>
-          </p:nvPr>
-        </p:nvSpPr>
-        <p:spPr/>
-        <p:txBody>
-          <a:bodyPr/>
-          <a:lstStyle/>
-          <a:p>
-            <a:r>
-              <a:rPr lang="de-AT" dirty="0" smtClean="0"/>
-              <a:t>KNX Engineering mit </a:t>
-            </a:r>
-            <a:r>
-              <a:rPr lang="de-AT" dirty="0" err="1" smtClean="0"/>
-              <a:t>Calimero</a:t>
-            </a:r>
-            <a:endParaRPr lang="de-AT" dirty="0"/>
-          </a:p>
-        </p:txBody>
-      </p:sp>
-      <p:sp>
-        <p:nvSpPr>
-          <p:cNvPr id="3" name="Untertitel 2"/>
-          <p:cNvSpPr>
-            <a:spLocks noGrp="1"/>
-          </p:cNvSpPr>
-          <p:nvPr>
-            <p:ph type="subTitle" idx="1"/>
-          </p:nvPr>
-        </p:nvSpPr>
-        <p:spPr/>
-        <p:txBody>
-          <a:bodyPr>
-            <a:normAutofit/>
-          </a:bodyPr>
-          <a:lstStyle/>
-          <a:p>
-            <a:r>
-              <a:rPr lang="de-AT" dirty="0" smtClean="0"/>
-              <a:t>Thomas Frühwirth</a:t>
-            </a:r>
-          </a:p>
-          <a:p>
-            <a:r>
-              <a:rPr lang="de-AT" dirty="0" smtClean="0"/>
-              <a:t>Markus Schütz</a:t>
-            </a:r>
-            <a:endParaRPr lang="de-AT" dirty="0"/>
-          </a:p>
-        </p:txBody>
-      </p:sp>
-    </p:spTree>
-  </p:cSld>
-  <p:clrMapOvr>
-    <a:masterClrMapping/>
-  </p:clrMapOvr>
-  <p:timing>
-    <p:tnLst>
-      <p:par>
-        <p:cTn id="1" dur="indefinite" restart="never" nodeType="tmRoot"/>
-      </p:par>
-    </p:tnLst>
-  </p:timing>
-</p:sld>
-</file>
-
-<file path=ppt/slides/slide3.xml><?xml version="1.0" encoding="utf-8"?>
 <p:sld xmlns:a="http://schemas.openxmlformats.org/drawingml/2006/main" xmlns:r="http://schemas.openxmlformats.org/officeDocument/2006/relationships" xmlns:p="http://schemas.openxmlformats.org/presentationml/2006/main">
   <p:cSld>
     <p:spTree>
@@ -8137,6 +9358,34 @@
           </a:ln>
         </p:spPr>
       </p:pic>
+      <p:sp>
+        <p:nvSpPr>
+          <p:cNvPr id="9" name="Foliennummernplatzhalter 8"/>
+          <p:cNvSpPr>
+            <a:spLocks noGrp="1"/>
+          </p:cNvSpPr>
+          <p:nvPr>
+            <p:ph type="sldNum" sz="quarter" idx="12"/>
+          </p:nvPr>
+        </p:nvSpPr>
+        <p:spPr/>
+        <p:txBody>
+          <a:bodyPr/>
+          <a:lstStyle/>
+          <a:p>
+            <a:fld id="{6C6AE60A-B69C-4790-82F7-3882EDF23186}" type="slidenum">
+              <a:rPr lang="de-DE" smtClean="0"/>
+              <a:pPr/>
+              <a:t>2</a:t>
+            </a:fld>
+            <a:r>
+              <a:rPr lang="de-DE" dirty="0" smtClean="0"/>
+              <a:t>/17</a:t>
+            </a:r>
+            <a:endParaRPr lang="de-DE" dirty="0"/>
+          </a:p>
+        </p:txBody>
+      </p:sp>
     </p:spTree>
   </p:cSld>
   <p:clrMapOvr>
@@ -8152,7 +9401,7 @@
 </p:sld>
 </file>
 
-<file path=ppt/slides/slide4.xml><?xml version="1.0" encoding="utf-8"?>
+<file path=ppt/slides/slide3.xml><?xml version="1.0" encoding="utf-8"?>
 <p:sld xmlns:a="http://schemas.openxmlformats.org/drawingml/2006/main" xmlns:r="http://schemas.openxmlformats.org/officeDocument/2006/relationships" xmlns:p="http://schemas.openxmlformats.org/presentationml/2006/main">
   <p:cSld>
     <p:spTree>
@@ -9891,7 +11140,7 @@
         </p:nvSpPr>
         <p:spPr>
           <a:xfrm>
-            <a:off x="7236296" y="6581001"/>
+            <a:off x="2771800" y="6581001"/>
             <a:ext cx="1728192" cy="276999"/>
           </a:xfrm>
           <a:prstGeom prst="rect">
@@ -13229,6 +14478,34 @@
           </p:style>
         </p:cxnSp>
       </p:grpSp>
+      <p:sp>
+        <p:nvSpPr>
+          <p:cNvPr id="176" name="Foliennummernplatzhalter 175"/>
+          <p:cNvSpPr>
+            <a:spLocks noGrp="1"/>
+          </p:cNvSpPr>
+          <p:nvPr>
+            <p:ph type="sldNum" sz="quarter" idx="12"/>
+          </p:nvPr>
+        </p:nvSpPr>
+        <p:spPr/>
+        <p:txBody>
+          <a:bodyPr/>
+          <a:lstStyle/>
+          <a:p>
+            <a:fld id="{6C6AE60A-B69C-4790-82F7-3882EDF23186}" type="slidenum">
+              <a:rPr lang="de-DE" smtClean="0"/>
+              <a:pPr/>
+              <a:t>3</a:t>
+            </a:fld>
+            <a:r>
+              <a:rPr lang="de-DE" dirty="0" smtClean="0"/>
+              <a:t>/17</a:t>
+            </a:r>
+            <a:endParaRPr lang="de-DE" dirty="0"/>
+          </a:p>
+        </p:txBody>
+      </p:sp>
     </p:spTree>
   </p:cSld>
   <p:clrMapOvr>
@@ -13244,7 +14521,7 @@
 </p:sld>
 </file>
 
-<file path=ppt/slides/slide5.xml><?xml version="1.0" encoding="utf-8"?>
+<file path=ppt/slides/slide4.xml><?xml version="1.0" encoding="utf-8"?>
 <p:sld xmlns:a="http://schemas.openxmlformats.org/drawingml/2006/main" xmlns:r="http://schemas.openxmlformats.org/officeDocument/2006/relationships" xmlns:p="http://schemas.openxmlformats.org/presentationml/2006/main">
   <p:cSld>
     <p:spTree>
@@ -15031,6 +16308,824 @@
           </a:p>
         </p:txBody>
       </p:sp>
+      <p:sp>
+        <p:nvSpPr>
+          <p:cNvPr id="63" name="Foliennummernplatzhalter 62"/>
+          <p:cNvSpPr>
+            <a:spLocks noGrp="1"/>
+          </p:cNvSpPr>
+          <p:nvPr>
+            <p:ph type="sldNum" sz="quarter" idx="12"/>
+          </p:nvPr>
+        </p:nvSpPr>
+        <p:spPr/>
+        <p:txBody>
+          <a:bodyPr/>
+          <a:lstStyle/>
+          <a:p>
+            <a:fld id="{6C6AE60A-B69C-4790-82F7-3882EDF23186}" type="slidenum">
+              <a:rPr lang="de-DE" smtClean="0"/>
+              <a:pPr/>
+              <a:t>4</a:t>
+            </a:fld>
+            <a:r>
+              <a:rPr lang="de-DE" dirty="0" smtClean="0"/>
+              <a:t>/17</a:t>
+            </a:r>
+            <a:endParaRPr lang="de-DE" dirty="0"/>
+          </a:p>
+        </p:txBody>
+      </p:sp>
+    </p:spTree>
+  </p:cSld>
+  <p:clrMapOvr>
+    <a:masterClrMapping/>
+  </p:clrMapOvr>
+  <p:timing>
+    <p:tnLst>
+      <p:par>
+        <p:cTn id="1" dur="indefinite" restart="never" nodeType="tmRoot"/>
+      </p:par>
+    </p:tnLst>
+  </p:timing>
+</p:sld>
+</file>
+
+<file path=ppt/slides/slide5.xml><?xml version="1.0" encoding="utf-8"?>
+<p:sld xmlns:a="http://schemas.openxmlformats.org/drawingml/2006/main" xmlns:r="http://schemas.openxmlformats.org/officeDocument/2006/relationships" xmlns:p="http://schemas.openxmlformats.org/presentationml/2006/main">
+  <p:cSld>
+    <p:spTree>
+      <p:nvGrpSpPr>
+        <p:cNvPr id="1" name=""/>
+        <p:cNvGrpSpPr/>
+        <p:nvPr/>
+      </p:nvGrpSpPr>
+      <p:grpSpPr>
+        <a:xfrm>
+          <a:off x="0" y="0"/>
+          <a:ext cx="0" cy="0"/>
+          <a:chOff x="0" y="0"/>
+          <a:chExt cx="0" cy="0"/>
+        </a:xfrm>
+      </p:grpSpPr>
+      <p:sp>
+        <p:nvSpPr>
+          <p:cNvPr id="2" name="Titel 1"/>
+          <p:cNvSpPr>
+            <a:spLocks noGrp="1"/>
+          </p:cNvSpPr>
+          <p:nvPr>
+            <p:ph type="title"/>
+          </p:nvPr>
+        </p:nvSpPr>
+        <p:spPr/>
+        <p:txBody>
+          <a:bodyPr/>
+          <a:lstStyle/>
+          <a:p>
+            <a:r>
+              <a:rPr lang="de-AT" dirty="0" smtClean="0"/>
+              <a:t>Das Raummodell</a:t>
+            </a:r>
+            <a:endParaRPr lang="de-AT" dirty="0"/>
+          </a:p>
+        </p:txBody>
+      </p:sp>
+      <p:sp>
+        <p:nvSpPr>
+          <p:cNvPr id="3" name="Inhaltsplatzhalter 2"/>
+          <p:cNvSpPr>
+            <a:spLocks noGrp="1"/>
+          </p:cNvSpPr>
+          <p:nvPr>
+            <p:ph idx="1"/>
+          </p:nvPr>
+        </p:nvSpPr>
+        <p:spPr/>
+        <p:txBody>
+          <a:bodyPr/>
+          <a:lstStyle/>
+          <a:p>
+            <a:endParaRPr lang="de-AT" dirty="0"/>
+          </a:p>
+        </p:txBody>
+      </p:sp>
+      <p:pic>
+        <p:nvPicPr>
+          <p:cNvPr id="1027" name="Picture 3" descr="U:\HBA\Praesentation\Bilder\IMG_20140109_144142.jpg"/>
+          <p:cNvPicPr>
+            <a:picLocks noChangeAspect="1" noChangeArrowheads="1"/>
+          </p:cNvPicPr>
+          <p:nvPr/>
+        </p:nvPicPr>
+        <p:blipFill>
+          <a:blip r:embed="rId3" cstate="print"/>
+          <a:srcRect/>
+          <a:stretch>
+            <a:fillRect/>
+          </a:stretch>
+        </p:blipFill>
+        <p:spPr bwMode="auto">
+          <a:xfrm>
+            <a:off x="0" y="1916832"/>
+            <a:ext cx="9144000" cy="4090148"/>
+          </a:xfrm>
+          <a:prstGeom prst="rect">
+            <a:avLst/>
+          </a:prstGeom>
+          <a:noFill/>
+        </p:spPr>
+      </p:pic>
+      <p:sp>
+        <p:nvSpPr>
+          <p:cNvPr id="6" name="Rechteckige Legende 5"/>
+          <p:cNvSpPr/>
+          <p:nvPr/>
+        </p:nvSpPr>
+        <p:spPr>
+          <a:xfrm>
+            <a:off x="0" y="5517232"/>
+            <a:ext cx="1187624" cy="504056"/>
+          </a:xfrm>
+          <a:prstGeom prst="wedgeRectCallout">
+            <a:avLst>
+              <a:gd name="adj1" fmla="val 39593"/>
+              <a:gd name="adj2" fmla="val -143474"/>
+            </a:avLst>
+          </a:prstGeom>
+          <a:solidFill>
+            <a:schemeClr val="bg1"/>
+          </a:solidFill>
+        </p:spPr>
+        <p:style>
+          <a:lnRef idx="2">
+            <a:schemeClr val="accent1">
+              <a:shade val="50000"/>
+            </a:schemeClr>
+          </a:lnRef>
+          <a:fillRef idx="1">
+            <a:schemeClr val="accent1"/>
+          </a:fillRef>
+          <a:effectRef idx="0">
+            <a:schemeClr val="accent1"/>
+          </a:effectRef>
+          <a:fontRef idx="minor">
+            <a:schemeClr val="lt1"/>
+          </a:fontRef>
+        </p:style>
+        <p:txBody>
+          <a:bodyPr rtlCol="0" anchor="ctr"/>
+          <a:lstStyle/>
+          <a:p>
+            <a:pPr algn="ctr"/>
+            <a:r>
+              <a:rPr lang="de-AT" dirty="0" smtClean="0">
+                <a:solidFill>
+                  <a:schemeClr val="tx1"/>
+                </a:solidFill>
+              </a:rPr>
+              <a:t>Netzgerät</a:t>
+            </a:r>
+            <a:endParaRPr lang="de-AT" dirty="0">
+              <a:solidFill>
+                <a:schemeClr val="tx1"/>
+              </a:solidFill>
+            </a:endParaRPr>
+          </a:p>
+        </p:txBody>
+      </p:sp>
+      <p:sp>
+        <p:nvSpPr>
+          <p:cNvPr id="7" name="Rechteckige Legende 6"/>
+          <p:cNvSpPr/>
+          <p:nvPr/>
+        </p:nvSpPr>
+        <p:spPr>
+          <a:xfrm>
+            <a:off x="107504" y="1916832"/>
+            <a:ext cx="1584176" cy="504056"/>
+          </a:xfrm>
+          <a:prstGeom prst="wedgeRectCallout">
+            <a:avLst>
+              <a:gd name="adj1" fmla="val 11033"/>
+              <a:gd name="adj2" fmla="val 342172"/>
+            </a:avLst>
+          </a:prstGeom>
+          <a:solidFill>
+            <a:schemeClr val="bg1"/>
+          </a:solidFill>
+        </p:spPr>
+        <p:style>
+          <a:lnRef idx="2">
+            <a:schemeClr val="accent1">
+              <a:shade val="50000"/>
+            </a:schemeClr>
+          </a:lnRef>
+          <a:fillRef idx="1">
+            <a:schemeClr val="accent1"/>
+          </a:fillRef>
+          <a:effectRef idx="0">
+            <a:schemeClr val="accent1"/>
+          </a:effectRef>
+          <a:fontRef idx="minor">
+            <a:schemeClr val="lt1"/>
+          </a:fontRef>
+        </p:style>
+        <p:txBody>
+          <a:bodyPr rtlCol="0" anchor="ctr"/>
+          <a:lstStyle/>
+          <a:p>
+            <a:pPr algn="ctr"/>
+            <a:r>
+              <a:rPr lang="de-AT" dirty="0" smtClean="0">
+                <a:solidFill>
+                  <a:schemeClr val="tx1"/>
+                </a:solidFill>
+              </a:rPr>
+              <a:t>Taster 4-fach</a:t>
+            </a:r>
+            <a:endParaRPr lang="de-AT" dirty="0">
+              <a:solidFill>
+                <a:schemeClr val="tx1"/>
+              </a:solidFill>
+            </a:endParaRPr>
+          </a:p>
+        </p:txBody>
+      </p:sp>
+      <p:sp>
+        <p:nvSpPr>
+          <p:cNvPr id="8" name="Rechteckige Legende 7"/>
+          <p:cNvSpPr/>
+          <p:nvPr/>
+        </p:nvSpPr>
+        <p:spPr>
+          <a:xfrm>
+            <a:off x="4067944" y="5517232"/>
+            <a:ext cx="2016224" cy="504056"/>
+          </a:xfrm>
+          <a:prstGeom prst="wedgeRectCallout">
+            <a:avLst>
+              <a:gd name="adj1" fmla="val -96425"/>
+              <a:gd name="adj2" fmla="val -254964"/>
+            </a:avLst>
+          </a:prstGeom>
+          <a:solidFill>
+            <a:schemeClr val="bg1"/>
+          </a:solidFill>
+        </p:spPr>
+        <p:style>
+          <a:lnRef idx="2">
+            <a:schemeClr val="accent1">
+              <a:shade val="50000"/>
+            </a:schemeClr>
+          </a:lnRef>
+          <a:fillRef idx="1">
+            <a:schemeClr val="accent1"/>
+          </a:fillRef>
+          <a:effectRef idx="0">
+            <a:schemeClr val="accent1"/>
+          </a:effectRef>
+          <a:fontRef idx="minor">
+            <a:schemeClr val="lt1"/>
+          </a:fontRef>
+        </p:style>
+        <p:txBody>
+          <a:bodyPr rtlCol="0" anchor="ctr"/>
+          <a:lstStyle/>
+          <a:p>
+            <a:pPr algn="ctr"/>
+            <a:r>
+              <a:rPr lang="de-AT" dirty="0" smtClean="0">
+                <a:solidFill>
+                  <a:schemeClr val="tx1"/>
+                </a:solidFill>
+              </a:rPr>
+              <a:t>Temperatursensor</a:t>
+            </a:r>
+            <a:endParaRPr lang="de-AT" dirty="0">
+              <a:solidFill>
+                <a:schemeClr val="tx1"/>
+              </a:solidFill>
+            </a:endParaRPr>
+          </a:p>
+        </p:txBody>
+      </p:sp>
+      <p:sp>
+        <p:nvSpPr>
+          <p:cNvPr id="9" name="Rechteckige Legende 8"/>
+          <p:cNvSpPr/>
+          <p:nvPr/>
+        </p:nvSpPr>
+        <p:spPr>
+          <a:xfrm>
+            <a:off x="2483768" y="5517232"/>
+            <a:ext cx="1512168" cy="504056"/>
+          </a:xfrm>
+          <a:prstGeom prst="wedgeRectCallout">
+            <a:avLst>
+              <a:gd name="adj1" fmla="val -73346"/>
+              <a:gd name="adj2" fmla="val -234178"/>
+            </a:avLst>
+          </a:prstGeom>
+          <a:solidFill>
+            <a:schemeClr val="bg1"/>
+          </a:solidFill>
+        </p:spPr>
+        <p:style>
+          <a:lnRef idx="2">
+            <a:schemeClr val="accent1">
+              <a:shade val="50000"/>
+            </a:schemeClr>
+          </a:lnRef>
+          <a:fillRef idx="1">
+            <a:schemeClr val="accent1"/>
+          </a:fillRef>
+          <a:effectRef idx="0">
+            <a:schemeClr val="accent1"/>
+          </a:effectRef>
+          <a:fontRef idx="minor">
+            <a:schemeClr val="lt1"/>
+          </a:fontRef>
+        </p:style>
+        <p:txBody>
+          <a:bodyPr rtlCol="0" anchor="ctr"/>
+          <a:lstStyle/>
+          <a:p>
+            <a:pPr algn="ctr"/>
+            <a:r>
+              <a:rPr lang="de-AT" dirty="0" smtClean="0">
+                <a:solidFill>
+                  <a:schemeClr val="tx1"/>
+                </a:solidFill>
+              </a:rPr>
+              <a:t>USB-Interface</a:t>
+            </a:r>
+            <a:endParaRPr lang="de-AT" dirty="0">
+              <a:solidFill>
+                <a:schemeClr val="tx1"/>
+              </a:solidFill>
+            </a:endParaRPr>
+          </a:p>
+        </p:txBody>
+      </p:sp>
+      <p:sp>
+        <p:nvSpPr>
+          <p:cNvPr id="10" name="Rechteckige Legende 9"/>
+          <p:cNvSpPr/>
+          <p:nvPr/>
+        </p:nvSpPr>
+        <p:spPr>
+          <a:xfrm>
+            <a:off x="1259632" y="5517232"/>
+            <a:ext cx="1152128" cy="504056"/>
+          </a:xfrm>
+          <a:prstGeom prst="wedgeRectCallout">
+            <a:avLst>
+              <a:gd name="adj1" fmla="val -15527"/>
+              <a:gd name="adj2" fmla="val -226620"/>
+            </a:avLst>
+          </a:prstGeom>
+          <a:solidFill>
+            <a:schemeClr val="bg1"/>
+          </a:solidFill>
+        </p:spPr>
+        <p:style>
+          <a:lnRef idx="2">
+            <a:schemeClr val="accent1">
+              <a:shade val="50000"/>
+            </a:schemeClr>
+          </a:lnRef>
+          <a:fillRef idx="1">
+            <a:schemeClr val="accent1"/>
+          </a:fillRef>
+          <a:effectRef idx="0">
+            <a:schemeClr val="accent1"/>
+          </a:effectRef>
+          <a:fontRef idx="minor">
+            <a:schemeClr val="lt1"/>
+          </a:fontRef>
+        </p:style>
+        <p:txBody>
+          <a:bodyPr rtlCol="0" anchor="ctr"/>
+          <a:lstStyle/>
+          <a:p>
+            <a:pPr algn="ctr"/>
+            <a:r>
+              <a:rPr lang="de-AT" dirty="0" smtClean="0">
+                <a:solidFill>
+                  <a:schemeClr val="tx1"/>
+                </a:solidFill>
+              </a:rPr>
+              <a:t>IP-Router</a:t>
+            </a:r>
+            <a:endParaRPr lang="de-AT" dirty="0">
+              <a:solidFill>
+                <a:schemeClr val="tx1"/>
+              </a:solidFill>
+            </a:endParaRPr>
+          </a:p>
+        </p:txBody>
+      </p:sp>
+      <p:sp>
+        <p:nvSpPr>
+          <p:cNvPr id="11" name="Rechteckige Legende 10"/>
+          <p:cNvSpPr/>
+          <p:nvPr/>
+        </p:nvSpPr>
+        <p:spPr>
+          <a:xfrm>
+            <a:off x="6156176" y="5517232"/>
+            <a:ext cx="1368152" cy="504056"/>
+          </a:xfrm>
+          <a:prstGeom prst="wedgeRectCallout">
+            <a:avLst>
+              <a:gd name="adj1" fmla="val -239616"/>
+              <a:gd name="adj2" fmla="val -277640"/>
+            </a:avLst>
+          </a:prstGeom>
+          <a:solidFill>
+            <a:schemeClr val="bg1"/>
+          </a:solidFill>
+        </p:spPr>
+        <p:style>
+          <a:lnRef idx="2">
+            <a:schemeClr val="accent1">
+              <a:shade val="50000"/>
+            </a:schemeClr>
+          </a:lnRef>
+          <a:fillRef idx="1">
+            <a:schemeClr val="accent1"/>
+          </a:fillRef>
+          <a:effectRef idx="0">
+            <a:schemeClr val="accent1"/>
+          </a:effectRef>
+          <a:fontRef idx="minor">
+            <a:schemeClr val="lt1"/>
+          </a:fontRef>
+        </p:style>
+        <p:txBody>
+          <a:bodyPr rtlCol="0" anchor="ctr"/>
+          <a:lstStyle/>
+          <a:p>
+            <a:pPr algn="ctr"/>
+            <a:r>
+              <a:rPr lang="de-AT" dirty="0" smtClean="0">
+                <a:solidFill>
+                  <a:schemeClr val="tx1"/>
+                </a:solidFill>
+              </a:rPr>
+              <a:t>Linker </a:t>
+            </a:r>
+            <a:r>
+              <a:rPr lang="de-AT" dirty="0" err="1" smtClean="0">
+                <a:solidFill>
+                  <a:schemeClr val="tx1"/>
+                </a:solidFill>
+              </a:rPr>
+              <a:t>Schaltaktor</a:t>
+            </a:r>
+            <a:endParaRPr lang="de-AT" dirty="0">
+              <a:solidFill>
+                <a:schemeClr val="tx1"/>
+              </a:solidFill>
+            </a:endParaRPr>
+          </a:p>
+        </p:txBody>
+      </p:sp>
+      <p:sp>
+        <p:nvSpPr>
+          <p:cNvPr id="12" name="Rechteckige Legende 11"/>
+          <p:cNvSpPr/>
+          <p:nvPr/>
+        </p:nvSpPr>
+        <p:spPr>
+          <a:xfrm>
+            <a:off x="7596336" y="5517232"/>
+            <a:ext cx="1368152" cy="504056"/>
+          </a:xfrm>
+          <a:prstGeom prst="wedgeRectCallout">
+            <a:avLst>
+              <a:gd name="adj1" fmla="val -303589"/>
+              <a:gd name="adj2" fmla="val -298427"/>
+            </a:avLst>
+          </a:prstGeom>
+          <a:solidFill>
+            <a:schemeClr val="bg1"/>
+          </a:solidFill>
+        </p:spPr>
+        <p:style>
+          <a:lnRef idx="2">
+            <a:schemeClr val="accent1">
+              <a:shade val="50000"/>
+            </a:schemeClr>
+          </a:lnRef>
+          <a:fillRef idx="1">
+            <a:schemeClr val="accent1"/>
+          </a:fillRef>
+          <a:effectRef idx="0">
+            <a:schemeClr val="accent1"/>
+          </a:effectRef>
+          <a:fontRef idx="minor">
+            <a:schemeClr val="lt1"/>
+          </a:fontRef>
+        </p:style>
+        <p:txBody>
+          <a:bodyPr rtlCol="0" anchor="ctr"/>
+          <a:lstStyle/>
+          <a:p>
+            <a:pPr algn="ctr"/>
+            <a:r>
+              <a:rPr lang="de-AT" dirty="0" smtClean="0">
+                <a:solidFill>
+                  <a:schemeClr val="tx1"/>
+                </a:solidFill>
+              </a:rPr>
+              <a:t>Rechter </a:t>
+            </a:r>
+            <a:r>
+              <a:rPr lang="de-AT" dirty="0" err="1" smtClean="0">
+                <a:solidFill>
+                  <a:schemeClr val="tx1"/>
+                </a:solidFill>
+              </a:rPr>
+              <a:t>Schaltaktor</a:t>
+            </a:r>
+            <a:endParaRPr lang="de-AT" dirty="0">
+              <a:solidFill>
+                <a:schemeClr val="tx1"/>
+              </a:solidFill>
+            </a:endParaRPr>
+          </a:p>
+        </p:txBody>
+      </p:sp>
+      <p:sp>
+        <p:nvSpPr>
+          <p:cNvPr id="13" name="Rechteckige Legende 12"/>
+          <p:cNvSpPr/>
+          <p:nvPr/>
+        </p:nvSpPr>
+        <p:spPr>
+          <a:xfrm>
+            <a:off x="7559824" y="4221088"/>
+            <a:ext cx="1584176" cy="504056"/>
+          </a:xfrm>
+          <a:prstGeom prst="wedgeRectCallout">
+            <a:avLst>
+              <a:gd name="adj1" fmla="val -80960"/>
+              <a:gd name="adj2" fmla="val -158591"/>
+            </a:avLst>
+          </a:prstGeom>
+          <a:solidFill>
+            <a:schemeClr val="bg1"/>
+          </a:solidFill>
+        </p:spPr>
+        <p:style>
+          <a:lnRef idx="2">
+            <a:schemeClr val="accent1">
+              <a:shade val="50000"/>
+            </a:schemeClr>
+          </a:lnRef>
+          <a:fillRef idx="1">
+            <a:schemeClr val="accent1"/>
+          </a:fillRef>
+          <a:effectRef idx="0">
+            <a:schemeClr val="accent1"/>
+          </a:effectRef>
+          <a:fontRef idx="minor">
+            <a:schemeClr val="lt1"/>
+          </a:fontRef>
+        </p:style>
+        <p:txBody>
+          <a:bodyPr rtlCol="0" anchor="ctr"/>
+          <a:lstStyle/>
+          <a:p>
+            <a:pPr algn="ctr"/>
+            <a:r>
+              <a:rPr lang="de-AT" dirty="0" smtClean="0">
+                <a:solidFill>
+                  <a:schemeClr val="tx1"/>
+                </a:solidFill>
+              </a:rPr>
+              <a:t>Supercool-Box</a:t>
+            </a:r>
+            <a:endParaRPr lang="de-AT" dirty="0">
+              <a:solidFill>
+                <a:schemeClr val="tx1"/>
+              </a:solidFill>
+            </a:endParaRPr>
+          </a:p>
+        </p:txBody>
+      </p:sp>
+      <p:sp>
+        <p:nvSpPr>
+          <p:cNvPr id="14" name="Rechteckige Legende 13"/>
+          <p:cNvSpPr/>
+          <p:nvPr/>
+        </p:nvSpPr>
+        <p:spPr>
+          <a:xfrm>
+            <a:off x="7559824" y="1916832"/>
+            <a:ext cx="1584176" cy="504056"/>
+          </a:xfrm>
+          <a:prstGeom prst="wedgeRectCallout">
+            <a:avLst>
+              <a:gd name="adj1" fmla="val -27448"/>
+              <a:gd name="adj2" fmla="val 181550"/>
+            </a:avLst>
+          </a:prstGeom>
+          <a:solidFill>
+            <a:schemeClr val="bg1"/>
+          </a:solidFill>
+        </p:spPr>
+        <p:style>
+          <a:lnRef idx="2">
+            <a:schemeClr val="accent1">
+              <a:shade val="50000"/>
+            </a:schemeClr>
+          </a:lnRef>
+          <a:fillRef idx="1">
+            <a:schemeClr val="accent1"/>
+          </a:fillRef>
+          <a:effectRef idx="0">
+            <a:schemeClr val="accent1"/>
+          </a:effectRef>
+          <a:fontRef idx="minor">
+            <a:schemeClr val="lt1"/>
+          </a:fontRef>
+        </p:style>
+        <p:txBody>
+          <a:bodyPr rtlCol="0" anchor="ctr"/>
+          <a:lstStyle/>
+          <a:p>
+            <a:pPr algn="ctr"/>
+            <a:r>
+              <a:rPr lang="de-AT" dirty="0" smtClean="0">
+                <a:solidFill>
+                  <a:schemeClr val="tx1"/>
+                </a:solidFill>
+              </a:rPr>
+              <a:t>2x Lüfter</a:t>
+            </a:r>
+            <a:endParaRPr lang="de-AT" dirty="0">
+              <a:solidFill>
+                <a:schemeClr val="tx1"/>
+              </a:solidFill>
+            </a:endParaRPr>
+          </a:p>
+        </p:txBody>
+      </p:sp>
+      <p:sp>
+        <p:nvSpPr>
+          <p:cNvPr id="15" name="Rechteckige Legende 14"/>
+          <p:cNvSpPr/>
+          <p:nvPr/>
+        </p:nvSpPr>
+        <p:spPr>
+          <a:xfrm>
+            <a:off x="7559824" y="4869160"/>
+            <a:ext cx="1584176" cy="504056"/>
+          </a:xfrm>
+          <a:prstGeom prst="wedgeRectCallout">
+            <a:avLst>
+              <a:gd name="adj1" fmla="val -131466"/>
+              <a:gd name="adj2" fmla="val -134025"/>
+            </a:avLst>
+          </a:prstGeom>
+          <a:solidFill>
+            <a:schemeClr val="bg1"/>
+          </a:solidFill>
+        </p:spPr>
+        <p:style>
+          <a:lnRef idx="2">
+            <a:schemeClr val="accent1">
+              <a:shade val="50000"/>
+            </a:schemeClr>
+          </a:lnRef>
+          <a:fillRef idx="1">
+            <a:schemeClr val="accent1"/>
+          </a:fillRef>
+          <a:effectRef idx="0">
+            <a:schemeClr val="accent1"/>
+          </a:effectRef>
+          <a:fontRef idx="minor">
+            <a:schemeClr val="lt1"/>
+          </a:fontRef>
+        </p:style>
+        <p:txBody>
+          <a:bodyPr rtlCol="0" anchor="ctr"/>
+          <a:lstStyle/>
+          <a:p>
+            <a:pPr algn="ctr"/>
+            <a:r>
+              <a:rPr lang="de-AT" dirty="0" smtClean="0">
+                <a:solidFill>
+                  <a:schemeClr val="tx1"/>
+                </a:solidFill>
+              </a:rPr>
+              <a:t>2x Licht</a:t>
+            </a:r>
+            <a:endParaRPr lang="de-AT" dirty="0">
+              <a:solidFill>
+                <a:schemeClr val="tx1"/>
+              </a:solidFill>
+            </a:endParaRPr>
+          </a:p>
+        </p:txBody>
+      </p:sp>
+      <p:sp>
+        <p:nvSpPr>
+          <p:cNvPr id="16" name="Rechteckige Legende 15"/>
+          <p:cNvSpPr/>
+          <p:nvPr/>
+        </p:nvSpPr>
+        <p:spPr>
+          <a:xfrm>
+            <a:off x="5004048" y="1916832"/>
+            <a:ext cx="2304256" cy="504056"/>
+          </a:xfrm>
+          <a:prstGeom prst="wedgeRectCallout">
+            <a:avLst>
+              <a:gd name="adj1" fmla="val 27868"/>
+              <a:gd name="adj2" fmla="val 102183"/>
+            </a:avLst>
+          </a:prstGeom>
+          <a:solidFill>
+            <a:schemeClr val="bg1"/>
+          </a:solidFill>
+        </p:spPr>
+        <p:style>
+          <a:lnRef idx="2">
+            <a:schemeClr val="accent1">
+              <a:shade val="50000"/>
+            </a:schemeClr>
+          </a:lnRef>
+          <a:fillRef idx="1">
+            <a:schemeClr val="accent1"/>
+          </a:fillRef>
+          <a:effectRef idx="0">
+            <a:schemeClr val="accent1"/>
+          </a:effectRef>
+          <a:fontRef idx="minor">
+            <a:schemeClr val="lt1"/>
+          </a:fontRef>
+        </p:style>
+        <p:txBody>
+          <a:bodyPr rtlCol="0" anchor="ctr"/>
+          <a:lstStyle/>
+          <a:p>
+            <a:pPr algn="ctr"/>
+            <a:r>
+              <a:rPr lang="de-AT" dirty="0" smtClean="0">
+                <a:solidFill>
+                  <a:schemeClr val="tx1"/>
+                </a:solidFill>
+              </a:rPr>
+              <a:t>Raumtemperatur-</a:t>
+            </a:r>
+            <a:r>
+              <a:rPr lang="de-AT" dirty="0" err="1" smtClean="0">
+                <a:solidFill>
+                  <a:schemeClr val="tx1"/>
+                </a:solidFill>
+              </a:rPr>
+              <a:t>regler</a:t>
+            </a:r>
+            <a:endParaRPr lang="de-AT" dirty="0">
+              <a:solidFill>
+                <a:schemeClr val="tx1"/>
+              </a:solidFill>
+            </a:endParaRPr>
+          </a:p>
+        </p:txBody>
+      </p:sp>
+      <p:sp>
+        <p:nvSpPr>
+          <p:cNvPr id="19" name="Foliennummernplatzhalter 18"/>
+          <p:cNvSpPr>
+            <a:spLocks noGrp="1"/>
+          </p:cNvSpPr>
+          <p:nvPr>
+            <p:ph type="sldNum" sz="quarter" idx="12"/>
+          </p:nvPr>
+        </p:nvSpPr>
+        <p:spPr/>
+        <p:txBody>
+          <a:bodyPr/>
+          <a:lstStyle/>
+          <a:p>
+            <a:fld id="{6C6AE60A-B69C-4790-82F7-3882EDF23186}" type="slidenum">
+              <a:rPr lang="de-DE" smtClean="0"/>
+              <a:pPr/>
+              <a:t>5</a:t>
+            </a:fld>
+            <a:r>
+              <a:rPr lang="de-DE" dirty="0" smtClean="0"/>
+              <a:t>/17</a:t>
+            </a:r>
+            <a:endParaRPr lang="de-DE" dirty="0"/>
+          </a:p>
+        </p:txBody>
+      </p:sp>
     </p:spTree>
   </p:cSld>
   <p:clrMapOvr>
@@ -15080,7 +17175,7 @@
           <a:p>
             <a:r>
               <a:rPr lang="de-AT" dirty="0" smtClean="0"/>
-              <a:t>Das Raummodell</a:t>
+              <a:t>Engineering Teil</a:t>
             </a:r>
             <a:endParaRPr lang="de-AT" dirty="0"/>
           </a:p>
@@ -15101,695 +17196,97 @@
           <a:bodyPr/>
           <a:lstStyle/>
           <a:p>
+            <a:r>
+              <a:rPr lang="de-AT" dirty="0" smtClean="0"/>
+              <a:t>Zertifikat von </a:t>
+            </a:r>
+            <a:r>
+              <a:rPr lang="de-AT" b="1" dirty="0" smtClean="0"/>
+              <a:t>KNX ETS4 </a:t>
+            </a:r>
+            <a:r>
+              <a:rPr lang="de-AT" b="1" dirty="0" err="1" smtClean="0"/>
+              <a:t>eCampus</a:t>
+            </a:r>
+            <a:endParaRPr lang="de-AT" b="1" dirty="0" smtClean="0"/>
+          </a:p>
+          <a:p>
+            <a:r>
+              <a:rPr lang="de-AT" dirty="0" smtClean="0"/>
+              <a:t>Adressvergabe</a:t>
+            </a:r>
+          </a:p>
+          <a:p>
+            <a:r>
+              <a:rPr lang="de-AT" dirty="0" smtClean="0"/>
+              <a:t>Lichtsteuerung (</a:t>
+            </a:r>
+            <a:r>
+              <a:rPr lang="de-AT" dirty="0" err="1" smtClean="0"/>
+              <a:t>Bsp</a:t>
+            </a:r>
+            <a:r>
+              <a:rPr lang="de-AT" dirty="0" smtClean="0"/>
+              <a:t> folgt)</a:t>
+            </a:r>
+          </a:p>
+          <a:p>
+            <a:r>
+              <a:rPr lang="de-AT" dirty="0" err="1" smtClean="0"/>
+              <a:t>Ventilatorsteuerung</a:t>
+            </a:r>
+            <a:endParaRPr lang="de-AT" dirty="0" smtClean="0"/>
+          </a:p>
+          <a:p>
+            <a:r>
+              <a:rPr lang="de-AT" dirty="0" smtClean="0"/>
+              <a:t>Klimasteuerung (Zweipunktregler)</a:t>
+            </a:r>
+          </a:p>
+          <a:p>
+            <a:r>
+              <a:rPr lang="de-AT" dirty="0" smtClean="0"/>
+              <a:t>Visualisierung und Kontrolle am </a:t>
+            </a:r>
+            <a:r>
+              <a:rPr lang="de-AT" dirty="0" err="1" smtClean="0"/>
+              <a:t>Touch</a:t>
+            </a:r>
+            <a:r>
+              <a:rPr lang="de-AT" dirty="0" smtClean="0"/>
+              <a:t>-Panel</a:t>
+            </a:r>
+          </a:p>
+          <a:p>
             <a:endParaRPr lang="de-AT" dirty="0"/>
           </a:p>
         </p:txBody>
       </p:sp>
-      <p:pic>
-        <p:nvPicPr>
-          <p:cNvPr id="1027" name="Picture 3" descr="U:\HBA\Praesentation\Bilder\IMG_20140109_144142.jpg"/>
-          <p:cNvPicPr>
-            <a:picLocks noChangeAspect="1" noChangeArrowheads="1"/>
-          </p:cNvPicPr>
-          <p:nvPr/>
-        </p:nvPicPr>
-        <p:blipFill>
-          <a:blip r:embed="rId3" cstate="print"/>
-          <a:srcRect/>
-          <a:stretch>
-            <a:fillRect/>
-          </a:stretch>
-        </p:blipFill>
-        <p:spPr bwMode="auto">
-          <a:xfrm>
-            <a:off x="0" y="1916832"/>
-            <a:ext cx="9144000" cy="4090148"/>
-          </a:xfrm>
-          <a:prstGeom prst="rect">
-            <a:avLst/>
-          </a:prstGeom>
-          <a:noFill/>
-        </p:spPr>
-      </p:pic>
-      <p:sp>
-        <p:nvSpPr>
-          <p:cNvPr id="6" name="Rechteckige Legende 5"/>
-          <p:cNvSpPr/>
-          <p:nvPr/>
-        </p:nvSpPr>
-        <p:spPr>
-          <a:xfrm>
-            <a:off x="0" y="5517232"/>
-            <a:ext cx="1187624" cy="504056"/>
-          </a:xfrm>
-          <a:prstGeom prst="wedgeRectCallout">
-            <a:avLst>
-              <a:gd name="adj1" fmla="val 39593"/>
-              <a:gd name="adj2" fmla="val -143474"/>
-            </a:avLst>
-          </a:prstGeom>
-          <a:solidFill>
-            <a:schemeClr val="bg1"/>
-          </a:solidFill>
-        </p:spPr>
-        <p:style>
-          <a:lnRef idx="2">
-            <a:schemeClr val="accent1">
-              <a:shade val="50000"/>
-            </a:schemeClr>
-          </a:lnRef>
-          <a:fillRef idx="1">
-            <a:schemeClr val="accent1"/>
-          </a:fillRef>
-          <a:effectRef idx="0">
-            <a:schemeClr val="accent1"/>
-          </a:effectRef>
-          <a:fontRef idx="minor">
-            <a:schemeClr val="lt1"/>
-          </a:fontRef>
-        </p:style>
-        <p:txBody>
-          <a:bodyPr rtlCol="0" anchor="ctr"/>
+      <p:sp>
+        <p:nvSpPr>
+          <p:cNvPr id="6" name="Foliennummernplatzhalter 5"/>
+          <p:cNvSpPr>
+            <a:spLocks noGrp="1"/>
+          </p:cNvSpPr>
+          <p:nvPr>
+            <p:ph type="sldNum" sz="quarter" idx="12"/>
+          </p:nvPr>
+        </p:nvSpPr>
+        <p:spPr/>
+        <p:txBody>
+          <a:bodyPr/>
           <a:lstStyle/>
           <a:p>
-            <a:pPr algn="ctr"/>
-            <a:r>
-              <a:rPr lang="de-AT" dirty="0" smtClean="0">
-                <a:solidFill>
-                  <a:schemeClr val="tx1"/>
-                </a:solidFill>
-              </a:rPr>
-              <a:t>Netzgerät</a:t>
-            </a:r>
-            <a:endParaRPr lang="de-AT" dirty="0">
-              <a:solidFill>
-                <a:schemeClr val="tx1"/>
-              </a:solidFill>
-            </a:endParaRPr>
-          </a:p>
-        </p:txBody>
-      </p:sp>
-      <p:sp>
-        <p:nvSpPr>
-          <p:cNvPr id="7" name="Rechteckige Legende 6"/>
-          <p:cNvSpPr/>
-          <p:nvPr/>
-        </p:nvSpPr>
-        <p:spPr>
-          <a:xfrm>
-            <a:off x="107504" y="1916832"/>
-            <a:ext cx="1584176" cy="504056"/>
-          </a:xfrm>
-          <a:prstGeom prst="wedgeRectCallout">
-            <a:avLst>
-              <a:gd name="adj1" fmla="val 11033"/>
-              <a:gd name="adj2" fmla="val 342172"/>
-            </a:avLst>
-          </a:prstGeom>
-          <a:solidFill>
-            <a:schemeClr val="bg1"/>
-          </a:solidFill>
-        </p:spPr>
-        <p:style>
-          <a:lnRef idx="2">
-            <a:schemeClr val="accent1">
-              <a:shade val="50000"/>
-            </a:schemeClr>
-          </a:lnRef>
-          <a:fillRef idx="1">
-            <a:schemeClr val="accent1"/>
-          </a:fillRef>
-          <a:effectRef idx="0">
-            <a:schemeClr val="accent1"/>
-          </a:effectRef>
-          <a:fontRef idx="minor">
-            <a:schemeClr val="lt1"/>
-          </a:fontRef>
-        </p:style>
-        <p:txBody>
-          <a:bodyPr rtlCol="0" anchor="ctr"/>
-          <a:lstStyle/>
-          <a:p>
-            <a:pPr algn="ctr"/>
-            <a:r>
-              <a:rPr lang="de-AT" dirty="0" smtClean="0">
-                <a:solidFill>
-                  <a:schemeClr val="tx1"/>
-                </a:solidFill>
-              </a:rPr>
-              <a:t>Taster 4-fach</a:t>
-            </a:r>
-            <a:endParaRPr lang="de-AT" dirty="0">
-              <a:solidFill>
-                <a:schemeClr val="tx1"/>
-              </a:solidFill>
-            </a:endParaRPr>
-          </a:p>
-        </p:txBody>
-      </p:sp>
-      <p:sp>
-        <p:nvSpPr>
-          <p:cNvPr id="8" name="Rechteckige Legende 7"/>
-          <p:cNvSpPr/>
-          <p:nvPr/>
-        </p:nvSpPr>
-        <p:spPr>
-          <a:xfrm>
-            <a:off x="4067944" y="5517232"/>
-            <a:ext cx="2016224" cy="504056"/>
-          </a:xfrm>
-          <a:prstGeom prst="wedgeRectCallout">
-            <a:avLst>
-              <a:gd name="adj1" fmla="val -96425"/>
-              <a:gd name="adj2" fmla="val -254964"/>
-            </a:avLst>
-          </a:prstGeom>
-          <a:solidFill>
-            <a:schemeClr val="bg1"/>
-          </a:solidFill>
-        </p:spPr>
-        <p:style>
-          <a:lnRef idx="2">
-            <a:schemeClr val="accent1">
-              <a:shade val="50000"/>
-            </a:schemeClr>
-          </a:lnRef>
-          <a:fillRef idx="1">
-            <a:schemeClr val="accent1"/>
-          </a:fillRef>
-          <a:effectRef idx="0">
-            <a:schemeClr val="accent1"/>
-          </a:effectRef>
-          <a:fontRef idx="minor">
-            <a:schemeClr val="lt1"/>
-          </a:fontRef>
-        </p:style>
-        <p:txBody>
-          <a:bodyPr rtlCol="0" anchor="ctr"/>
-          <a:lstStyle/>
-          <a:p>
-            <a:pPr algn="ctr"/>
-            <a:r>
-              <a:rPr lang="de-AT" dirty="0" smtClean="0">
-                <a:solidFill>
-                  <a:schemeClr val="tx1"/>
-                </a:solidFill>
-              </a:rPr>
-              <a:t>Temperatursensor</a:t>
-            </a:r>
-            <a:endParaRPr lang="de-AT" dirty="0">
-              <a:solidFill>
-                <a:schemeClr val="tx1"/>
-              </a:solidFill>
-            </a:endParaRPr>
-          </a:p>
-        </p:txBody>
-      </p:sp>
-      <p:sp>
-        <p:nvSpPr>
-          <p:cNvPr id="9" name="Rechteckige Legende 8"/>
-          <p:cNvSpPr/>
-          <p:nvPr/>
-        </p:nvSpPr>
-        <p:spPr>
-          <a:xfrm>
-            <a:off x="2483768" y="5517232"/>
-            <a:ext cx="1512168" cy="504056"/>
-          </a:xfrm>
-          <a:prstGeom prst="wedgeRectCallout">
-            <a:avLst>
-              <a:gd name="adj1" fmla="val -73346"/>
-              <a:gd name="adj2" fmla="val -234178"/>
-            </a:avLst>
-          </a:prstGeom>
-          <a:solidFill>
-            <a:schemeClr val="bg1"/>
-          </a:solidFill>
-        </p:spPr>
-        <p:style>
-          <a:lnRef idx="2">
-            <a:schemeClr val="accent1">
-              <a:shade val="50000"/>
-            </a:schemeClr>
-          </a:lnRef>
-          <a:fillRef idx="1">
-            <a:schemeClr val="accent1"/>
-          </a:fillRef>
-          <a:effectRef idx="0">
-            <a:schemeClr val="accent1"/>
-          </a:effectRef>
-          <a:fontRef idx="minor">
-            <a:schemeClr val="lt1"/>
-          </a:fontRef>
-        </p:style>
-        <p:txBody>
-          <a:bodyPr rtlCol="0" anchor="ctr"/>
-          <a:lstStyle/>
-          <a:p>
-            <a:pPr algn="ctr"/>
-            <a:r>
-              <a:rPr lang="de-AT" dirty="0" smtClean="0">
-                <a:solidFill>
-                  <a:schemeClr val="tx1"/>
-                </a:solidFill>
-              </a:rPr>
-              <a:t>USB-Interface</a:t>
-            </a:r>
-            <a:endParaRPr lang="de-AT" dirty="0">
-              <a:solidFill>
-                <a:schemeClr val="tx1"/>
-              </a:solidFill>
-            </a:endParaRPr>
-          </a:p>
-        </p:txBody>
-      </p:sp>
-      <p:sp>
-        <p:nvSpPr>
-          <p:cNvPr id="10" name="Rechteckige Legende 9"/>
-          <p:cNvSpPr/>
-          <p:nvPr/>
-        </p:nvSpPr>
-        <p:spPr>
-          <a:xfrm>
-            <a:off x="1259632" y="5517232"/>
-            <a:ext cx="1152128" cy="504056"/>
-          </a:xfrm>
-          <a:prstGeom prst="wedgeRectCallout">
-            <a:avLst>
-              <a:gd name="adj1" fmla="val -15527"/>
-              <a:gd name="adj2" fmla="val -226620"/>
-            </a:avLst>
-          </a:prstGeom>
-          <a:solidFill>
-            <a:schemeClr val="bg1"/>
-          </a:solidFill>
-        </p:spPr>
-        <p:style>
-          <a:lnRef idx="2">
-            <a:schemeClr val="accent1">
-              <a:shade val="50000"/>
-            </a:schemeClr>
-          </a:lnRef>
-          <a:fillRef idx="1">
-            <a:schemeClr val="accent1"/>
-          </a:fillRef>
-          <a:effectRef idx="0">
-            <a:schemeClr val="accent1"/>
-          </a:effectRef>
-          <a:fontRef idx="minor">
-            <a:schemeClr val="lt1"/>
-          </a:fontRef>
-        </p:style>
-        <p:txBody>
-          <a:bodyPr rtlCol="0" anchor="ctr"/>
-          <a:lstStyle/>
-          <a:p>
-            <a:pPr algn="ctr"/>
-            <a:r>
-              <a:rPr lang="de-AT" dirty="0" smtClean="0">
-                <a:solidFill>
-                  <a:schemeClr val="tx1"/>
-                </a:solidFill>
-              </a:rPr>
-              <a:t>IP-Router</a:t>
-            </a:r>
-            <a:endParaRPr lang="de-AT" dirty="0">
-              <a:solidFill>
-                <a:schemeClr val="tx1"/>
-              </a:solidFill>
-            </a:endParaRPr>
-          </a:p>
-        </p:txBody>
-      </p:sp>
-      <p:sp>
-        <p:nvSpPr>
-          <p:cNvPr id="11" name="Rechteckige Legende 10"/>
-          <p:cNvSpPr/>
-          <p:nvPr/>
-        </p:nvSpPr>
-        <p:spPr>
-          <a:xfrm>
-            <a:off x="6156176" y="5517232"/>
-            <a:ext cx="1368152" cy="504056"/>
-          </a:xfrm>
-          <a:prstGeom prst="wedgeRectCallout">
-            <a:avLst>
-              <a:gd name="adj1" fmla="val -239616"/>
-              <a:gd name="adj2" fmla="val -277640"/>
-            </a:avLst>
-          </a:prstGeom>
-          <a:solidFill>
-            <a:schemeClr val="bg1"/>
-          </a:solidFill>
-        </p:spPr>
-        <p:style>
-          <a:lnRef idx="2">
-            <a:schemeClr val="accent1">
-              <a:shade val="50000"/>
-            </a:schemeClr>
-          </a:lnRef>
-          <a:fillRef idx="1">
-            <a:schemeClr val="accent1"/>
-          </a:fillRef>
-          <a:effectRef idx="0">
-            <a:schemeClr val="accent1"/>
-          </a:effectRef>
-          <a:fontRef idx="minor">
-            <a:schemeClr val="lt1"/>
-          </a:fontRef>
-        </p:style>
-        <p:txBody>
-          <a:bodyPr rtlCol="0" anchor="ctr"/>
-          <a:lstStyle/>
-          <a:p>
-            <a:pPr algn="ctr"/>
-            <a:r>
-              <a:rPr lang="de-AT" dirty="0" smtClean="0">
-                <a:solidFill>
-                  <a:schemeClr val="tx1"/>
-                </a:solidFill>
-              </a:rPr>
-              <a:t>Linker </a:t>
-            </a:r>
-            <a:r>
-              <a:rPr lang="de-AT" dirty="0" err="1" smtClean="0">
-                <a:solidFill>
-                  <a:schemeClr val="tx1"/>
-                </a:solidFill>
-              </a:rPr>
-              <a:t>Schaltaktor</a:t>
-            </a:r>
-            <a:endParaRPr lang="de-AT" dirty="0">
-              <a:solidFill>
-                <a:schemeClr val="tx1"/>
-              </a:solidFill>
-            </a:endParaRPr>
-          </a:p>
-        </p:txBody>
-      </p:sp>
-      <p:sp>
-        <p:nvSpPr>
-          <p:cNvPr id="12" name="Rechteckige Legende 11"/>
-          <p:cNvSpPr/>
-          <p:nvPr/>
-        </p:nvSpPr>
-        <p:spPr>
-          <a:xfrm>
-            <a:off x="7596336" y="5517232"/>
-            <a:ext cx="1368152" cy="504056"/>
-          </a:xfrm>
-          <a:prstGeom prst="wedgeRectCallout">
-            <a:avLst>
-              <a:gd name="adj1" fmla="val -303589"/>
-              <a:gd name="adj2" fmla="val -298427"/>
-            </a:avLst>
-          </a:prstGeom>
-          <a:solidFill>
-            <a:schemeClr val="bg1"/>
-          </a:solidFill>
-        </p:spPr>
-        <p:style>
-          <a:lnRef idx="2">
-            <a:schemeClr val="accent1">
-              <a:shade val="50000"/>
-            </a:schemeClr>
-          </a:lnRef>
-          <a:fillRef idx="1">
-            <a:schemeClr val="accent1"/>
-          </a:fillRef>
-          <a:effectRef idx="0">
-            <a:schemeClr val="accent1"/>
-          </a:effectRef>
-          <a:fontRef idx="minor">
-            <a:schemeClr val="lt1"/>
-          </a:fontRef>
-        </p:style>
-        <p:txBody>
-          <a:bodyPr rtlCol="0" anchor="ctr"/>
-          <a:lstStyle/>
-          <a:p>
-            <a:pPr algn="ctr"/>
-            <a:r>
-              <a:rPr lang="de-AT" dirty="0" smtClean="0">
-                <a:solidFill>
-                  <a:schemeClr val="tx1"/>
-                </a:solidFill>
-              </a:rPr>
-              <a:t>Rechter </a:t>
-            </a:r>
-            <a:r>
-              <a:rPr lang="de-AT" dirty="0" err="1" smtClean="0">
-                <a:solidFill>
-                  <a:schemeClr val="tx1"/>
-                </a:solidFill>
-              </a:rPr>
-              <a:t>Schaltaktor</a:t>
-            </a:r>
-            <a:endParaRPr lang="de-AT" dirty="0">
-              <a:solidFill>
-                <a:schemeClr val="tx1"/>
-              </a:solidFill>
-            </a:endParaRPr>
-          </a:p>
-        </p:txBody>
-      </p:sp>
-      <p:sp>
-        <p:nvSpPr>
-          <p:cNvPr id="13" name="Rechteckige Legende 12"/>
-          <p:cNvSpPr/>
-          <p:nvPr/>
-        </p:nvSpPr>
-        <p:spPr>
-          <a:xfrm>
-            <a:off x="7559824" y="4221088"/>
-            <a:ext cx="1584176" cy="504056"/>
-          </a:xfrm>
-          <a:prstGeom prst="wedgeRectCallout">
-            <a:avLst>
-              <a:gd name="adj1" fmla="val -80960"/>
-              <a:gd name="adj2" fmla="val -158591"/>
-            </a:avLst>
-          </a:prstGeom>
-          <a:solidFill>
-            <a:schemeClr val="bg1"/>
-          </a:solidFill>
-        </p:spPr>
-        <p:style>
-          <a:lnRef idx="2">
-            <a:schemeClr val="accent1">
-              <a:shade val="50000"/>
-            </a:schemeClr>
-          </a:lnRef>
-          <a:fillRef idx="1">
-            <a:schemeClr val="accent1"/>
-          </a:fillRef>
-          <a:effectRef idx="0">
-            <a:schemeClr val="accent1"/>
-          </a:effectRef>
-          <a:fontRef idx="minor">
-            <a:schemeClr val="lt1"/>
-          </a:fontRef>
-        </p:style>
-        <p:txBody>
-          <a:bodyPr rtlCol="0" anchor="ctr"/>
-          <a:lstStyle/>
-          <a:p>
-            <a:pPr algn="ctr"/>
-            <a:r>
-              <a:rPr lang="de-AT" dirty="0" smtClean="0">
-                <a:solidFill>
-                  <a:schemeClr val="tx1"/>
-                </a:solidFill>
-              </a:rPr>
-              <a:t>Supercool-Box</a:t>
-            </a:r>
-            <a:endParaRPr lang="de-AT" dirty="0">
-              <a:solidFill>
-                <a:schemeClr val="tx1"/>
-              </a:solidFill>
-            </a:endParaRPr>
-          </a:p>
-        </p:txBody>
-      </p:sp>
-      <p:sp>
-        <p:nvSpPr>
-          <p:cNvPr id="14" name="Rechteckige Legende 13"/>
-          <p:cNvSpPr/>
-          <p:nvPr/>
-        </p:nvSpPr>
-        <p:spPr>
-          <a:xfrm>
-            <a:off x="7559824" y="1916832"/>
-            <a:ext cx="1584176" cy="504056"/>
-          </a:xfrm>
-          <a:prstGeom prst="wedgeRectCallout">
-            <a:avLst>
-              <a:gd name="adj1" fmla="val -27448"/>
-              <a:gd name="adj2" fmla="val 181550"/>
-            </a:avLst>
-          </a:prstGeom>
-          <a:solidFill>
-            <a:schemeClr val="bg1"/>
-          </a:solidFill>
-        </p:spPr>
-        <p:style>
-          <a:lnRef idx="2">
-            <a:schemeClr val="accent1">
-              <a:shade val="50000"/>
-            </a:schemeClr>
-          </a:lnRef>
-          <a:fillRef idx="1">
-            <a:schemeClr val="accent1"/>
-          </a:fillRef>
-          <a:effectRef idx="0">
-            <a:schemeClr val="accent1"/>
-          </a:effectRef>
-          <a:fontRef idx="minor">
-            <a:schemeClr val="lt1"/>
-          </a:fontRef>
-        </p:style>
-        <p:txBody>
-          <a:bodyPr rtlCol="0" anchor="ctr"/>
-          <a:lstStyle/>
-          <a:p>
-            <a:pPr algn="ctr"/>
-            <a:r>
-              <a:rPr lang="de-AT" dirty="0" smtClean="0">
-                <a:solidFill>
-                  <a:schemeClr val="tx1"/>
-                </a:solidFill>
-              </a:rPr>
-              <a:t>2x Lüfter</a:t>
-            </a:r>
-            <a:endParaRPr lang="de-AT" dirty="0">
-              <a:solidFill>
-                <a:schemeClr val="tx1"/>
-              </a:solidFill>
-            </a:endParaRPr>
-          </a:p>
-        </p:txBody>
-      </p:sp>
-      <p:sp>
-        <p:nvSpPr>
-          <p:cNvPr id="15" name="Rechteckige Legende 14"/>
-          <p:cNvSpPr/>
-          <p:nvPr/>
-        </p:nvSpPr>
-        <p:spPr>
-          <a:xfrm>
-            <a:off x="7559824" y="4869160"/>
-            <a:ext cx="1584176" cy="504056"/>
-          </a:xfrm>
-          <a:prstGeom prst="wedgeRectCallout">
-            <a:avLst>
-              <a:gd name="adj1" fmla="val -131466"/>
-              <a:gd name="adj2" fmla="val -134025"/>
-            </a:avLst>
-          </a:prstGeom>
-          <a:solidFill>
-            <a:schemeClr val="bg1"/>
-          </a:solidFill>
-        </p:spPr>
-        <p:style>
-          <a:lnRef idx="2">
-            <a:schemeClr val="accent1">
-              <a:shade val="50000"/>
-            </a:schemeClr>
-          </a:lnRef>
-          <a:fillRef idx="1">
-            <a:schemeClr val="accent1"/>
-          </a:fillRef>
-          <a:effectRef idx="0">
-            <a:schemeClr val="accent1"/>
-          </a:effectRef>
-          <a:fontRef idx="minor">
-            <a:schemeClr val="lt1"/>
-          </a:fontRef>
-        </p:style>
-        <p:txBody>
-          <a:bodyPr rtlCol="0" anchor="ctr"/>
-          <a:lstStyle/>
-          <a:p>
-            <a:pPr algn="ctr"/>
-            <a:r>
-              <a:rPr lang="de-AT" dirty="0" smtClean="0">
-                <a:solidFill>
-                  <a:schemeClr val="tx1"/>
-                </a:solidFill>
-              </a:rPr>
-              <a:t>2x Licht</a:t>
-            </a:r>
-            <a:endParaRPr lang="de-AT" dirty="0">
-              <a:solidFill>
-                <a:schemeClr val="tx1"/>
-              </a:solidFill>
-            </a:endParaRPr>
-          </a:p>
-        </p:txBody>
-      </p:sp>
-      <p:sp>
-        <p:nvSpPr>
-          <p:cNvPr id="16" name="Rechteckige Legende 15"/>
-          <p:cNvSpPr/>
-          <p:nvPr/>
-        </p:nvSpPr>
-        <p:spPr>
-          <a:xfrm>
-            <a:off x="5004048" y="1916832"/>
-            <a:ext cx="2304256" cy="504056"/>
-          </a:xfrm>
-          <a:prstGeom prst="wedgeRectCallout">
-            <a:avLst>
-              <a:gd name="adj1" fmla="val 27868"/>
-              <a:gd name="adj2" fmla="val 102183"/>
-            </a:avLst>
-          </a:prstGeom>
-          <a:solidFill>
-            <a:schemeClr val="bg1"/>
-          </a:solidFill>
-        </p:spPr>
-        <p:style>
-          <a:lnRef idx="2">
-            <a:schemeClr val="accent1">
-              <a:shade val="50000"/>
-            </a:schemeClr>
-          </a:lnRef>
-          <a:fillRef idx="1">
-            <a:schemeClr val="accent1"/>
-          </a:fillRef>
-          <a:effectRef idx="0">
-            <a:schemeClr val="accent1"/>
-          </a:effectRef>
-          <a:fontRef idx="minor">
-            <a:schemeClr val="lt1"/>
-          </a:fontRef>
-        </p:style>
-        <p:txBody>
-          <a:bodyPr rtlCol="0" anchor="ctr"/>
-          <a:lstStyle/>
-          <a:p>
-            <a:pPr algn="ctr"/>
-            <a:r>
-              <a:rPr lang="de-AT" dirty="0" smtClean="0">
-                <a:solidFill>
-                  <a:schemeClr val="tx1"/>
-                </a:solidFill>
-              </a:rPr>
-              <a:t>Raumtemperatur-</a:t>
-            </a:r>
-            <a:r>
-              <a:rPr lang="de-AT" dirty="0" err="1" smtClean="0">
-                <a:solidFill>
-                  <a:schemeClr val="tx1"/>
-                </a:solidFill>
-              </a:rPr>
-              <a:t>regler</a:t>
-            </a:r>
-            <a:endParaRPr lang="de-AT" dirty="0">
-              <a:solidFill>
-                <a:schemeClr val="tx1"/>
-              </a:solidFill>
-            </a:endParaRPr>
+            <a:fld id="{6C6AE60A-B69C-4790-82F7-3882EDF23186}" type="slidenum">
+              <a:rPr lang="de-DE" smtClean="0"/>
+              <a:pPr/>
+              <a:t>6</a:t>
+            </a:fld>
+            <a:r>
+              <a:rPr lang="de-DE" dirty="0" smtClean="0"/>
+              <a:t>/17</a:t>
+            </a:r>
+            <a:endParaRPr lang="de-DE" dirty="0"/>
           </a:p>
         </p:txBody>
       </p:sp>
@@ -15837,25 +17334,72 @@
         </p:nvSpPr>
         <p:spPr/>
         <p:txBody>
+          <a:bodyPr>
+            <a:normAutofit/>
+          </a:bodyPr>
+          <a:lstStyle/>
+          <a:p>
+            <a:r>
+              <a:rPr lang="de-AT" dirty="0" smtClean="0"/>
+              <a:t>Videodemonstration zu ETS4</a:t>
+            </a:r>
+            <a:endParaRPr lang="de-AT" dirty="0"/>
+          </a:p>
+        </p:txBody>
+      </p:sp>
+      <p:sp>
+        <p:nvSpPr>
+          <p:cNvPr id="3" name="Inhaltsplatzhalter 2"/>
+          <p:cNvSpPr>
+            <a:spLocks noGrp="1"/>
+          </p:cNvSpPr>
+          <p:nvPr>
+            <p:ph idx="1"/>
+          </p:nvPr>
+        </p:nvSpPr>
+        <p:spPr/>
+        <p:txBody>
           <a:bodyPr/>
           <a:lstStyle/>
           <a:p>
-            <a:r>
-              <a:rPr lang="de-AT" dirty="0" smtClean="0"/>
-              <a:t>Engineering Teil</a:t>
-            </a:r>
-            <a:endParaRPr lang="de-AT" dirty="0"/>
-          </a:p>
-        </p:txBody>
-      </p:sp>
-      <p:sp>
-        <p:nvSpPr>
-          <p:cNvPr id="3" name="Inhaltsplatzhalter 2"/>
+            <a:endParaRPr lang="de-AT"/>
+          </a:p>
+        </p:txBody>
+      </p:sp>
+      <p:pic>
+        <p:nvPicPr>
+          <p:cNvPr id="1028" name="Picture 4" descr="http://www.elektrojournal.at/bilder/d146/4ets.jpg"/>
+          <p:cNvPicPr>
+            <a:picLocks noChangeAspect="1" noChangeArrowheads="1"/>
+          </p:cNvPicPr>
+          <p:nvPr/>
+        </p:nvPicPr>
+        <p:blipFill>
+          <a:blip r:embed="rId2" cstate="print"/>
+          <a:srcRect/>
+          <a:stretch>
+            <a:fillRect/>
+          </a:stretch>
+        </p:blipFill>
+        <p:spPr bwMode="auto">
+          <a:xfrm>
+            <a:off x="2699792" y="2348880"/>
+            <a:ext cx="3600400" cy="3600400"/>
+          </a:xfrm>
+          <a:prstGeom prst="rect">
+            <a:avLst/>
+          </a:prstGeom>
+          <a:noFill/>
+        </p:spPr>
+      </p:pic>
+      <p:sp>
+        <p:nvSpPr>
+          <p:cNvPr id="7" name="Foliennummernplatzhalter 6"/>
           <p:cNvSpPr>
             <a:spLocks noGrp="1"/>
           </p:cNvSpPr>
           <p:nvPr>
-            <p:ph idx="1"/>
+            <p:ph type="sldNum" sz="quarter" idx="12"/>
           </p:nvPr>
         </p:nvSpPr>
         <p:spPr/>
@@ -15863,69 +17407,16 @@
           <a:bodyPr/>
           <a:lstStyle/>
           <a:p>
-            <a:r>
-              <a:rPr lang="de-AT" dirty="0" smtClean="0"/>
-              <a:t>Zertifikat von </a:t>
-            </a:r>
-            <a:r>
-              <a:rPr lang="de-AT" b="1" dirty="0" smtClean="0"/>
-              <a:t>KNX ETS4 </a:t>
-            </a:r>
-            <a:r>
-              <a:rPr lang="de-AT" b="1" dirty="0" err="1" smtClean="0"/>
-              <a:t>eCampus</a:t>
-            </a:r>
-            <a:endParaRPr lang="de-AT" b="1" dirty="0" smtClean="0"/>
-          </a:p>
-          <a:p>
-            <a:r>
-              <a:rPr lang="de-AT" dirty="0" smtClean="0"/>
-              <a:t>Adressvergabe</a:t>
-            </a:r>
-          </a:p>
-          <a:p>
-            <a:r>
-              <a:rPr lang="de-AT" dirty="0" smtClean="0"/>
-              <a:t>Lichtsteuerung (</a:t>
-            </a:r>
-            <a:r>
-              <a:rPr lang="de-AT" dirty="0" err="1" smtClean="0"/>
-              <a:t>Bsp</a:t>
-            </a:r>
-            <a:r>
-              <a:rPr lang="de-AT" dirty="0" smtClean="0"/>
-              <a:t> folgt)</a:t>
-            </a:r>
-          </a:p>
-          <a:p>
-            <a:r>
-              <a:rPr lang="de-AT" dirty="0" err="1" smtClean="0"/>
-              <a:t>Ventilatorsteuerung</a:t>
-            </a:r>
-            <a:endParaRPr lang="de-AT" dirty="0" smtClean="0"/>
-          </a:p>
-          <a:p>
-            <a:r>
-              <a:rPr lang="de-AT" dirty="0" smtClean="0"/>
-              <a:t>Klimasteuerung (Zweipunktregler)</a:t>
-            </a:r>
-          </a:p>
-          <a:p>
-            <a:r>
-              <a:rPr lang="de-AT" dirty="0" smtClean="0"/>
-              <a:t>Visualisierung und Kontrolle am </a:t>
-            </a:r>
-            <a:r>
-              <a:rPr lang="de-AT" dirty="0" err="1" smtClean="0"/>
-              <a:t>Touch</a:t>
-            </a:r>
-            <a:r>
-              <a:rPr lang="de-AT" dirty="0" smtClean="0"/>
-              <a:t>-Panel</a:t>
-            </a:r>
-          </a:p>
-          <a:p>
-            <a:endParaRPr lang="de-AT" dirty="0"/>
+            <a:fld id="{6C6AE60A-B69C-4790-82F7-3882EDF23186}" type="slidenum">
+              <a:rPr lang="de-DE" smtClean="0"/>
+              <a:pPr/>
+              <a:t>7</a:t>
+            </a:fld>
+            <a:r>
+              <a:rPr lang="de-DE" dirty="0" smtClean="0"/>
+              <a:t>/17</a:t>
+            </a:r>
+            <a:endParaRPr lang="de-DE" dirty="0"/>
           </a:p>
         </p:txBody>
       </p:sp>
@@ -15973,64 +17464,84 @@
         </p:nvSpPr>
         <p:spPr/>
         <p:txBody>
-          <a:bodyPr>
-            <a:normAutofit/>
-          </a:bodyPr>
-          <a:lstStyle/>
-          <a:p>
-            <a:r>
-              <a:rPr lang="de-AT" dirty="0" smtClean="0"/>
-              <a:t>Videodemonstration zu ETS4</a:t>
-            </a:r>
-            <a:endParaRPr lang="de-AT" dirty="0"/>
-          </a:p>
-        </p:txBody>
-      </p:sp>
-      <p:sp>
-        <p:nvSpPr>
-          <p:cNvPr id="3" name="Inhaltsplatzhalter 2"/>
-          <p:cNvSpPr>
-            <a:spLocks noGrp="1"/>
-          </p:cNvSpPr>
-          <p:nvPr>
-            <p:ph idx="1"/>
-          </p:nvPr>
-        </p:nvSpPr>
-        <p:spPr/>
-        <p:txBody>
           <a:bodyPr/>
           <a:lstStyle/>
           <a:p>
-            <a:endParaRPr lang="de-AT"/>
-          </a:p>
-        </p:txBody>
-      </p:sp>
-      <p:pic>
-        <p:nvPicPr>
-          <p:cNvPr id="1028" name="Picture 4" descr="http://www.elektrojournal.at/bilder/d146/4ets.jpg"/>
-          <p:cNvPicPr>
-            <a:picLocks noChangeAspect="1" noChangeArrowheads="1"/>
-          </p:cNvPicPr>
-          <p:nvPr/>
-        </p:nvPicPr>
-        <p:blipFill>
-          <a:blip r:embed="rId2" cstate="print"/>
-          <a:srcRect/>
-          <a:stretch>
-            <a:fillRect/>
-          </a:stretch>
-        </p:blipFill>
-        <p:spPr bwMode="auto">
-          <a:xfrm>
-            <a:off x="2699792" y="2348880"/>
-            <a:ext cx="3600400" cy="3600400"/>
-          </a:xfrm>
-          <a:prstGeom prst="rect">
-            <a:avLst/>
-          </a:prstGeom>
-          <a:noFill/>
-        </p:spPr>
-      </p:pic>
+            <a:r>
+              <a:rPr lang="de-AT" dirty="0" err="1" smtClean="0"/>
+              <a:t>Calimero</a:t>
+            </a:r>
+            <a:r>
+              <a:rPr lang="de-AT" dirty="0" smtClean="0"/>
+              <a:t>: Überblick</a:t>
+            </a:r>
+            <a:endParaRPr lang="de-AT" dirty="0"/>
+          </a:p>
+        </p:txBody>
+      </p:sp>
+      <p:sp>
+        <p:nvSpPr>
+          <p:cNvPr id="3" name="Inhaltsplatzhalter 2"/>
+          <p:cNvSpPr>
+            <a:spLocks noGrp="1"/>
+          </p:cNvSpPr>
+          <p:nvPr>
+            <p:ph idx="1"/>
+          </p:nvPr>
+        </p:nvSpPr>
+        <p:spPr/>
+        <p:txBody>
+          <a:bodyPr/>
+          <a:lstStyle/>
+          <a:p>
+            <a:r>
+              <a:rPr lang="de-AT" dirty="0" smtClean="0"/>
+              <a:t>Java Bibliothek</a:t>
+            </a:r>
+          </a:p>
+          <a:p>
+            <a:r>
+              <a:rPr lang="de-AT" dirty="0" smtClean="0"/>
+              <a:t>Verbindet Applikation mit KNX Medium</a:t>
+            </a:r>
+          </a:p>
+          <a:p>
+            <a:r>
+              <a:rPr lang="de-AT" dirty="0" smtClean="0"/>
+              <a:t>Abstrahiert von Protokollen und Medien (IP, Serial, …)</a:t>
+            </a:r>
+            <a:endParaRPr lang="de-AT" dirty="0"/>
+          </a:p>
+        </p:txBody>
+      </p:sp>
+      <p:sp>
+        <p:nvSpPr>
+          <p:cNvPr id="6" name="Foliennummernplatzhalter 5"/>
+          <p:cNvSpPr>
+            <a:spLocks noGrp="1"/>
+          </p:cNvSpPr>
+          <p:nvPr>
+            <p:ph type="sldNum" sz="quarter" idx="12"/>
+          </p:nvPr>
+        </p:nvSpPr>
+        <p:spPr/>
+        <p:txBody>
+          <a:bodyPr/>
+          <a:lstStyle/>
+          <a:p>
+            <a:fld id="{6C6AE60A-B69C-4790-82F7-3882EDF23186}" type="slidenum">
+              <a:rPr lang="de-DE" smtClean="0"/>
+              <a:pPr/>
+              <a:t>8</a:t>
+            </a:fld>
+            <a:r>
+              <a:rPr lang="de-DE" dirty="0" smtClean="0"/>
+              <a:t>/17</a:t>
+            </a:r>
+            <a:endParaRPr lang="de-DE" dirty="0"/>
+          </a:p>
+        </p:txBody>
+      </p:sp>
     </p:spTree>
   </p:cSld>
   <p:clrMapOvr>
@@ -16075,51 +17586,289 @@
         </p:nvSpPr>
         <p:spPr/>
         <p:txBody>
+          <a:bodyPr>
+            <a:normAutofit fontScale="90000"/>
+          </a:bodyPr>
+          <a:lstStyle/>
+          <a:p>
+            <a:r>
+              <a:rPr lang="de-AT" dirty="0" err="1" smtClean="0"/>
+              <a:t>Calimero</a:t>
+            </a:r>
+            <a:r>
+              <a:rPr lang="de-AT" dirty="0" smtClean="0"/>
+              <a:t>: </a:t>
+            </a:r>
+            <a:r>
+              <a:rPr lang="de-AT" dirty="0" err="1" smtClean="0"/>
+              <a:t>Waist-line</a:t>
+            </a:r>
+            <a:r>
+              <a:rPr lang="de-AT" dirty="0" smtClean="0"/>
+              <a:t> Architektur</a:t>
+            </a:r>
+            <a:endParaRPr lang="de-AT" dirty="0"/>
+          </a:p>
+        </p:txBody>
+      </p:sp>
+      <p:pic>
+        <p:nvPicPr>
+          <p:cNvPr id="1026" name="Picture 2"/>
+          <p:cNvPicPr>
+            <a:picLocks noChangeAspect="1" noChangeArrowheads="1"/>
+          </p:cNvPicPr>
+          <p:nvPr/>
+        </p:nvPicPr>
+        <p:blipFill>
+          <a:blip r:embed="rId2" cstate="print"/>
+          <a:srcRect/>
+          <a:stretch>
+            <a:fillRect/>
+          </a:stretch>
+        </p:blipFill>
+        <p:spPr bwMode="auto">
+          <a:xfrm>
+            <a:off x="2339752" y="2023294"/>
+            <a:ext cx="4210223" cy="4834706"/>
+          </a:xfrm>
+          <a:prstGeom prst="rect">
+            <a:avLst/>
+          </a:prstGeom>
+          <a:noFill/>
+          <a:ln w="9525">
+            <a:noFill/>
+            <a:miter lim="800000"/>
+            <a:headEnd/>
+            <a:tailEnd/>
+          </a:ln>
+        </p:spPr>
+      </p:pic>
+      <p:cxnSp>
+        <p:nvCxnSpPr>
+          <p:cNvPr id="6" name="Gerade Verbindung mit Pfeil 5"/>
+          <p:cNvCxnSpPr/>
+          <p:nvPr/>
+        </p:nvCxnSpPr>
+        <p:spPr>
+          <a:xfrm>
+            <a:off x="1835696" y="6021288"/>
+            <a:ext cx="936104" cy="0"/>
+          </a:xfrm>
+          <a:prstGeom prst="straightConnector1">
+            <a:avLst/>
+          </a:prstGeom>
+          <a:ln w="34925">
+            <a:tailEnd type="arrow"/>
+          </a:ln>
+        </p:spPr>
+        <p:style>
+          <a:lnRef idx="1">
+            <a:schemeClr val="accent1"/>
+          </a:lnRef>
+          <a:fillRef idx="0">
+            <a:schemeClr val="accent1"/>
+          </a:fillRef>
+          <a:effectRef idx="0">
+            <a:schemeClr val="accent1"/>
+          </a:effectRef>
+          <a:fontRef idx="minor">
+            <a:schemeClr val="tx1"/>
+          </a:fontRef>
+        </p:style>
+      </p:cxnSp>
+      <p:sp>
+        <p:nvSpPr>
+          <p:cNvPr id="8" name="Textfeld 7"/>
+          <p:cNvSpPr txBox="1"/>
+          <p:nvPr/>
+        </p:nvSpPr>
+        <p:spPr>
+          <a:xfrm>
+            <a:off x="179512" y="5517232"/>
+            <a:ext cx="1944216" cy="584775"/>
+          </a:xfrm>
+          <a:prstGeom prst="rect">
+            <a:avLst/>
+          </a:prstGeom>
+          <a:noFill/>
+        </p:spPr>
+        <p:txBody>
+          <a:bodyPr wrap="square" rtlCol="0">
+            <a:spAutoFit/>
+          </a:bodyPr>
+          <a:lstStyle/>
+          <a:p>
+            <a:r>
+              <a:rPr lang="de-AT" sz="1600" dirty="0" smtClean="0"/>
+              <a:t>Network </a:t>
+            </a:r>
+            <a:r>
+              <a:rPr lang="de-AT" sz="1600" dirty="0" err="1" smtClean="0"/>
+              <a:t>Protocols</a:t>
+            </a:r>
+            <a:r>
+              <a:rPr lang="de-AT" sz="1600" dirty="0" smtClean="0"/>
+              <a:t> (Basic Services)</a:t>
+            </a:r>
+            <a:endParaRPr lang="de-AT" sz="1600" dirty="0"/>
+          </a:p>
+        </p:txBody>
+      </p:sp>
+      <p:cxnSp>
+        <p:nvCxnSpPr>
+          <p:cNvPr id="9" name="Gerade Verbindung mit Pfeil 8"/>
+          <p:cNvCxnSpPr/>
+          <p:nvPr/>
+        </p:nvCxnSpPr>
+        <p:spPr>
+          <a:xfrm flipH="1">
+            <a:off x="5292080" y="4653136"/>
+            <a:ext cx="1296144" cy="0"/>
+          </a:xfrm>
+          <a:prstGeom prst="straightConnector1">
+            <a:avLst/>
+          </a:prstGeom>
+          <a:ln w="34925">
+            <a:tailEnd type="arrow"/>
+          </a:ln>
+        </p:spPr>
+        <p:style>
+          <a:lnRef idx="1">
+            <a:schemeClr val="accent1"/>
+          </a:lnRef>
+          <a:fillRef idx="0">
+            <a:schemeClr val="accent1"/>
+          </a:fillRef>
+          <a:effectRef idx="0">
+            <a:schemeClr val="accent1"/>
+          </a:effectRef>
+          <a:fontRef idx="minor">
+            <a:schemeClr val="tx1"/>
+          </a:fontRef>
+        </p:style>
+      </p:cxnSp>
+      <p:sp>
+        <p:nvSpPr>
+          <p:cNvPr id="10" name="Textfeld 9"/>
+          <p:cNvSpPr txBox="1"/>
+          <p:nvPr/>
+        </p:nvSpPr>
+        <p:spPr>
+          <a:xfrm>
+            <a:off x="6588224" y="4437112"/>
+            <a:ext cx="1944216" cy="338554"/>
+          </a:xfrm>
+          <a:prstGeom prst="rect">
+            <a:avLst/>
+          </a:prstGeom>
+          <a:noFill/>
+        </p:spPr>
+        <p:txBody>
+          <a:bodyPr wrap="square" rtlCol="0">
+            <a:spAutoFit/>
+          </a:bodyPr>
+          <a:lstStyle/>
+          <a:p>
+            <a:r>
+              <a:rPr lang="de-AT" sz="1600" dirty="0" smtClean="0"/>
+              <a:t>Link </a:t>
+            </a:r>
+            <a:r>
+              <a:rPr lang="de-AT" sz="1600" dirty="0" err="1" smtClean="0"/>
+              <a:t>Abstraction</a:t>
+            </a:r>
+            <a:endParaRPr lang="de-AT" sz="1600" dirty="0"/>
+          </a:p>
+        </p:txBody>
+      </p:sp>
+      <p:cxnSp>
+        <p:nvCxnSpPr>
+          <p:cNvPr id="11" name="Gerade Verbindung mit Pfeil 10"/>
+          <p:cNvCxnSpPr/>
+          <p:nvPr/>
+        </p:nvCxnSpPr>
+        <p:spPr>
+          <a:xfrm>
+            <a:off x="1907704" y="3140968"/>
+            <a:ext cx="936104" cy="0"/>
+          </a:xfrm>
+          <a:prstGeom prst="straightConnector1">
+            <a:avLst/>
+          </a:prstGeom>
+          <a:ln w="34925">
+            <a:tailEnd type="arrow"/>
+          </a:ln>
+        </p:spPr>
+        <p:style>
+          <a:lnRef idx="1">
+            <a:schemeClr val="accent1"/>
+          </a:lnRef>
+          <a:fillRef idx="0">
+            <a:schemeClr val="accent1"/>
+          </a:fillRef>
+          <a:effectRef idx="0">
+            <a:schemeClr val="accent1"/>
+          </a:effectRef>
+          <a:fontRef idx="minor">
+            <a:schemeClr val="tx1"/>
+          </a:fontRef>
+        </p:style>
+      </p:cxnSp>
+      <p:sp>
+        <p:nvSpPr>
+          <p:cNvPr id="12" name="Textfeld 11"/>
+          <p:cNvSpPr txBox="1"/>
+          <p:nvPr/>
+        </p:nvSpPr>
+        <p:spPr>
+          <a:xfrm>
+            <a:off x="683568" y="2924944"/>
+            <a:ext cx="1296144" cy="338554"/>
+          </a:xfrm>
+          <a:prstGeom prst="rect">
+            <a:avLst/>
+          </a:prstGeom>
+          <a:noFill/>
+        </p:spPr>
+        <p:txBody>
+          <a:bodyPr wrap="square" rtlCol="0">
+            <a:spAutoFit/>
+          </a:bodyPr>
+          <a:lstStyle/>
+          <a:p>
+            <a:r>
+              <a:rPr lang="de-AT" sz="1600" dirty="0" err="1" smtClean="0"/>
+              <a:t>Application</a:t>
+            </a:r>
+            <a:endParaRPr lang="de-AT" sz="1600" dirty="0"/>
+          </a:p>
+        </p:txBody>
+      </p:sp>
+      <p:sp>
+        <p:nvSpPr>
+          <p:cNvPr id="16" name="Foliennummernplatzhalter 15"/>
+          <p:cNvSpPr>
+            <a:spLocks noGrp="1"/>
+          </p:cNvSpPr>
+          <p:nvPr>
+            <p:ph type="sldNum" sz="quarter" idx="12"/>
+          </p:nvPr>
+        </p:nvSpPr>
+        <p:spPr/>
+        <p:txBody>
           <a:bodyPr/>
           <a:lstStyle/>
           <a:p>
-            <a:r>
-              <a:rPr lang="de-AT" dirty="0" err="1" smtClean="0"/>
-              <a:t>Calimero</a:t>
-            </a:r>
-            <a:r>
-              <a:rPr lang="de-AT" dirty="0" smtClean="0"/>
-              <a:t>, Markus ab hier</a:t>
-            </a:r>
-            <a:endParaRPr lang="de-AT" dirty="0"/>
-          </a:p>
-        </p:txBody>
-      </p:sp>
-      <p:sp>
-        <p:nvSpPr>
-          <p:cNvPr id="3" name="Inhaltsplatzhalter 2"/>
-          <p:cNvSpPr>
-            <a:spLocks noGrp="1"/>
-          </p:cNvSpPr>
-          <p:nvPr>
-            <p:ph idx="1"/>
-          </p:nvPr>
-        </p:nvSpPr>
-        <p:spPr/>
-        <p:txBody>
-          <a:bodyPr/>
-          <a:lstStyle/>
-          <a:p>
-            <a:r>
-              <a:rPr lang="de-AT" dirty="0" smtClean="0"/>
-              <a:t>Java API</a:t>
-            </a:r>
-          </a:p>
-          <a:p>
-            <a:r>
-              <a:rPr lang="de-AT" dirty="0" err="1" smtClean="0"/>
-              <a:t>Bescheibung</a:t>
-            </a:r>
-            <a:r>
-              <a:rPr lang="de-AT" dirty="0" smtClean="0"/>
-              <a:t> wie auf erster Folie gefordert</a:t>
-            </a:r>
-            <a:endParaRPr lang="de-AT" dirty="0"/>
+            <a:fld id="{6C6AE60A-B69C-4790-82F7-3882EDF23186}" type="slidenum">
+              <a:rPr lang="de-DE" smtClean="0"/>
+              <a:pPr/>
+              <a:t>9</a:t>
+            </a:fld>
+            <a:r>
+              <a:rPr lang="de-DE" dirty="0" smtClean="0"/>
+              <a:t>/17</a:t>
+            </a:r>
+            <a:endParaRPr lang="de-DE" dirty="0"/>
           </a:p>
         </p:txBody>
       </p:sp>

</xml_diff>